<commit_message>
Fixing template size for GAB
</commit_message>
<xml_diff>
--- a/WebContent/WEB-INF/templates/GAB2016/master.pptx
+++ b/WebContent/WEB-INF/templates/GAB2016/master.pptx
@@ -7,223 +7,153 @@
   <p:notesMasterIdLst>
     <p:notesMasterId r:id="rId3"/>
   </p:notesMasterIdLst>
+  <p:handoutMasterIdLst>
+    <p:handoutMasterId r:id="rId4"/>
+  </p:handoutMasterIdLst>
   <p:sldIdLst>
     <p:sldId id="258" r:id="rId2"/>
   </p:sldIdLst>
-  <p:sldSz cx="9144000" cy="5143500" type="screen16x9"/>
+  <p:sldSz cx="9144000" cy="6858000" type="screen4x3"/>
   <p:notesSz cx="6858000" cy="9144000"/>
   <p:defaultTextStyle>
-    <a:defPPr marR="0" lvl="0" algn="l" rtl="0">
-      <a:lnSpc>
-        <a:spcPct val="100000"/>
-      </a:lnSpc>
+    <a:defPPr>
+      <a:defRPr lang="en-US"/>
+    </a:defPPr>
+    <a:lvl1pPr algn="l" rtl="0" eaLnBrk="0" fontAlgn="base" hangingPunct="0">
       <a:spcBef>
-        <a:spcPts val="0"/>
+        <a:spcPct val="0"/>
       </a:spcBef>
       <a:spcAft>
-        <a:spcPts val="0"/>
+        <a:spcPct val="0"/>
       </a:spcAft>
-    </a:defPPr>
-    <a:lvl1pPr marR="0" lvl="0" algn="l" rtl="0">
-      <a:lnSpc>
-        <a:spcPct val="100000"/>
-      </a:lnSpc>
-      <a:spcBef>
-        <a:spcPts val="0"/>
-      </a:spcBef>
-      <a:spcAft>
-        <a:spcPts val="0"/>
-      </a:spcAft>
-      <a:buNone/>
-      <a:defRPr sz="1400" b="0" i="0" u="none" strike="noStrike" cap="none">
+      <a:defRPr sz="1400" kern="1200">
         <a:solidFill>
           <a:srgbClr val="000000"/>
         </a:solidFill>
-        <a:latin typeface="Arial"/>
-        <a:ea typeface="Arial"/>
-        <a:cs typeface="Arial"/>
-        <a:sym typeface="Arial"/>
+        <a:latin typeface="Arial" charset="0"/>
+        <a:ea typeface="Arial" charset="0"/>
+        <a:cs typeface="Arial" charset="0"/>
+        <a:sym typeface="Arial" charset="0"/>
       </a:defRPr>
     </a:lvl1pPr>
-    <a:lvl2pPr marR="0" lvl="1" algn="l" rtl="0">
-      <a:lnSpc>
-        <a:spcPct val="100000"/>
-      </a:lnSpc>
+    <a:lvl2pPr marL="457200" algn="l" rtl="0" eaLnBrk="0" fontAlgn="base" hangingPunct="0">
       <a:spcBef>
-        <a:spcPts val="0"/>
+        <a:spcPct val="0"/>
       </a:spcBef>
       <a:spcAft>
-        <a:spcPts val="0"/>
+        <a:spcPct val="0"/>
       </a:spcAft>
-      <a:buNone/>
-      <a:defRPr sz="1400" b="0" i="0" u="none" strike="noStrike" cap="none">
+      <a:defRPr sz="1400" kern="1200">
         <a:solidFill>
           <a:srgbClr val="000000"/>
         </a:solidFill>
-        <a:latin typeface="Arial"/>
-        <a:ea typeface="Arial"/>
-        <a:cs typeface="Arial"/>
-        <a:sym typeface="Arial"/>
+        <a:latin typeface="Arial" charset="0"/>
+        <a:ea typeface="Arial" charset="0"/>
+        <a:cs typeface="Arial" charset="0"/>
+        <a:sym typeface="Arial" charset="0"/>
       </a:defRPr>
     </a:lvl2pPr>
-    <a:lvl3pPr marR="0" lvl="2" algn="l" rtl="0">
-      <a:lnSpc>
-        <a:spcPct val="100000"/>
-      </a:lnSpc>
+    <a:lvl3pPr marL="914400" algn="l" rtl="0" eaLnBrk="0" fontAlgn="base" hangingPunct="0">
       <a:spcBef>
-        <a:spcPts val="0"/>
+        <a:spcPct val="0"/>
       </a:spcBef>
       <a:spcAft>
-        <a:spcPts val="0"/>
+        <a:spcPct val="0"/>
       </a:spcAft>
-      <a:buNone/>
-      <a:defRPr sz="1400" b="0" i="0" u="none" strike="noStrike" cap="none">
+      <a:defRPr sz="1400" kern="1200">
         <a:solidFill>
           <a:srgbClr val="000000"/>
         </a:solidFill>
-        <a:latin typeface="Arial"/>
-        <a:ea typeface="Arial"/>
-        <a:cs typeface="Arial"/>
-        <a:sym typeface="Arial"/>
+        <a:latin typeface="Arial" charset="0"/>
+        <a:ea typeface="Arial" charset="0"/>
+        <a:cs typeface="Arial" charset="0"/>
+        <a:sym typeface="Arial" charset="0"/>
       </a:defRPr>
     </a:lvl3pPr>
-    <a:lvl4pPr marR="0" lvl="3" algn="l" rtl="0">
-      <a:lnSpc>
-        <a:spcPct val="100000"/>
-      </a:lnSpc>
+    <a:lvl4pPr marL="1371600" algn="l" rtl="0" eaLnBrk="0" fontAlgn="base" hangingPunct="0">
       <a:spcBef>
-        <a:spcPts val="0"/>
+        <a:spcPct val="0"/>
       </a:spcBef>
       <a:spcAft>
-        <a:spcPts val="0"/>
+        <a:spcPct val="0"/>
       </a:spcAft>
-      <a:buNone/>
-      <a:defRPr sz="1400" b="0" i="0" u="none" strike="noStrike" cap="none">
+      <a:defRPr sz="1400" kern="1200">
         <a:solidFill>
           <a:srgbClr val="000000"/>
         </a:solidFill>
-        <a:latin typeface="Arial"/>
-        <a:ea typeface="Arial"/>
-        <a:cs typeface="Arial"/>
-        <a:sym typeface="Arial"/>
+        <a:latin typeface="Arial" charset="0"/>
+        <a:ea typeface="Arial" charset="0"/>
+        <a:cs typeface="Arial" charset="0"/>
+        <a:sym typeface="Arial" charset="0"/>
       </a:defRPr>
     </a:lvl4pPr>
-    <a:lvl5pPr marR="0" lvl="4" algn="l" rtl="0">
-      <a:lnSpc>
-        <a:spcPct val="100000"/>
-      </a:lnSpc>
+    <a:lvl5pPr marL="1828800" algn="l" rtl="0" eaLnBrk="0" fontAlgn="base" hangingPunct="0">
       <a:spcBef>
-        <a:spcPts val="0"/>
+        <a:spcPct val="0"/>
       </a:spcBef>
       <a:spcAft>
-        <a:spcPts val="0"/>
+        <a:spcPct val="0"/>
       </a:spcAft>
-      <a:buNone/>
-      <a:defRPr sz="1400" b="0" i="0" u="none" strike="noStrike" cap="none">
+      <a:defRPr sz="1400" kern="1200">
         <a:solidFill>
           <a:srgbClr val="000000"/>
         </a:solidFill>
-        <a:latin typeface="Arial"/>
-        <a:ea typeface="Arial"/>
-        <a:cs typeface="Arial"/>
-        <a:sym typeface="Arial"/>
+        <a:latin typeface="Arial" charset="0"/>
+        <a:ea typeface="Arial" charset="0"/>
+        <a:cs typeface="Arial" charset="0"/>
+        <a:sym typeface="Arial" charset="0"/>
       </a:defRPr>
     </a:lvl5pPr>
-    <a:lvl6pPr marR="0" lvl="5" algn="l" rtl="0">
-      <a:lnSpc>
-        <a:spcPct val="100000"/>
-      </a:lnSpc>
-      <a:spcBef>
-        <a:spcPts val="0"/>
-      </a:spcBef>
-      <a:spcAft>
-        <a:spcPts val="0"/>
-      </a:spcAft>
-      <a:buNone/>
-      <a:defRPr sz="1400" b="0" i="0" u="none" strike="noStrike" cap="none">
+    <a:lvl6pPr marL="2286000" algn="l" defTabSz="914400" rtl="0" eaLnBrk="1" latinLnBrk="0" hangingPunct="1">
+      <a:defRPr sz="1400" kern="1200">
         <a:solidFill>
           <a:srgbClr val="000000"/>
         </a:solidFill>
-        <a:latin typeface="Arial"/>
-        <a:ea typeface="Arial"/>
-        <a:cs typeface="Arial"/>
-        <a:sym typeface="Arial"/>
+        <a:latin typeface="Arial" charset="0"/>
+        <a:ea typeface="Arial" charset="0"/>
+        <a:cs typeface="Arial" charset="0"/>
+        <a:sym typeface="Arial" charset="0"/>
       </a:defRPr>
     </a:lvl6pPr>
-    <a:lvl7pPr marR="0" lvl="6" algn="l" rtl="0">
-      <a:lnSpc>
-        <a:spcPct val="100000"/>
-      </a:lnSpc>
-      <a:spcBef>
-        <a:spcPts val="0"/>
-      </a:spcBef>
-      <a:spcAft>
-        <a:spcPts val="0"/>
-      </a:spcAft>
-      <a:buNone/>
-      <a:defRPr sz="1400" b="0" i="0" u="none" strike="noStrike" cap="none">
+    <a:lvl7pPr marL="2743200" algn="l" defTabSz="914400" rtl="0" eaLnBrk="1" latinLnBrk="0" hangingPunct="1">
+      <a:defRPr sz="1400" kern="1200">
         <a:solidFill>
           <a:srgbClr val="000000"/>
         </a:solidFill>
-        <a:latin typeface="Arial"/>
-        <a:ea typeface="Arial"/>
-        <a:cs typeface="Arial"/>
-        <a:sym typeface="Arial"/>
+        <a:latin typeface="Arial" charset="0"/>
+        <a:ea typeface="Arial" charset="0"/>
+        <a:cs typeface="Arial" charset="0"/>
+        <a:sym typeface="Arial" charset="0"/>
       </a:defRPr>
     </a:lvl7pPr>
-    <a:lvl8pPr marR="0" lvl="7" algn="l" rtl="0">
-      <a:lnSpc>
-        <a:spcPct val="100000"/>
-      </a:lnSpc>
-      <a:spcBef>
-        <a:spcPts val="0"/>
-      </a:spcBef>
-      <a:spcAft>
-        <a:spcPts val="0"/>
-      </a:spcAft>
-      <a:buNone/>
-      <a:defRPr sz="1400" b="0" i="0" u="none" strike="noStrike" cap="none">
+    <a:lvl8pPr marL="3200400" algn="l" defTabSz="914400" rtl="0" eaLnBrk="1" latinLnBrk="0" hangingPunct="1">
+      <a:defRPr sz="1400" kern="1200">
         <a:solidFill>
           <a:srgbClr val="000000"/>
         </a:solidFill>
-        <a:latin typeface="Arial"/>
-        <a:ea typeface="Arial"/>
-        <a:cs typeface="Arial"/>
-        <a:sym typeface="Arial"/>
+        <a:latin typeface="Arial" charset="0"/>
+        <a:ea typeface="Arial" charset="0"/>
+        <a:cs typeface="Arial" charset="0"/>
+        <a:sym typeface="Arial" charset="0"/>
       </a:defRPr>
     </a:lvl8pPr>
-    <a:lvl9pPr marR="0" lvl="8" algn="l" rtl="0">
-      <a:lnSpc>
-        <a:spcPct val="100000"/>
-      </a:lnSpc>
-      <a:spcBef>
-        <a:spcPts val="0"/>
-      </a:spcBef>
-      <a:spcAft>
-        <a:spcPts val="0"/>
-      </a:spcAft>
-      <a:buNone/>
-      <a:defRPr sz="1400" b="0" i="0" u="none" strike="noStrike" cap="none">
+    <a:lvl9pPr marL="3657600" algn="l" defTabSz="914400" rtl="0" eaLnBrk="1" latinLnBrk="0" hangingPunct="1">
+      <a:defRPr sz="1400" kern="1200">
         <a:solidFill>
           <a:srgbClr val="000000"/>
         </a:solidFill>
-        <a:latin typeface="Arial"/>
-        <a:ea typeface="Arial"/>
-        <a:cs typeface="Arial"/>
-        <a:sym typeface="Arial"/>
+        <a:latin typeface="Arial" charset="0"/>
+        <a:ea typeface="Arial" charset="0"/>
+        <a:cs typeface="Arial" charset="0"/>
+        <a:sym typeface="Arial" charset="0"/>
       </a:defRPr>
     </a:lvl9pPr>
   </p:defaultTextStyle>
-  <p:extLst>
-    <p:ext uri="{EFAFB233-063F-42B5-8137-9DF3F51BA10A}">
-      <p15:sldGuideLst xmlns:p15="http://schemas.microsoft.com/office/powerpoint/2012/main"/>
-    </p:ext>
-  </p:extLst>
 </p:presentation>
 </file>
 
-<file path=ppt/notesMasters/notesMaster1.xml><?xml version="1.0" encoding="utf-8"?>
-<p:notesMaster xmlns:a="http://schemas.openxmlformats.org/drawingml/2006/main" xmlns:r="http://schemas.openxmlformats.org/officeDocument/2006/relationships" xmlns:p="http://schemas.openxmlformats.org/presentationml/2006/main">
+<file path=ppt/handoutMasters/handoutMaster1.xml><?xml version="1.0" encoding="utf-8"?>
+<p:handoutMaster xmlns:a="http://schemas.openxmlformats.org/drawingml/2006/main" xmlns:r="http://schemas.openxmlformats.org/officeDocument/2006/relationships" xmlns:p="http://schemas.openxmlformats.org/presentationml/2006/main">
   <p:cSld>
     <p:bg>
       <p:bgRef idx="1001">
@@ -232,7 +162,7 @@
     </p:bg>
     <p:spTree>
       <p:nvGrpSpPr>
-        <p:cNvPr id="1" name="Shape 2"/>
+        <p:cNvPr id="1" name=""/>
         <p:cNvGrpSpPr/>
         <p:nvPr/>
       </p:nvGrpSpPr>
@@ -246,7 +176,283 @@
       </p:grpSpPr>
       <p:sp>
         <p:nvSpPr>
-          <p:cNvPr id="3" name="Shape 3"/>
+          <p:cNvPr id="13314" name="Header Placeholder 1"/>
+          <p:cNvSpPr>
+            <a:spLocks noGrp="1"/>
+          </p:cNvSpPr>
+          <p:nvPr>
+            <p:ph type="hdr" sz="quarter"/>
+          </p:nvPr>
+        </p:nvSpPr>
+        <p:spPr bwMode="auto">
+          <a:xfrm>
+            <a:off x="0" y="0"/>
+            <a:ext cx="2971800" cy="458788"/>
+          </a:xfrm>
+          <a:prstGeom prst="rect">
+            <a:avLst/>
+          </a:prstGeom>
+          <a:noFill/>
+          <a:ln>
+            <a:noFill/>
+          </a:ln>
+          <a:extLst>
+            <a:ext uri="{909E8E84-426E-40DD-AFC4-6F175D3DCCD1}">
+              <a14:hiddenFill xmlns:a14="http://schemas.microsoft.com/office/drawing/2010/main">
+                <a:solidFill>
+                  <a:srgbClr val="FFFFFF"/>
+                </a:solidFill>
+              </a14:hiddenFill>
+            </a:ext>
+            <a:ext uri="{91240B29-F687-4F45-9708-019B960494DF}">
+              <a14:hiddenLine xmlns:a14="http://schemas.microsoft.com/office/drawing/2010/main" w="9525">
+                <a:solidFill>
+                  <a:srgbClr val="000000"/>
+                </a:solidFill>
+                <a:miter lim="800000"/>
+                <a:headEnd/>
+                <a:tailEnd/>
+              </a14:hiddenLine>
+            </a:ext>
+            <a:ext uri="{FAA26D3D-D897-4be2-8F04-BA451C77F1D7}">
+              <ma14:placeholderFlag xmlns:ma14="http://schemas.microsoft.com/office/mac/drawingml/2011/main" val="1"/>
+            </a:ext>
+          </a:extLst>
+        </p:spPr>
+        <p:txBody>
+          <a:bodyPr vert="horz" wrap="square" lIns="91440" tIns="45720" rIns="91440" bIns="45720" numCol="1" anchor="t" anchorCtr="0" compatLnSpc="1">
+            <a:prstTxWarp prst="textNoShape">
+              <a:avLst/>
+            </a:prstTxWarp>
+          </a:bodyPr>
+          <a:lstStyle>
+            <a:lvl1pPr eaLnBrk="1" hangingPunct="1">
+              <a:defRPr sz="1200"/>
+            </a:lvl1pPr>
+          </a:lstStyle>
+          <a:p>
+            <a:endParaRPr lang="en-US" altLang="en-US"/>
+          </a:p>
+        </p:txBody>
+      </p:sp>
+      <p:sp>
+        <p:nvSpPr>
+          <p:cNvPr id="13315" name="Date Placeholder 2"/>
+          <p:cNvSpPr>
+            <a:spLocks noGrp="1"/>
+          </p:cNvSpPr>
+          <p:nvPr>
+            <p:ph type="dt" sz="quarter" idx="1"/>
+          </p:nvPr>
+        </p:nvSpPr>
+        <p:spPr bwMode="auto">
+          <a:xfrm>
+            <a:off x="3884613" y="0"/>
+            <a:ext cx="2971800" cy="458788"/>
+          </a:xfrm>
+          <a:prstGeom prst="rect">
+            <a:avLst/>
+          </a:prstGeom>
+          <a:noFill/>
+          <a:ln>
+            <a:noFill/>
+          </a:ln>
+          <a:extLst>
+            <a:ext uri="{909E8E84-426E-40DD-AFC4-6F175D3DCCD1}">
+              <a14:hiddenFill xmlns:a14="http://schemas.microsoft.com/office/drawing/2010/main">
+                <a:solidFill>
+                  <a:srgbClr val="FFFFFF"/>
+                </a:solidFill>
+              </a14:hiddenFill>
+            </a:ext>
+            <a:ext uri="{91240B29-F687-4F45-9708-019B960494DF}">
+              <a14:hiddenLine xmlns:a14="http://schemas.microsoft.com/office/drawing/2010/main" w="9525">
+                <a:solidFill>
+                  <a:srgbClr val="000000"/>
+                </a:solidFill>
+                <a:miter lim="800000"/>
+                <a:headEnd/>
+                <a:tailEnd/>
+              </a14:hiddenLine>
+            </a:ext>
+          </a:extLst>
+        </p:spPr>
+        <p:txBody>
+          <a:bodyPr vert="horz" wrap="square" lIns="91440" tIns="45720" rIns="91440" bIns="45720" numCol="1" anchor="t" anchorCtr="0" compatLnSpc="1">
+            <a:prstTxWarp prst="textNoShape">
+              <a:avLst/>
+            </a:prstTxWarp>
+          </a:bodyPr>
+          <a:lstStyle>
+            <a:lvl1pPr algn="r" eaLnBrk="1" hangingPunct="1">
+              <a:defRPr sz="1200"/>
+            </a:lvl1pPr>
+          </a:lstStyle>
+          <a:p>
+            <a:fld id="{9133ABBB-5F53-7541-84FD-0FB9FCA4BE94}" type="datetimeFigureOut">
+              <a:rPr lang="en-US" altLang="en-US"/>
+              <a:pPr/>
+              <a:t>10/20/16</a:t>
+            </a:fld>
+            <a:endParaRPr lang="en-US" altLang="en-US"/>
+          </a:p>
+        </p:txBody>
+      </p:sp>
+      <p:sp>
+        <p:nvSpPr>
+          <p:cNvPr id="13316" name="Footer Placeholder 3"/>
+          <p:cNvSpPr>
+            <a:spLocks noGrp="1"/>
+          </p:cNvSpPr>
+          <p:nvPr>
+            <p:ph type="ftr" sz="quarter" idx="2"/>
+          </p:nvPr>
+        </p:nvSpPr>
+        <p:spPr bwMode="auto">
+          <a:xfrm>
+            <a:off x="0" y="8685213"/>
+            <a:ext cx="2971800" cy="458787"/>
+          </a:xfrm>
+          <a:prstGeom prst="rect">
+            <a:avLst/>
+          </a:prstGeom>
+          <a:noFill/>
+          <a:ln>
+            <a:noFill/>
+          </a:ln>
+          <a:extLst>
+            <a:ext uri="{909E8E84-426E-40DD-AFC4-6F175D3DCCD1}">
+              <a14:hiddenFill xmlns:a14="http://schemas.microsoft.com/office/drawing/2010/main">
+                <a:solidFill>
+                  <a:srgbClr val="FFFFFF"/>
+                </a:solidFill>
+              </a14:hiddenFill>
+            </a:ext>
+            <a:ext uri="{91240B29-F687-4F45-9708-019B960494DF}">
+              <a14:hiddenLine xmlns:a14="http://schemas.microsoft.com/office/drawing/2010/main" w="9525">
+                <a:solidFill>
+                  <a:srgbClr val="000000"/>
+                </a:solidFill>
+                <a:miter lim="800000"/>
+                <a:headEnd/>
+                <a:tailEnd/>
+              </a14:hiddenLine>
+            </a:ext>
+            <a:ext uri="{FAA26D3D-D897-4be2-8F04-BA451C77F1D7}">
+              <ma14:placeholderFlag xmlns:ma14="http://schemas.microsoft.com/office/mac/drawingml/2011/main" val="1"/>
+            </a:ext>
+          </a:extLst>
+        </p:spPr>
+        <p:txBody>
+          <a:bodyPr vert="horz" wrap="square" lIns="91440" tIns="45720" rIns="91440" bIns="45720" numCol="1" anchor="b" anchorCtr="0" compatLnSpc="1">
+            <a:prstTxWarp prst="textNoShape">
+              <a:avLst/>
+            </a:prstTxWarp>
+          </a:bodyPr>
+          <a:lstStyle>
+            <a:lvl1pPr eaLnBrk="1" hangingPunct="1">
+              <a:defRPr sz="1200"/>
+            </a:lvl1pPr>
+          </a:lstStyle>
+          <a:p>
+            <a:endParaRPr lang="en-US" altLang="en-US"/>
+          </a:p>
+        </p:txBody>
+      </p:sp>
+      <p:sp>
+        <p:nvSpPr>
+          <p:cNvPr id="13317" name="Slide Number Placeholder 4"/>
+          <p:cNvSpPr>
+            <a:spLocks noGrp="1"/>
+          </p:cNvSpPr>
+          <p:nvPr>
+            <p:ph type="sldNum" sz="quarter" idx="3"/>
+          </p:nvPr>
+        </p:nvSpPr>
+        <p:spPr bwMode="auto">
+          <a:xfrm>
+            <a:off x="3884613" y="8685213"/>
+            <a:ext cx="2971800" cy="458787"/>
+          </a:xfrm>
+          <a:prstGeom prst="rect">
+            <a:avLst/>
+          </a:prstGeom>
+          <a:noFill/>
+          <a:ln>
+            <a:noFill/>
+          </a:ln>
+          <a:extLst>
+            <a:ext uri="{909E8E84-426E-40DD-AFC4-6F175D3DCCD1}">
+              <a14:hiddenFill xmlns:a14="http://schemas.microsoft.com/office/drawing/2010/main">
+                <a:solidFill>
+                  <a:srgbClr val="FFFFFF"/>
+                </a:solidFill>
+              </a14:hiddenFill>
+            </a:ext>
+            <a:ext uri="{91240B29-F687-4F45-9708-019B960494DF}">
+              <a14:hiddenLine xmlns:a14="http://schemas.microsoft.com/office/drawing/2010/main" w="9525">
+                <a:solidFill>
+                  <a:srgbClr val="000000"/>
+                </a:solidFill>
+                <a:miter lim="800000"/>
+                <a:headEnd/>
+                <a:tailEnd/>
+              </a14:hiddenLine>
+            </a:ext>
+          </a:extLst>
+        </p:spPr>
+        <p:txBody>
+          <a:bodyPr vert="horz" wrap="square" lIns="91440" tIns="45720" rIns="91440" bIns="45720" numCol="1" anchor="b" anchorCtr="0" compatLnSpc="1">
+            <a:prstTxWarp prst="textNoShape">
+              <a:avLst/>
+            </a:prstTxWarp>
+          </a:bodyPr>
+          <a:lstStyle>
+            <a:lvl1pPr algn="r" eaLnBrk="1" hangingPunct="1">
+              <a:defRPr sz="1200"/>
+            </a:lvl1pPr>
+          </a:lstStyle>
+          <a:p>
+            <a:fld id="{F42522F8-520A-ED43-9F7E-CD7B6F33E3DD}" type="slidenum">
+              <a:rPr lang="en-US" altLang="en-US"/>
+              <a:pPr/>
+              <a:t>‹#›</a:t>
+            </a:fld>
+            <a:endParaRPr lang="en-US" altLang="en-US"/>
+          </a:p>
+        </p:txBody>
+      </p:sp>
+    </p:spTree>
+  </p:cSld>
+  <p:clrMap bg1="lt1" tx1="dk1" bg2="lt2" tx2="dk2" accent1="accent1" accent2="accent2" accent3="accent3" accent4="accent4" accent5="accent5" accent6="accent6" hlink="hlink" folHlink="folHlink"/>
+</p:handoutMaster>
+</file>
+
+<file path=ppt/notesMasters/notesMaster1.xml><?xml version="1.0" encoding="utf-8"?>
+<p:notesMaster xmlns:a="http://schemas.openxmlformats.org/drawingml/2006/main" xmlns:r="http://schemas.openxmlformats.org/officeDocument/2006/relationships" xmlns:p="http://schemas.openxmlformats.org/presentationml/2006/main">
+  <p:cSld>
+    <p:bg>
+      <p:bgRef idx="1001">
+        <a:schemeClr val="bg1"/>
+      </p:bgRef>
+    </p:bg>
+    <p:spTree>
+      <p:nvGrpSpPr>
+        <p:cNvPr id="1" name=""/>
+        <p:cNvGrpSpPr/>
+        <p:nvPr/>
+      </p:nvGrpSpPr>
+      <p:grpSpPr>
+        <a:xfrm>
+          <a:off x="0" y="0"/>
+          <a:ext cx="0" cy="0"/>
+          <a:chOff x="0" y="0"/>
+          <a:chExt cx="0" cy="0"/>
+        </a:xfrm>
+      </p:grpSpPr>
+      <p:sp>
+        <p:nvSpPr>
+          <p:cNvPr id="12290" name="Shape 3"/>
           <p:cNvSpPr>
             <a:spLocks noGrp="1" noRot="1" noChangeAspect="1"/>
           </p:cNvSpPr>
@@ -254,17 +460,48 @@
             <p:ph type="sldImg" idx="2"/>
           </p:nvPr>
         </p:nvSpPr>
-        <p:spPr>
+        <p:spPr bwMode="auto">
           <a:xfrm>
-            <a:off x="381300" y="685800"/>
-            <a:ext cx="6096075" cy="3429000"/>
+            <a:off x="1143000" y="685800"/>
+            <a:ext cx="4572000" cy="3429000"/>
           </a:xfrm>
           <a:custGeom>
             <a:avLst/>
-            <a:gdLst/>
+            <a:gdLst>
+              <a:gd name="T0" fmla="*/ 0 w 120000"/>
+              <a:gd name="T1" fmla="*/ 0 h 120000"/>
+              <a:gd name="T2" fmla="*/ 120000 w 120000"/>
+              <a:gd name="T3" fmla="*/ 0 h 120000"/>
+              <a:gd name="T4" fmla="*/ 120000 w 120000"/>
+              <a:gd name="T5" fmla="*/ 120000 h 120000"/>
+              <a:gd name="T6" fmla="*/ 0 w 120000"/>
+              <a:gd name="T7" fmla="*/ 120000 h 120000"/>
+              <a:gd name="T8" fmla="*/ 0 w 120000"/>
+              <a:gd name="T9" fmla="*/ 0 h 120000"/>
+              <a:gd name="T10" fmla="*/ 0 w 120000"/>
+              <a:gd name="T11" fmla="*/ 0 h 120000"/>
+              <a:gd name="T12" fmla="*/ 120000 w 120000"/>
+              <a:gd name="T13" fmla="*/ 120000 h 120000"/>
+            </a:gdLst>
             <a:ahLst/>
-            <a:cxnLst/>
-            <a:rect l="0" t="0" r="0" b="0"/>
+            <a:cxnLst>
+              <a:cxn ang="0">
+                <a:pos x="T0" y="T1"/>
+              </a:cxn>
+              <a:cxn ang="0">
+                <a:pos x="T2" y="T3"/>
+              </a:cxn>
+              <a:cxn ang="0">
+                <a:pos x="T4" y="T5"/>
+              </a:cxn>
+              <a:cxn ang="0">
+                <a:pos x="T6" y="T7"/>
+              </a:cxn>
+              <a:cxn ang="0">
+                <a:pos x="T8" y="T9"/>
+              </a:cxn>
+            </a:cxnLst>
+            <a:rect l="T10" t="T11" r="T12" b="T13"/>
             <a:pathLst>
               <a:path w="120000" h="120000" extrusionOk="0">
                 <a:moveTo>
@@ -278,6 +515,9 @@
                 </a:lnTo>
                 <a:lnTo>
                   <a:pt x="0" y="120000"/>
+                </a:lnTo>
+                <a:lnTo>
+                  <a:pt x="0" y="0"/>
                 </a:lnTo>
                 <a:close/>
               </a:path>
@@ -293,6 +533,18 @@
             <a:headEnd type="none" w="med" len="med"/>
             <a:tailEnd type="none" w="med" len="med"/>
           </a:ln>
+          <a:extLst>
+            <a:ext uri="{909E8E84-426E-40DD-AFC4-6F175D3DCCD1}">
+              <a14:hiddenFill xmlns:a14="http://schemas.microsoft.com/office/drawing/2010/main">
+                <a:solidFill>
+                  <a:srgbClr val="FFFFFF"/>
+                </a:solidFill>
+              </a14:hiddenFill>
+            </a:ext>
+            <a:ext uri="{FAA26D3D-D897-4be2-8F04-BA451C77F1D7}">
+              <ma14:placeholderFlag xmlns:ma14="http://schemas.microsoft.com/office/mac/drawingml/2011/main" val="1"/>
+            </a:ext>
+          </a:extLst>
         </p:spPr>
       </p:sp>
       <p:sp>
@@ -377,20 +629,22 @@
             </a:lvl9pPr>
           </a:lstStyle>
           <a:p>
-            <a:endParaRPr/>
+            <a:pPr lvl="0"/>
+            <a:endParaRPr noProof="0"/>
           </a:p>
         </p:txBody>
       </p:sp>
     </p:spTree>
-    <p:extLst>
-      <p:ext uri="{BB962C8B-B14F-4D97-AF65-F5344CB8AC3E}">
-        <p14:creationId xmlns:p14="http://schemas.microsoft.com/office/powerpoint/2010/main" val="4242542681"/>
-      </p:ext>
-    </p:extLst>
   </p:cSld>
   <p:clrMap bg1="lt1" tx1="dk1" bg2="dk2" tx2="lt2" accent1="accent1" accent2="accent2" accent3="accent3" accent4="accent4" accent5="accent5" accent6="accent6" hlink="hlink" folHlink="folHlink"/>
   <p:notesStyle>
-    <a:lvl1pPr marL="0" algn="l" defTabSz="914400" rtl="0" eaLnBrk="1" latinLnBrk="0" hangingPunct="1">
+    <a:lvl1pPr algn="l" rtl="0" fontAlgn="base">
+      <a:spcBef>
+        <a:spcPct val="30000"/>
+      </a:spcBef>
+      <a:spcAft>
+        <a:spcPct val="0"/>
+      </a:spcAft>
       <a:defRPr sz="1200" kern="1200">
         <a:solidFill>
           <a:schemeClr val="tx1"/>
@@ -400,7 +654,13 @@
         <a:cs typeface="+mn-cs"/>
       </a:defRPr>
     </a:lvl1pPr>
-    <a:lvl2pPr marL="457200" algn="l" defTabSz="914400" rtl="0" eaLnBrk="1" latinLnBrk="0" hangingPunct="1">
+    <a:lvl2pPr marL="742950" indent="-285750" algn="l" rtl="0" fontAlgn="base">
+      <a:spcBef>
+        <a:spcPct val="30000"/>
+      </a:spcBef>
+      <a:spcAft>
+        <a:spcPct val="0"/>
+      </a:spcAft>
       <a:defRPr sz="1200" kern="1200">
         <a:solidFill>
           <a:schemeClr val="tx1"/>
@@ -410,7 +670,13 @@
         <a:cs typeface="+mn-cs"/>
       </a:defRPr>
     </a:lvl2pPr>
-    <a:lvl3pPr marL="914400" algn="l" defTabSz="914400" rtl="0" eaLnBrk="1" latinLnBrk="0" hangingPunct="1">
+    <a:lvl3pPr marL="1143000" indent="-228600" algn="l" rtl="0" fontAlgn="base">
+      <a:spcBef>
+        <a:spcPct val="30000"/>
+      </a:spcBef>
+      <a:spcAft>
+        <a:spcPct val="0"/>
+      </a:spcAft>
       <a:defRPr sz="1200" kern="1200">
         <a:solidFill>
           <a:schemeClr val="tx1"/>
@@ -420,7 +686,13 @@
         <a:cs typeface="+mn-cs"/>
       </a:defRPr>
     </a:lvl3pPr>
-    <a:lvl4pPr marL="1371600" algn="l" defTabSz="914400" rtl="0" eaLnBrk="1" latinLnBrk="0" hangingPunct="1">
+    <a:lvl4pPr marL="1600200" indent="-228600" algn="l" rtl="0" fontAlgn="base">
+      <a:spcBef>
+        <a:spcPct val="30000"/>
+      </a:spcBef>
+      <a:spcAft>
+        <a:spcPct val="0"/>
+      </a:spcAft>
       <a:defRPr sz="1200" kern="1200">
         <a:solidFill>
           <a:schemeClr val="tx1"/>
@@ -430,7 +702,13 @@
         <a:cs typeface="+mn-cs"/>
       </a:defRPr>
     </a:lvl4pPr>
-    <a:lvl5pPr marL="1828800" algn="l" defTabSz="914400" rtl="0" eaLnBrk="1" latinLnBrk="0" hangingPunct="1">
+    <a:lvl5pPr marL="2057400" indent="-228600" algn="l" rtl="0" fontAlgn="base">
+      <a:spcBef>
+        <a:spcPct val="30000"/>
+      </a:spcBef>
+      <a:spcAft>
+        <a:spcPct val="0"/>
+      </a:spcAft>
       <a:defRPr sz="1200" kern="1200">
         <a:solidFill>
           <a:schemeClr val="tx1"/>
@@ -489,7 +767,7 @@
   <p:cSld>
     <p:spTree>
       <p:nvGrpSpPr>
-        <p:cNvPr id="1" name="Shape 73"/>
+        <p:cNvPr id="1" name=""/>
         <p:cNvGrpSpPr/>
         <p:nvPr/>
       </p:nvGrpSpPr>
@@ -503,9 +781,9 @@
       </p:grpSpPr>
       <p:sp>
         <p:nvSpPr>
-          <p:cNvPr id="74" name="Shape 74"/>
+          <p:cNvPr id="15361" name="Shape 74"/>
           <p:cNvSpPr>
-            <a:spLocks noGrp="1" noRot="1" noChangeAspect="1"/>
+            <a:spLocks noGrp="1" noRot="1" noChangeAspect="1" noTextEdit="1"/>
           </p:cNvSpPr>
           <p:nvPr>
             <p:ph type="sldImg" idx="2"/>
@@ -513,38 +791,19 @@
         </p:nvSpPr>
         <p:spPr>
           <a:xfrm>
-            <a:off x="381000" y="685800"/>
-            <a:ext cx="6096000" cy="3429000"/>
+            <a:off x="1143000" y="685800"/>
+            <a:ext cx="4572000" cy="3429000"/>
           </a:xfrm>
-          <a:custGeom>
-            <a:avLst/>
-            <a:gdLst/>
-            <a:ahLst/>
-            <a:cxnLst/>
-            <a:rect l="0" t="0" r="0" b="0"/>
-            <a:pathLst>
-              <a:path w="120000" h="120000" extrusionOk="0">
-                <a:moveTo>
-                  <a:pt x="0" y="0"/>
-                </a:moveTo>
-                <a:lnTo>
-                  <a:pt x="120000" y="0"/>
-                </a:lnTo>
-                <a:lnTo>
-                  <a:pt x="120000" y="120000"/>
-                </a:lnTo>
-                <a:lnTo>
-                  <a:pt x="0" y="120000"/>
-                </a:lnTo>
-                <a:close/>
-              </a:path>
-            </a:pathLst>
-          </a:custGeom>
+          <a:noFill/>
+          <a:ln>
+            <a:headEnd/>
+            <a:tailEnd/>
+          </a:ln>
         </p:spPr>
       </p:sp>
       <p:sp>
         <p:nvSpPr>
-          <p:cNvPr id="75" name="Shape 75"/>
+          <p:cNvPr id="15362" name="Shape 75"/>
           <p:cNvSpPr txBox="1">
             <a:spLocks noGrp="1"/>
           </p:cNvSpPr>
@@ -552,37 +811,49 @@
             <p:ph type="body" idx="1"/>
           </p:nvPr>
         </p:nvSpPr>
-        <p:spPr>
-          <a:xfrm>
-            <a:off x="685800" y="4343400"/>
-            <a:ext cx="5486400" cy="4114800"/>
-          </a:xfrm>
-          <a:prstGeom prst="rect">
-            <a:avLst/>
-          </a:prstGeom>
+        <p:spPr bwMode="auto">
+          <a:noFill/>
+          <a:extLst>
+            <a:ext uri="{909E8E84-426E-40DD-AFC4-6F175D3DCCD1}">
+              <a14:hiddenFill xmlns:a14="http://schemas.microsoft.com/office/drawing/2010/main">
+                <a:solidFill>
+                  <a:srgbClr val="FFFFFF"/>
+                </a:solidFill>
+              </a14:hiddenFill>
+            </a:ext>
+            <a:ext uri="{91240B29-F687-4F45-9708-019B960494DF}">
+              <a14:hiddenLine xmlns:a14="http://schemas.microsoft.com/office/drawing/2010/main" w="9525">
+                <a:solidFill>
+                  <a:srgbClr val="000000"/>
+                </a:solidFill>
+                <a:miter lim="800000"/>
+                <a:headEnd/>
+                <a:tailEnd/>
+              </a14:hiddenLine>
+            </a:ext>
+            <a:ext uri="{FAA26D3D-D897-4be2-8F04-BA451C77F1D7}">
+              <ma14:placeholderFlag xmlns:ma14="http://schemas.microsoft.com/office/mac/drawingml/2011/main" val="1"/>
+            </a:ext>
+          </a:extLst>
         </p:spPr>
         <p:txBody>
-          <a:bodyPr lIns="91425" tIns="91425" rIns="91425" bIns="91425" anchor="t" anchorCtr="0">
-            <a:noAutofit/>
+          <a:bodyPr vert="horz" wrap="square" numCol="1" compatLnSpc="1">
+            <a:prstTxWarp prst="textNoShape">
+              <a:avLst/>
+            </a:prstTxWarp>
           </a:bodyPr>
           <a:lstStyle/>
           <a:p>
-            <a:pPr lvl="0" rtl="0">
-              <a:spcBef>
-                <a:spcPts val="0"/>
-              </a:spcBef>
-              <a:buNone/>
+            <a:pPr>
+              <a:spcBef>
+                <a:spcPct val="0"/>
+              </a:spcBef>
             </a:pPr>
-            <a:endParaRPr/>
+            <a:endParaRPr lang="en-US" altLang="en-US"/>
           </a:p>
         </p:txBody>
       </p:sp>
     </p:spTree>
-    <p:extLst>
-      <p:ext uri="{BB962C8B-B14F-4D97-AF65-F5344CB8AC3E}">
-        <p14:creationId xmlns:p14="http://schemas.microsoft.com/office/powerpoint/2010/main" val="3805072265"/>
-      </p:ext>
-    </p:extLst>
   </p:cSld>
   <p:clrMapOvr>
     <a:masterClrMapping/>
@@ -619,15 +890,15 @@
         </p:nvSpPr>
         <p:spPr>
           <a:xfrm>
-            <a:off x="311708" y="744575"/>
-            <a:ext cx="8520600" cy="2052600"/>
+            <a:off x="311708" y="992767"/>
+            <a:ext cx="8520600" cy="2736800"/>
           </a:xfrm>
           <a:prstGeom prst="rect">
             <a:avLst/>
           </a:prstGeom>
         </p:spPr>
         <p:txBody>
-          <a:bodyPr lIns="91425" tIns="91425" rIns="91425" bIns="91425" anchor="b" anchorCtr="0"/>
+          <a:bodyPr anchor="b"/>
           <a:lstStyle>
             <a:lvl1pPr lvl="0" algn="ctr">
               <a:spcBef>
@@ -710,15 +981,15 @@
         </p:nvSpPr>
         <p:spPr>
           <a:xfrm>
-            <a:off x="311700" y="2834125"/>
-            <a:ext cx="8520600" cy="792600"/>
+            <a:off x="311700" y="3778833"/>
+            <a:ext cx="8520600" cy="1056800"/>
           </a:xfrm>
           <a:prstGeom prst="rect">
             <a:avLst/>
           </a:prstGeom>
         </p:spPr>
         <p:txBody>
-          <a:bodyPr lIns="91425" tIns="91425" rIns="91425" bIns="91425" anchor="t" anchorCtr="0"/>
+          <a:bodyPr/>
           <a:lstStyle>
             <a:lvl1pPr lvl="0" algn="ctr">
               <a:lnSpc>
@@ -854,44 +1125,42 @@
       </p:sp>
       <p:sp>
         <p:nvSpPr>
-          <p:cNvPr id="12" name="Shape 12"/>
+          <p:cNvPr id="4" name="Shape 12"/>
           <p:cNvSpPr txBox="1">
             <a:spLocks noGrp="1"/>
           </p:cNvSpPr>
           <p:nvPr>
-            <p:ph type="sldNum" idx="12"/>
+            <p:ph type="sldNum" idx="10"/>
           </p:nvPr>
         </p:nvSpPr>
-        <p:spPr>
-          <a:xfrm>
-            <a:off x="8472457" y="4663216"/>
-            <a:ext cx="548700" cy="393600"/>
-          </a:xfrm>
-          <a:prstGeom prst="rect">
-            <a:avLst/>
-          </a:prstGeom>
-        </p:spPr>
+        <p:spPr/>
         <p:txBody>
-          <a:bodyPr lIns="91425" tIns="91425" rIns="91425" bIns="91425" anchor="ctr" anchorCtr="0">
-            <a:noAutofit/>
-          </a:bodyPr>
-          <a:lstStyle/>
+          <a:bodyPr/>
+          <a:lstStyle>
+            <a:lvl1pPr algn="l">
+              <a:defRPr sz="1400">
+                <a:solidFill>
+                  <a:srgbClr val="000000"/>
+                </a:solidFill>
+              </a:defRPr>
+            </a:lvl1pPr>
+          </a:lstStyle>
           <a:p>
-            <a:pPr lvl="0">
-              <a:spcBef>
-                <a:spcPts val="0"/>
-              </a:spcBef>
-              <a:buNone/>
-            </a:pPr>
-            <a:fld id="{00000000-1234-1234-1234-123412341234}" type="slidenum">
-              <a:rPr lang="en"/>
+            <a:fld id="{9BC386B7-7206-9740-89C8-AC30EE8BA824}" type="slidenum">
+              <a:rPr lang="en-US" altLang="en-US"/>
+              <a:pPr/>
               <a:t>‹#›</a:t>
             </a:fld>
-            <a:endParaRPr lang="en"/>
+            <a:endParaRPr lang="en-US" altLang="en-US"/>
           </a:p>
         </p:txBody>
       </p:sp>
     </p:spTree>
+    <p:extLst>
+      <p:ext uri="{BB962C8B-B14F-4D97-AF65-F5344CB8AC3E}">
+        <p14:creationId xmlns:p14="http://schemas.microsoft.com/office/powerpoint/2010/main" val="540081553"/>
+      </p:ext>
+    </p:extLst>
   </p:cSld>
   <p:clrMapOvr>
     <a:masterClrMapping/>
@@ -918,44 +1187,42 @@
       </p:grpSpPr>
       <p:sp>
         <p:nvSpPr>
-          <p:cNvPr id="49" name="Shape 49"/>
+          <p:cNvPr id="2" name="Shape 49"/>
           <p:cNvSpPr txBox="1">
             <a:spLocks noGrp="1"/>
           </p:cNvSpPr>
           <p:nvPr>
-            <p:ph type="sldNum" idx="12"/>
+            <p:ph type="sldNum" idx="10"/>
           </p:nvPr>
         </p:nvSpPr>
-        <p:spPr>
-          <a:xfrm>
-            <a:off x="8472457" y="4663216"/>
-            <a:ext cx="548700" cy="393600"/>
-          </a:xfrm>
-          <a:prstGeom prst="rect">
-            <a:avLst/>
-          </a:prstGeom>
-        </p:spPr>
+        <p:spPr/>
         <p:txBody>
-          <a:bodyPr lIns="91425" tIns="91425" rIns="91425" bIns="91425" anchor="ctr" anchorCtr="0">
-            <a:noAutofit/>
-          </a:bodyPr>
-          <a:lstStyle/>
+          <a:bodyPr/>
+          <a:lstStyle>
+            <a:lvl1pPr algn="l">
+              <a:defRPr sz="1400">
+                <a:solidFill>
+                  <a:srgbClr val="000000"/>
+                </a:solidFill>
+              </a:defRPr>
+            </a:lvl1pPr>
+          </a:lstStyle>
           <a:p>
-            <a:pPr lvl="0">
-              <a:spcBef>
-                <a:spcPts val="0"/>
-              </a:spcBef>
-              <a:buNone/>
-            </a:pPr>
-            <a:fld id="{00000000-1234-1234-1234-123412341234}" type="slidenum">
-              <a:rPr lang="en"/>
+            <a:fld id="{EBD7374F-B034-E04F-A1F7-D71F191B4C00}" type="slidenum">
+              <a:rPr lang="en-US" altLang="en-US"/>
+              <a:pPr/>
               <a:t>‹#›</a:t>
             </a:fld>
-            <a:endParaRPr lang="en"/>
+            <a:endParaRPr lang="en-US" altLang="en-US"/>
           </a:p>
         </p:txBody>
       </p:sp>
     </p:spTree>
+    <p:extLst>
+      <p:ext uri="{BB962C8B-B14F-4D97-AF65-F5344CB8AC3E}">
+        <p14:creationId xmlns:p14="http://schemas.microsoft.com/office/powerpoint/2010/main" val="1742802740"/>
+      </p:ext>
+    </p:extLst>
   </p:cSld>
   <p:clrMapOvr>
     <a:masterClrMapping/>
@@ -992,15 +1259,15 @@
         </p:nvSpPr>
         <p:spPr>
           <a:xfrm>
-            <a:off x="311700" y="445025"/>
-            <a:ext cx="8520600" cy="572700"/>
+            <a:off x="311700" y="593367"/>
+            <a:ext cx="8520600" cy="763600"/>
           </a:xfrm>
           <a:prstGeom prst="rect">
             <a:avLst/>
           </a:prstGeom>
         </p:spPr>
         <p:txBody>
-          <a:bodyPr lIns="91425" tIns="91425" rIns="91425" bIns="91425" anchor="t" anchorCtr="0"/>
+          <a:bodyPr/>
           <a:lstStyle>
             <a:lvl1pPr lvl="0">
               <a:spcBef>
@@ -1074,15 +1341,15 @@
         </p:nvSpPr>
         <p:spPr>
           <a:xfrm>
-            <a:off x="311700" y="1152475"/>
-            <a:ext cx="8520600" cy="3416400"/>
+            <a:off x="311700" y="1536633"/>
+            <a:ext cx="8520600" cy="4555200"/>
           </a:xfrm>
           <a:prstGeom prst="rect">
             <a:avLst/>
           </a:prstGeom>
         </p:spPr>
         <p:txBody>
-          <a:bodyPr lIns="91425" tIns="91425" rIns="91425" bIns="91425" anchor="t" anchorCtr="0"/>
+          <a:bodyPr/>
           <a:lstStyle>
             <a:lvl1pPr lvl="0">
               <a:spcBef>
@@ -1146,44 +1413,42 @@
       </p:sp>
       <p:sp>
         <p:nvSpPr>
-          <p:cNvPr id="19" name="Shape 19"/>
+          <p:cNvPr id="4" name="Shape 19"/>
           <p:cNvSpPr txBox="1">
             <a:spLocks noGrp="1"/>
           </p:cNvSpPr>
           <p:nvPr>
-            <p:ph type="sldNum" idx="12"/>
+            <p:ph type="sldNum" idx="10"/>
           </p:nvPr>
         </p:nvSpPr>
-        <p:spPr>
-          <a:xfrm>
-            <a:off x="8472457" y="4663216"/>
-            <a:ext cx="548700" cy="393600"/>
-          </a:xfrm>
-          <a:prstGeom prst="rect">
-            <a:avLst/>
-          </a:prstGeom>
-        </p:spPr>
+        <p:spPr/>
         <p:txBody>
-          <a:bodyPr lIns="91425" tIns="91425" rIns="91425" bIns="91425" anchor="ctr" anchorCtr="0">
-            <a:noAutofit/>
-          </a:bodyPr>
-          <a:lstStyle/>
+          <a:bodyPr/>
+          <a:lstStyle>
+            <a:lvl1pPr algn="l">
+              <a:defRPr sz="1400">
+                <a:solidFill>
+                  <a:srgbClr val="000000"/>
+                </a:solidFill>
+              </a:defRPr>
+            </a:lvl1pPr>
+          </a:lstStyle>
           <a:p>
-            <a:pPr lvl="0">
-              <a:spcBef>
-                <a:spcPts val="0"/>
-              </a:spcBef>
-              <a:buNone/>
-            </a:pPr>
-            <a:fld id="{00000000-1234-1234-1234-123412341234}" type="slidenum">
-              <a:rPr lang="en"/>
+            <a:fld id="{BCBB21ED-0ECA-E14D-A77C-DC1EA6C3A8DD}" type="slidenum">
+              <a:rPr lang="en-US" altLang="en-US"/>
+              <a:pPr/>
               <a:t>‹#›</a:t>
             </a:fld>
-            <a:endParaRPr lang="en"/>
+            <a:endParaRPr lang="en-US" altLang="en-US"/>
           </a:p>
         </p:txBody>
       </p:sp>
     </p:spTree>
+    <p:extLst>
+      <p:ext uri="{BB962C8B-B14F-4D97-AF65-F5344CB8AC3E}">
+        <p14:creationId xmlns:p14="http://schemas.microsoft.com/office/powerpoint/2010/main" val="1884769049"/>
+      </p:ext>
+    </p:extLst>
   </p:cSld>
   <p:clrMapOvr>
     <a:masterClrMapping/>
@@ -1220,15 +1485,15 @@
         </p:nvSpPr>
         <p:spPr>
           <a:xfrm>
-            <a:off x="311700" y="445025"/>
-            <a:ext cx="8520600" cy="572700"/>
+            <a:off x="311700" y="593367"/>
+            <a:ext cx="8520600" cy="763600"/>
           </a:xfrm>
           <a:prstGeom prst="rect">
             <a:avLst/>
           </a:prstGeom>
         </p:spPr>
         <p:txBody>
-          <a:bodyPr lIns="91425" tIns="91425" rIns="91425" bIns="91425" anchor="t" anchorCtr="0"/>
+          <a:bodyPr/>
           <a:lstStyle>
             <a:lvl1pPr lvl="0">
               <a:spcBef>
@@ -1302,15 +1567,15 @@
         </p:nvSpPr>
         <p:spPr>
           <a:xfrm>
-            <a:off x="311700" y="1152475"/>
-            <a:ext cx="3999900" cy="3416400"/>
+            <a:off x="311700" y="1536633"/>
+            <a:ext cx="3999900" cy="4555200"/>
           </a:xfrm>
           <a:prstGeom prst="rect">
             <a:avLst/>
           </a:prstGeom>
         </p:spPr>
         <p:txBody>
-          <a:bodyPr lIns="91425" tIns="91425" rIns="91425" bIns="91425" anchor="t" anchorCtr="0"/>
+          <a:bodyPr/>
           <a:lstStyle>
             <a:lvl1pPr lvl="0">
               <a:spcBef>
@@ -1393,15 +1658,15 @@
         </p:nvSpPr>
         <p:spPr>
           <a:xfrm>
-            <a:off x="4832400" y="1152475"/>
-            <a:ext cx="3999900" cy="3416400"/>
+            <a:off x="4832400" y="1536633"/>
+            <a:ext cx="3999900" cy="4555200"/>
           </a:xfrm>
           <a:prstGeom prst="rect">
             <a:avLst/>
           </a:prstGeom>
         </p:spPr>
         <p:txBody>
-          <a:bodyPr lIns="91425" tIns="91425" rIns="91425" bIns="91425" anchor="t" anchorCtr="0"/>
+          <a:bodyPr/>
           <a:lstStyle>
             <a:lvl1pPr lvl="0">
               <a:spcBef>
@@ -1474,44 +1739,42 @@
       </p:sp>
       <p:sp>
         <p:nvSpPr>
-          <p:cNvPr id="24" name="Shape 24"/>
+          <p:cNvPr id="5" name="Shape 24"/>
           <p:cNvSpPr txBox="1">
             <a:spLocks noGrp="1"/>
           </p:cNvSpPr>
           <p:nvPr>
-            <p:ph type="sldNum" idx="12"/>
+            <p:ph type="sldNum" idx="10"/>
           </p:nvPr>
         </p:nvSpPr>
-        <p:spPr>
-          <a:xfrm>
-            <a:off x="8472457" y="4663216"/>
-            <a:ext cx="548700" cy="393600"/>
-          </a:xfrm>
-          <a:prstGeom prst="rect">
-            <a:avLst/>
-          </a:prstGeom>
-        </p:spPr>
+        <p:spPr/>
         <p:txBody>
-          <a:bodyPr lIns="91425" tIns="91425" rIns="91425" bIns="91425" anchor="ctr" anchorCtr="0">
-            <a:noAutofit/>
-          </a:bodyPr>
-          <a:lstStyle/>
+          <a:bodyPr/>
+          <a:lstStyle>
+            <a:lvl1pPr algn="l">
+              <a:defRPr sz="1400">
+                <a:solidFill>
+                  <a:srgbClr val="000000"/>
+                </a:solidFill>
+              </a:defRPr>
+            </a:lvl1pPr>
+          </a:lstStyle>
           <a:p>
-            <a:pPr lvl="0">
-              <a:spcBef>
-                <a:spcPts val="0"/>
-              </a:spcBef>
-              <a:buNone/>
-            </a:pPr>
-            <a:fld id="{00000000-1234-1234-1234-123412341234}" type="slidenum">
-              <a:rPr lang="en"/>
+            <a:fld id="{700AF996-59A4-7A46-BE8E-702D3FC1E8BF}" type="slidenum">
+              <a:rPr lang="en-US" altLang="en-US"/>
+              <a:pPr/>
               <a:t>‹#›</a:t>
             </a:fld>
-            <a:endParaRPr lang="en"/>
+            <a:endParaRPr lang="en-US" altLang="en-US"/>
           </a:p>
         </p:txBody>
       </p:sp>
     </p:spTree>
+    <p:extLst>
+      <p:ext uri="{BB962C8B-B14F-4D97-AF65-F5344CB8AC3E}">
+        <p14:creationId xmlns:p14="http://schemas.microsoft.com/office/powerpoint/2010/main" val="1929613293"/>
+      </p:ext>
+    </p:extLst>
   </p:cSld>
   <p:clrMapOvr>
     <a:masterClrMapping/>
@@ -1548,15 +1811,15 @@
         </p:nvSpPr>
         <p:spPr>
           <a:xfrm>
-            <a:off x="311700" y="445025"/>
-            <a:ext cx="8520600" cy="572700"/>
+            <a:off x="311700" y="593367"/>
+            <a:ext cx="8520600" cy="763600"/>
           </a:xfrm>
           <a:prstGeom prst="rect">
             <a:avLst/>
           </a:prstGeom>
         </p:spPr>
         <p:txBody>
-          <a:bodyPr lIns="91425" tIns="91425" rIns="91425" bIns="91425" anchor="t" anchorCtr="0"/>
+          <a:bodyPr/>
           <a:lstStyle>
             <a:lvl1pPr lvl="0">
               <a:spcBef>
@@ -1620,44 +1883,42 @@
       </p:sp>
       <p:sp>
         <p:nvSpPr>
-          <p:cNvPr id="27" name="Shape 27"/>
+          <p:cNvPr id="3" name="Shape 27"/>
           <p:cNvSpPr txBox="1">
             <a:spLocks noGrp="1"/>
           </p:cNvSpPr>
           <p:nvPr>
-            <p:ph type="sldNum" idx="12"/>
+            <p:ph type="sldNum" idx="10"/>
           </p:nvPr>
         </p:nvSpPr>
-        <p:spPr>
-          <a:xfrm>
-            <a:off x="8472457" y="4663216"/>
-            <a:ext cx="548700" cy="393600"/>
-          </a:xfrm>
-          <a:prstGeom prst="rect">
-            <a:avLst/>
-          </a:prstGeom>
-        </p:spPr>
+        <p:spPr/>
         <p:txBody>
-          <a:bodyPr lIns="91425" tIns="91425" rIns="91425" bIns="91425" anchor="ctr" anchorCtr="0">
-            <a:noAutofit/>
-          </a:bodyPr>
-          <a:lstStyle/>
+          <a:bodyPr/>
+          <a:lstStyle>
+            <a:lvl1pPr algn="l">
+              <a:defRPr sz="1400">
+                <a:solidFill>
+                  <a:srgbClr val="000000"/>
+                </a:solidFill>
+              </a:defRPr>
+            </a:lvl1pPr>
+          </a:lstStyle>
           <a:p>
-            <a:pPr lvl="0">
-              <a:spcBef>
-                <a:spcPts val="0"/>
-              </a:spcBef>
-              <a:buNone/>
-            </a:pPr>
-            <a:fld id="{00000000-1234-1234-1234-123412341234}" type="slidenum">
-              <a:rPr lang="en"/>
+            <a:fld id="{502F261C-167B-1449-A908-88104E41FB6C}" type="slidenum">
+              <a:rPr lang="en-US" altLang="en-US"/>
+              <a:pPr/>
               <a:t>‹#›</a:t>
             </a:fld>
-            <a:endParaRPr lang="en"/>
+            <a:endParaRPr lang="en-US" altLang="en-US"/>
           </a:p>
         </p:txBody>
       </p:sp>
     </p:spTree>
+    <p:extLst>
+      <p:ext uri="{BB962C8B-B14F-4D97-AF65-F5344CB8AC3E}">
+        <p14:creationId xmlns:p14="http://schemas.microsoft.com/office/powerpoint/2010/main" val="1860062104"/>
+      </p:ext>
+    </p:extLst>
   </p:cSld>
   <p:clrMapOvr>
     <a:masterClrMapping/>
@@ -1694,15 +1955,15 @@
         </p:nvSpPr>
         <p:spPr>
           <a:xfrm>
-            <a:off x="311700" y="555600"/>
-            <a:ext cx="2808000" cy="755700"/>
+            <a:off x="311700" y="740800"/>
+            <a:ext cx="2808000" cy="1007600"/>
           </a:xfrm>
           <a:prstGeom prst="rect">
             <a:avLst/>
           </a:prstGeom>
         </p:spPr>
         <p:txBody>
-          <a:bodyPr lIns="91425" tIns="91425" rIns="91425" bIns="91425" anchor="b" anchorCtr="0"/>
+          <a:bodyPr anchor="b"/>
           <a:lstStyle>
             <a:lvl1pPr lvl="0">
               <a:spcBef>
@@ -1785,15 +2046,15 @@
         </p:nvSpPr>
         <p:spPr>
           <a:xfrm>
-            <a:off x="311700" y="1389600"/>
-            <a:ext cx="2808000" cy="3179400"/>
+            <a:off x="311700" y="1852800"/>
+            <a:ext cx="2808000" cy="4239200"/>
           </a:xfrm>
           <a:prstGeom prst="rect">
             <a:avLst/>
           </a:prstGeom>
         </p:spPr>
         <p:txBody>
-          <a:bodyPr lIns="91425" tIns="91425" rIns="91425" bIns="91425" anchor="t" anchorCtr="0"/>
+          <a:bodyPr/>
           <a:lstStyle>
             <a:lvl1pPr lvl="0">
               <a:spcBef>
@@ -1866,44 +2127,42 @@
       </p:sp>
       <p:sp>
         <p:nvSpPr>
-          <p:cNvPr id="31" name="Shape 31"/>
+          <p:cNvPr id="4" name="Shape 31"/>
           <p:cNvSpPr txBox="1">
             <a:spLocks noGrp="1"/>
           </p:cNvSpPr>
           <p:nvPr>
-            <p:ph type="sldNum" idx="12"/>
+            <p:ph type="sldNum" idx="10"/>
           </p:nvPr>
         </p:nvSpPr>
-        <p:spPr>
-          <a:xfrm>
-            <a:off x="8472457" y="4663216"/>
-            <a:ext cx="548700" cy="393600"/>
-          </a:xfrm>
-          <a:prstGeom prst="rect">
-            <a:avLst/>
-          </a:prstGeom>
-        </p:spPr>
+        <p:spPr/>
         <p:txBody>
-          <a:bodyPr lIns="91425" tIns="91425" rIns="91425" bIns="91425" anchor="ctr" anchorCtr="0">
-            <a:noAutofit/>
-          </a:bodyPr>
-          <a:lstStyle/>
+          <a:bodyPr/>
+          <a:lstStyle>
+            <a:lvl1pPr algn="l">
+              <a:defRPr sz="1400">
+                <a:solidFill>
+                  <a:srgbClr val="000000"/>
+                </a:solidFill>
+              </a:defRPr>
+            </a:lvl1pPr>
+          </a:lstStyle>
           <a:p>
-            <a:pPr lvl="0">
-              <a:spcBef>
-                <a:spcPts val="0"/>
-              </a:spcBef>
-              <a:buNone/>
-            </a:pPr>
-            <a:fld id="{00000000-1234-1234-1234-123412341234}" type="slidenum">
-              <a:rPr lang="en"/>
+            <a:fld id="{9E16C31D-E708-8344-9695-2305A946C5F7}" type="slidenum">
+              <a:rPr lang="en-US" altLang="en-US"/>
+              <a:pPr/>
               <a:t>‹#›</a:t>
             </a:fld>
-            <a:endParaRPr lang="en"/>
+            <a:endParaRPr lang="en-US" altLang="en-US"/>
           </a:p>
         </p:txBody>
       </p:sp>
     </p:spTree>
+    <p:extLst>
+      <p:ext uri="{BB962C8B-B14F-4D97-AF65-F5344CB8AC3E}">
+        <p14:creationId xmlns:p14="http://schemas.microsoft.com/office/powerpoint/2010/main" val="1144332549"/>
+      </p:ext>
+    </p:extLst>
   </p:cSld>
   <p:clrMapOvr>
     <a:masterClrMapping/>
@@ -1940,15 +2199,15 @@
         </p:nvSpPr>
         <p:spPr>
           <a:xfrm>
-            <a:off x="490250" y="450150"/>
-            <a:ext cx="6367800" cy="4090800"/>
+            <a:off x="490250" y="600200"/>
+            <a:ext cx="6367800" cy="5454400"/>
           </a:xfrm>
           <a:prstGeom prst="rect">
             <a:avLst/>
           </a:prstGeom>
         </p:spPr>
         <p:txBody>
-          <a:bodyPr lIns="91425" tIns="91425" rIns="91425" bIns="91425" anchor="ctr" anchorCtr="0"/>
+          <a:bodyPr anchor="ctr"/>
           <a:lstStyle>
             <a:lvl1pPr lvl="0">
               <a:spcBef>
@@ -2021,44 +2280,42 @@
       </p:sp>
       <p:sp>
         <p:nvSpPr>
-          <p:cNvPr id="34" name="Shape 34"/>
+          <p:cNvPr id="3" name="Shape 34"/>
           <p:cNvSpPr txBox="1">
             <a:spLocks noGrp="1"/>
           </p:cNvSpPr>
           <p:nvPr>
-            <p:ph type="sldNum" idx="12"/>
+            <p:ph type="sldNum" idx="10"/>
           </p:nvPr>
         </p:nvSpPr>
-        <p:spPr>
-          <a:xfrm>
-            <a:off x="8472457" y="4663216"/>
-            <a:ext cx="548700" cy="393600"/>
-          </a:xfrm>
-          <a:prstGeom prst="rect">
-            <a:avLst/>
-          </a:prstGeom>
-        </p:spPr>
+        <p:spPr/>
         <p:txBody>
-          <a:bodyPr lIns="91425" tIns="91425" rIns="91425" bIns="91425" anchor="ctr" anchorCtr="0">
-            <a:noAutofit/>
-          </a:bodyPr>
-          <a:lstStyle/>
+          <a:bodyPr/>
+          <a:lstStyle>
+            <a:lvl1pPr algn="l">
+              <a:defRPr sz="1400">
+                <a:solidFill>
+                  <a:srgbClr val="000000"/>
+                </a:solidFill>
+              </a:defRPr>
+            </a:lvl1pPr>
+          </a:lstStyle>
           <a:p>
-            <a:pPr lvl="0">
-              <a:spcBef>
-                <a:spcPts val="0"/>
-              </a:spcBef>
-              <a:buNone/>
-            </a:pPr>
-            <a:fld id="{00000000-1234-1234-1234-123412341234}" type="slidenum">
-              <a:rPr lang="en"/>
+            <a:fld id="{FA74B1E0-6AEB-7C42-8350-3D0060FA59D1}" type="slidenum">
+              <a:rPr lang="en-US" altLang="en-US"/>
+              <a:pPr/>
               <a:t>‹#›</a:t>
             </a:fld>
-            <a:endParaRPr lang="en"/>
+            <a:endParaRPr lang="en-US" altLang="en-US"/>
           </a:p>
         </p:txBody>
       </p:sp>
     </p:spTree>
+    <p:extLst>
+      <p:ext uri="{BB962C8B-B14F-4D97-AF65-F5344CB8AC3E}">
+        <p14:creationId xmlns:p14="http://schemas.microsoft.com/office/powerpoint/2010/main" val="2081092158"/>
+      </p:ext>
+    </p:extLst>
   </p:cSld>
   <p:clrMapOvr>
     <a:masterClrMapping/>
@@ -2085,38 +2342,169 @@
       </p:grpSpPr>
       <p:sp>
         <p:nvSpPr>
-          <p:cNvPr id="36" name="Shape 36"/>
-          <p:cNvSpPr/>
+          <p:cNvPr id="5" name="Shape 36"/>
+          <p:cNvSpPr>
+            <a:spLocks noChangeArrowheads="1"/>
+          </p:cNvSpPr>
           <p:nvPr/>
         </p:nvSpPr>
-        <p:spPr>
+        <p:spPr bwMode="auto">
           <a:xfrm>
-            <a:off x="4572000" y="-125"/>
-            <a:ext cx="4572000" cy="5143500"/>
+            <a:off x="4572000" y="0"/>
+            <a:ext cx="4572000" cy="6858000"/>
           </a:xfrm>
           <a:prstGeom prst="rect">
             <a:avLst/>
           </a:prstGeom>
           <a:solidFill>
-            <a:schemeClr val="lt2"/>
+            <a:schemeClr val="tx2"/>
           </a:solidFill>
           <a:ln>
             <a:noFill/>
           </a:ln>
+          <a:extLst>
+            <a:ext uri="{91240B29-F687-4F45-9708-019B960494DF}">
+              <a14:hiddenLine xmlns:a14="http://schemas.microsoft.com/office/drawing/2010/main" w="9525">
+                <a:solidFill>
+                  <a:srgbClr val="000000"/>
+                </a:solidFill>
+                <a:miter lim="800000"/>
+                <a:headEnd/>
+                <a:tailEnd/>
+              </a14:hiddenLine>
+            </a:ext>
+          </a:extLst>
         </p:spPr>
         <p:txBody>
-          <a:bodyPr lIns="91425" tIns="91425" rIns="91425" bIns="91425" anchor="ctr" anchorCtr="0">
-            <a:noAutofit/>
-          </a:bodyPr>
-          <a:lstStyle/>
+          <a:bodyPr lIns="91425" tIns="91425" rIns="91425" bIns="91425" anchor="ctr"/>
+          <a:lstStyle>
+            <a:lvl1pPr>
+              <a:defRPr sz="1400">
+                <a:solidFill>
+                  <a:srgbClr val="000000"/>
+                </a:solidFill>
+                <a:latin typeface="Arial" charset="0"/>
+                <a:ea typeface="Arial" charset="0"/>
+                <a:cs typeface="Arial" charset="0"/>
+                <a:sym typeface="Arial" charset="0"/>
+              </a:defRPr>
+            </a:lvl1pPr>
+            <a:lvl2pPr marL="742950" indent="-285750">
+              <a:defRPr sz="1400">
+                <a:solidFill>
+                  <a:srgbClr val="000000"/>
+                </a:solidFill>
+                <a:latin typeface="Arial" charset="0"/>
+                <a:ea typeface="Arial" charset="0"/>
+                <a:cs typeface="Arial" charset="0"/>
+                <a:sym typeface="Arial" charset="0"/>
+              </a:defRPr>
+            </a:lvl2pPr>
+            <a:lvl3pPr marL="1143000" indent="-228600">
+              <a:defRPr sz="1400">
+                <a:solidFill>
+                  <a:srgbClr val="000000"/>
+                </a:solidFill>
+                <a:latin typeface="Arial" charset="0"/>
+                <a:ea typeface="Arial" charset="0"/>
+                <a:cs typeface="Arial" charset="0"/>
+                <a:sym typeface="Arial" charset="0"/>
+              </a:defRPr>
+            </a:lvl3pPr>
+            <a:lvl4pPr marL="1600200" indent="-228600">
+              <a:defRPr sz="1400">
+                <a:solidFill>
+                  <a:srgbClr val="000000"/>
+                </a:solidFill>
+                <a:latin typeface="Arial" charset="0"/>
+                <a:ea typeface="Arial" charset="0"/>
+                <a:cs typeface="Arial" charset="0"/>
+                <a:sym typeface="Arial" charset="0"/>
+              </a:defRPr>
+            </a:lvl4pPr>
+            <a:lvl5pPr marL="2057400" indent="-228600">
+              <a:defRPr sz="1400">
+                <a:solidFill>
+                  <a:srgbClr val="000000"/>
+                </a:solidFill>
+                <a:latin typeface="Arial" charset="0"/>
+                <a:ea typeface="Arial" charset="0"/>
+                <a:cs typeface="Arial" charset="0"/>
+                <a:sym typeface="Arial" charset="0"/>
+              </a:defRPr>
+            </a:lvl5pPr>
+            <a:lvl6pPr marL="2514600" indent="-228600" eaLnBrk="0" fontAlgn="base" hangingPunct="0">
+              <a:spcBef>
+                <a:spcPct val="0"/>
+              </a:spcBef>
+              <a:spcAft>
+                <a:spcPct val="0"/>
+              </a:spcAft>
+              <a:defRPr sz="1400">
+                <a:solidFill>
+                  <a:srgbClr val="000000"/>
+                </a:solidFill>
+                <a:latin typeface="Arial" charset="0"/>
+                <a:ea typeface="Arial" charset="0"/>
+                <a:cs typeface="Arial" charset="0"/>
+                <a:sym typeface="Arial" charset="0"/>
+              </a:defRPr>
+            </a:lvl6pPr>
+            <a:lvl7pPr marL="2971800" indent="-228600" eaLnBrk="0" fontAlgn="base" hangingPunct="0">
+              <a:spcBef>
+                <a:spcPct val="0"/>
+              </a:spcBef>
+              <a:spcAft>
+                <a:spcPct val="0"/>
+              </a:spcAft>
+              <a:defRPr sz="1400">
+                <a:solidFill>
+                  <a:srgbClr val="000000"/>
+                </a:solidFill>
+                <a:latin typeface="Arial" charset="0"/>
+                <a:ea typeface="Arial" charset="0"/>
+                <a:cs typeface="Arial" charset="0"/>
+                <a:sym typeface="Arial" charset="0"/>
+              </a:defRPr>
+            </a:lvl7pPr>
+            <a:lvl8pPr marL="3429000" indent="-228600" eaLnBrk="0" fontAlgn="base" hangingPunct="0">
+              <a:spcBef>
+                <a:spcPct val="0"/>
+              </a:spcBef>
+              <a:spcAft>
+                <a:spcPct val="0"/>
+              </a:spcAft>
+              <a:defRPr sz="1400">
+                <a:solidFill>
+                  <a:srgbClr val="000000"/>
+                </a:solidFill>
+                <a:latin typeface="Arial" charset="0"/>
+                <a:ea typeface="Arial" charset="0"/>
+                <a:cs typeface="Arial" charset="0"/>
+                <a:sym typeface="Arial" charset="0"/>
+              </a:defRPr>
+            </a:lvl8pPr>
+            <a:lvl9pPr marL="3886200" indent="-228600" eaLnBrk="0" fontAlgn="base" hangingPunct="0">
+              <a:spcBef>
+                <a:spcPct val="0"/>
+              </a:spcBef>
+              <a:spcAft>
+                <a:spcPct val="0"/>
+              </a:spcAft>
+              <a:defRPr sz="1400">
+                <a:solidFill>
+                  <a:srgbClr val="000000"/>
+                </a:solidFill>
+                <a:latin typeface="Arial" charset="0"/>
+                <a:ea typeface="Arial" charset="0"/>
+                <a:cs typeface="Arial" charset="0"/>
+                <a:sym typeface="Arial" charset="0"/>
+              </a:defRPr>
+            </a:lvl9pPr>
+          </a:lstStyle>
           <a:p>
-            <a:pPr lvl="0">
-              <a:spcBef>
-                <a:spcPts val="0"/>
-              </a:spcBef>
-              <a:buNone/>
-            </a:pPr>
-            <a:endParaRPr/>
+            <a:pPr eaLnBrk="1" hangingPunct="1"/>
+            <a:endParaRPr lang="en-US" altLang="en-US" sz="1400"/>
           </a:p>
         </p:txBody>
       </p:sp>
@@ -2132,15 +2520,15 @@
         </p:nvSpPr>
         <p:spPr>
           <a:xfrm>
-            <a:off x="265500" y="1233175"/>
-            <a:ext cx="4045200" cy="1482300"/>
+            <a:off x="265500" y="1644233"/>
+            <a:ext cx="4045200" cy="1976400"/>
           </a:xfrm>
           <a:prstGeom prst="rect">
             <a:avLst/>
           </a:prstGeom>
         </p:spPr>
         <p:txBody>
-          <a:bodyPr lIns="91425" tIns="91425" rIns="91425" bIns="91425" anchor="b" anchorCtr="0"/>
+          <a:bodyPr anchor="b"/>
           <a:lstStyle>
             <a:lvl1pPr lvl="0" algn="ctr">
               <a:spcBef>
@@ -2223,15 +2611,15 @@
         </p:nvSpPr>
         <p:spPr>
           <a:xfrm>
-            <a:off x="265500" y="2803075"/>
-            <a:ext cx="4045200" cy="1235100"/>
+            <a:off x="265500" y="3737433"/>
+            <a:ext cx="4045200" cy="1646800"/>
           </a:xfrm>
           <a:prstGeom prst="rect">
             <a:avLst/>
           </a:prstGeom>
         </p:spPr>
         <p:txBody>
-          <a:bodyPr lIns="91425" tIns="91425" rIns="91425" bIns="91425" anchor="t" anchorCtr="0"/>
+          <a:bodyPr/>
           <a:lstStyle>
             <a:lvl1pPr lvl="0" algn="ctr">
               <a:lnSpc>
@@ -2377,15 +2765,15 @@
         </p:nvSpPr>
         <p:spPr>
           <a:xfrm>
-            <a:off x="4939500" y="724075"/>
-            <a:ext cx="3837000" cy="3695100"/>
+            <a:off x="4939500" y="965433"/>
+            <a:ext cx="3837000" cy="4926800"/>
           </a:xfrm>
           <a:prstGeom prst="rect">
             <a:avLst/>
           </a:prstGeom>
         </p:spPr>
         <p:txBody>
-          <a:bodyPr lIns="91425" tIns="91425" rIns="91425" bIns="91425" anchor="ctr" anchorCtr="0"/>
+          <a:bodyPr anchor="ctr"/>
           <a:lstStyle>
             <a:lvl1pPr lvl="0">
               <a:spcBef>
@@ -2449,44 +2837,42 @@
       </p:sp>
       <p:sp>
         <p:nvSpPr>
-          <p:cNvPr id="40" name="Shape 40"/>
+          <p:cNvPr id="6" name="Shape 40"/>
           <p:cNvSpPr txBox="1">
             <a:spLocks noGrp="1"/>
           </p:cNvSpPr>
           <p:nvPr>
-            <p:ph type="sldNum" idx="12"/>
+            <p:ph type="sldNum" idx="10"/>
           </p:nvPr>
         </p:nvSpPr>
-        <p:spPr>
-          <a:xfrm>
-            <a:off x="8472457" y="4663216"/>
-            <a:ext cx="548700" cy="393600"/>
-          </a:xfrm>
-          <a:prstGeom prst="rect">
-            <a:avLst/>
-          </a:prstGeom>
-        </p:spPr>
+        <p:spPr/>
         <p:txBody>
-          <a:bodyPr lIns="91425" tIns="91425" rIns="91425" bIns="91425" anchor="ctr" anchorCtr="0">
-            <a:noAutofit/>
-          </a:bodyPr>
-          <a:lstStyle/>
+          <a:bodyPr/>
+          <a:lstStyle>
+            <a:lvl1pPr algn="l">
+              <a:defRPr sz="1400">
+                <a:solidFill>
+                  <a:srgbClr val="000000"/>
+                </a:solidFill>
+              </a:defRPr>
+            </a:lvl1pPr>
+          </a:lstStyle>
           <a:p>
-            <a:pPr lvl="0">
-              <a:spcBef>
-                <a:spcPts val="0"/>
-              </a:spcBef>
-              <a:buNone/>
-            </a:pPr>
-            <a:fld id="{00000000-1234-1234-1234-123412341234}" type="slidenum">
-              <a:rPr lang="en"/>
+            <a:fld id="{AB973622-70D4-884B-9774-D3A084ADC9D1}" type="slidenum">
+              <a:rPr lang="en-US" altLang="en-US"/>
+              <a:pPr/>
               <a:t>‹#›</a:t>
             </a:fld>
-            <a:endParaRPr lang="en"/>
+            <a:endParaRPr lang="en-US" altLang="en-US"/>
           </a:p>
         </p:txBody>
       </p:sp>
     </p:spTree>
+    <p:extLst>
+      <p:ext uri="{BB962C8B-B14F-4D97-AF65-F5344CB8AC3E}">
+        <p14:creationId xmlns:p14="http://schemas.microsoft.com/office/powerpoint/2010/main" val="849740817"/>
+      </p:ext>
+    </p:extLst>
   </p:cSld>
   <p:clrMapOvr>
     <a:masterClrMapping/>
@@ -2523,15 +2909,15 @@
         </p:nvSpPr>
         <p:spPr>
           <a:xfrm>
-            <a:off x="311700" y="4230575"/>
-            <a:ext cx="5998800" cy="605100"/>
+            <a:off x="311700" y="5640767"/>
+            <a:ext cx="5998800" cy="806800"/>
           </a:xfrm>
           <a:prstGeom prst="rect">
             <a:avLst/>
           </a:prstGeom>
         </p:spPr>
         <p:txBody>
-          <a:bodyPr lIns="91425" tIns="91425" rIns="91425" bIns="91425" anchor="ctr" anchorCtr="0"/>
+          <a:bodyPr anchor="ctr"/>
           <a:lstStyle>
             <a:lvl1pPr lvl="0">
               <a:lnSpc>
@@ -2554,44 +2940,42 @@
       </p:sp>
       <p:sp>
         <p:nvSpPr>
-          <p:cNvPr id="43" name="Shape 43"/>
+          <p:cNvPr id="3" name="Shape 43"/>
           <p:cNvSpPr txBox="1">
             <a:spLocks noGrp="1"/>
           </p:cNvSpPr>
           <p:nvPr>
-            <p:ph type="sldNum" idx="12"/>
+            <p:ph type="sldNum" idx="10"/>
           </p:nvPr>
         </p:nvSpPr>
-        <p:spPr>
-          <a:xfrm>
-            <a:off x="8472457" y="4663216"/>
-            <a:ext cx="548700" cy="393600"/>
-          </a:xfrm>
-          <a:prstGeom prst="rect">
-            <a:avLst/>
-          </a:prstGeom>
-        </p:spPr>
+        <p:spPr/>
         <p:txBody>
-          <a:bodyPr lIns="91425" tIns="91425" rIns="91425" bIns="91425" anchor="ctr" anchorCtr="0">
-            <a:noAutofit/>
-          </a:bodyPr>
-          <a:lstStyle/>
+          <a:bodyPr/>
+          <a:lstStyle>
+            <a:lvl1pPr algn="l">
+              <a:defRPr sz="1400">
+                <a:solidFill>
+                  <a:srgbClr val="000000"/>
+                </a:solidFill>
+              </a:defRPr>
+            </a:lvl1pPr>
+          </a:lstStyle>
           <a:p>
-            <a:pPr lvl="0">
-              <a:spcBef>
-                <a:spcPts val="0"/>
-              </a:spcBef>
-              <a:buNone/>
-            </a:pPr>
-            <a:fld id="{00000000-1234-1234-1234-123412341234}" type="slidenum">
-              <a:rPr lang="en"/>
+            <a:fld id="{CA13B09B-FBD7-4B41-9163-C7380C373559}" type="slidenum">
+              <a:rPr lang="en-US" altLang="en-US"/>
+              <a:pPr/>
               <a:t>‹#›</a:t>
             </a:fld>
-            <a:endParaRPr lang="en"/>
+            <a:endParaRPr lang="en-US" altLang="en-US"/>
           </a:p>
         </p:txBody>
       </p:sp>
     </p:spTree>
+    <p:extLst>
+      <p:ext uri="{BB962C8B-B14F-4D97-AF65-F5344CB8AC3E}">
+        <p14:creationId xmlns:p14="http://schemas.microsoft.com/office/powerpoint/2010/main" val="827658769"/>
+      </p:ext>
+    </p:extLst>
   </p:cSld>
   <p:clrMapOvr>
     <a:masterClrMapping/>
@@ -2628,15 +3012,15 @@
         </p:nvSpPr>
         <p:spPr>
           <a:xfrm>
-            <a:off x="311700" y="1106125"/>
-            <a:ext cx="8520600" cy="1963500"/>
+            <a:off x="311700" y="1474833"/>
+            <a:ext cx="8520600" cy="2618000"/>
           </a:xfrm>
           <a:prstGeom prst="rect">
             <a:avLst/>
           </a:prstGeom>
         </p:spPr>
         <p:txBody>
-          <a:bodyPr lIns="91425" tIns="91425" rIns="91425" bIns="91425" anchor="b" anchorCtr="0"/>
+          <a:bodyPr anchor="b"/>
           <a:lstStyle>
             <a:lvl1pPr lvl="0" algn="ctr">
               <a:spcBef>
@@ -2719,15 +3103,15 @@
         </p:nvSpPr>
         <p:spPr>
           <a:xfrm>
-            <a:off x="311700" y="3152225"/>
-            <a:ext cx="8520600" cy="1300800"/>
+            <a:off x="311700" y="4202967"/>
+            <a:ext cx="8520600" cy="1734400"/>
           </a:xfrm>
           <a:prstGeom prst="rect">
             <a:avLst/>
           </a:prstGeom>
         </p:spPr>
         <p:txBody>
-          <a:bodyPr lIns="91425" tIns="91425" rIns="91425" bIns="91425" anchor="t" anchorCtr="0"/>
+          <a:bodyPr/>
           <a:lstStyle>
             <a:lvl1pPr lvl="0" algn="ctr">
               <a:spcBef>
@@ -2791,44 +3175,42 @@
       </p:sp>
       <p:sp>
         <p:nvSpPr>
-          <p:cNvPr id="47" name="Shape 47"/>
+          <p:cNvPr id="4" name="Shape 47"/>
           <p:cNvSpPr txBox="1">
             <a:spLocks noGrp="1"/>
           </p:cNvSpPr>
           <p:nvPr>
-            <p:ph type="sldNum" idx="12"/>
+            <p:ph type="sldNum" idx="10"/>
           </p:nvPr>
         </p:nvSpPr>
-        <p:spPr>
-          <a:xfrm>
-            <a:off x="8472457" y="4663216"/>
-            <a:ext cx="548700" cy="393600"/>
-          </a:xfrm>
-          <a:prstGeom prst="rect">
-            <a:avLst/>
-          </a:prstGeom>
-        </p:spPr>
+        <p:spPr/>
         <p:txBody>
-          <a:bodyPr lIns="91425" tIns="91425" rIns="91425" bIns="91425" anchor="ctr" anchorCtr="0">
-            <a:noAutofit/>
-          </a:bodyPr>
-          <a:lstStyle/>
+          <a:bodyPr/>
+          <a:lstStyle>
+            <a:lvl1pPr algn="l">
+              <a:defRPr sz="1400">
+                <a:solidFill>
+                  <a:srgbClr val="000000"/>
+                </a:solidFill>
+              </a:defRPr>
+            </a:lvl1pPr>
+          </a:lstStyle>
           <a:p>
-            <a:pPr lvl="0">
-              <a:spcBef>
-                <a:spcPts val="0"/>
-              </a:spcBef>
-              <a:buNone/>
-            </a:pPr>
-            <a:fld id="{00000000-1234-1234-1234-123412341234}" type="slidenum">
-              <a:rPr lang="en"/>
+            <a:fld id="{D291E2C3-93E6-DE4C-B030-FB4F9B90B4DA}" type="slidenum">
+              <a:rPr lang="en-US" altLang="en-US"/>
+              <a:pPr/>
               <a:t>‹#›</a:t>
             </a:fld>
-            <a:endParaRPr lang="en"/>
+            <a:endParaRPr lang="en-US" altLang="en-US"/>
           </a:p>
         </p:txBody>
       </p:sp>
     </p:spTree>
+    <p:extLst>
+      <p:ext uri="{BB962C8B-B14F-4D97-AF65-F5344CB8AC3E}">
+        <p14:creationId xmlns:p14="http://schemas.microsoft.com/office/powerpoint/2010/main" val="1209348964"/>
+      </p:ext>
+    </p:extLst>
   </p:cSld>
   <p:clrMapOvr>
     <a:masterClrMapping/>
@@ -2842,14 +3224,14 @@
     <p:bg>
       <p:bgPr>
         <a:solidFill>
-          <a:schemeClr val="lt1"/>
+          <a:schemeClr val="bg1"/>
         </a:solidFill>
         <a:effectLst/>
       </p:bgPr>
     </p:bg>
     <p:spTree>
       <p:nvGrpSpPr>
-        <p:cNvPr id="1" name="Shape 5"/>
+        <p:cNvPr id="1" name=""/>
         <p:cNvGrpSpPr/>
         <p:nvPr/>
       </p:nvGrpSpPr>
@@ -2863,7 +3245,7 @@
       </p:grpSpPr>
       <p:sp>
         <p:nvSpPr>
-          <p:cNvPr id="6" name="Shape 6"/>
+          <p:cNvPr id="1026" name="Shape 6"/>
           <p:cNvSpPr txBox="1">
             <a:spLocks noGrp="1"/>
           </p:cNvSpPr>
@@ -2871,10 +3253,10 @@
             <p:ph type="title"/>
           </p:nvPr>
         </p:nvSpPr>
-        <p:spPr>
+        <p:spPr bwMode="auto">
           <a:xfrm>
-            <a:off x="311700" y="445025"/>
-            <a:ext cx="8520600" cy="572700"/>
+            <a:off x="311150" y="592667"/>
+            <a:ext cx="8521700" cy="764117"/>
           </a:xfrm>
           <a:prstGeom prst="rect">
             <a:avLst/>
@@ -2883,154 +3265,47 @@
           <a:ln>
             <a:noFill/>
           </a:ln>
+          <a:extLst>
+            <a:ext uri="{909E8E84-426E-40DD-AFC4-6F175D3DCCD1}">
+              <a14:hiddenFill xmlns:a14="http://schemas.microsoft.com/office/drawing/2010/main">
+                <a:solidFill>
+                  <a:srgbClr val="FFFFFF"/>
+                </a:solidFill>
+              </a14:hiddenFill>
+            </a:ext>
+            <a:ext uri="{91240B29-F687-4F45-9708-019B960494DF}">
+              <a14:hiddenLine xmlns:a14="http://schemas.microsoft.com/office/drawing/2010/main" w="9525">
+                <a:solidFill>
+                  <a:srgbClr val="000000"/>
+                </a:solidFill>
+                <a:miter lim="800000"/>
+                <a:headEnd/>
+                <a:tailEnd/>
+              </a14:hiddenLine>
+            </a:ext>
+            <a:ext uri="{FAA26D3D-D897-4be2-8F04-BA451C77F1D7}">
+              <ma14:placeholderFlag xmlns:ma14="http://schemas.microsoft.com/office/mac/drawingml/2011/main" val="1"/>
+            </a:ext>
+          </a:extLst>
         </p:spPr>
         <p:txBody>
-          <a:bodyPr lIns="91425" tIns="91425" rIns="91425" bIns="91425" anchor="t" anchorCtr="0"/>
-          <a:lstStyle>
-            <a:lvl1pPr lvl="0">
-              <a:spcBef>
-                <a:spcPts val="0"/>
-              </a:spcBef>
-              <a:buClr>
-                <a:schemeClr val="dk1"/>
-              </a:buClr>
-              <a:buSzPct val="100000"/>
-              <a:buNone/>
-              <a:defRPr sz="2800">
-                <a:solidFill>
-                  <a:schemeClr val="dk1"/>
-                </a:solidFill>
-              </a:defRPr>
-            </a:lvl1pPr>
-            <a:lvl2pPr lvl="1">
-              <a:spcBef>
-                <a:spcPts val="0"/>
-              </a:spcBef>
-              <a:buClr>
-                <a:schemeClr val="dk1"/>
-              </a:buClr>
-              <a:buSzPct val="100000"/>
-              <a:buNone/>
-              <a:defRPr sz="2800">
-                <a:solidFill>
-                  <a:schemeClr val="dk1"/>
-                </a:solidFill>
-              </a:defRPr>
-            </a:lvl2pPr>
-            <a:lvl3pPr lvl="2">
-              <a:spcBef>
-                <a:spcPts val="0"/>
-              </a:spcBef>
-              <a:buClr>
-                <a:schemeClr val="dk1"/>
-              </a:buClr>
-              <a:buSzPct val="100000"/>
-              <a:buNone/>
-              <a:defRPr sz="2800">
-                <a:solidFill>
-                  <a:schemeClr val="dk1"/>
-                </a:solidFill>
-              </a:defRPr>
-            </a:lvl3pPr>
-            <a:lvl4pPr lvl="3">
-              <a:spcBef>
-                <a:spcPts val="0"/>
-              </a:spcBef>
-              <a:buClr>
-                <a:schemeClr val="dk1"/>
-              </a:buClr>
-              <a:buSzPct val="100000"/>
-              <a:buNone/>
-              <a:defRPr sz="2800">
-                <a:solidFill>
-                  <a:schemeClr val="dk1"/>
-                </a:solidFill>
-              </a:defRPr>
-            </a:lvl4pPr>
-            <a:lvl5pPr lvl="4">
-              <a:spcBef>
-                <a:spcPts val="0"/>
-              </a:spcBef>
-              <a:buClr>
-                <a:schemeClr val="dk1"/>
-              </a:buClr>
-              <a:buSzPct val="100000"/>
-              <a:buNone/>
-              <a:defRPr sz="2800">
-                <a:solidFill>
-                  <a:schemeClr val="dk1"/>
-                </a:solidFill>
-              </a:defRPr>
-            </a:lvl5pPr>
-            <a:lvl6pPr lvl="5">
-              <a:spcBef>
-                <a:spcPts val="0"/>
-              </a:spcBef>
-              <a:buClr>
-                <a:schemeClr val="dk1"/>
-              </a:buClr>
-              <a:buSzPct val="100000"/>
-              <a:buNone/>
-              <a:defRPr sz="2800">
-                <a:solidFill>
-                  <a:schemeClr val="dk1"/>
-                </a:solidFill>
-              </a:defRPr>
-            </a:lvl6pPr>
-            <a:lvl7pPr lvl="6">
-              <a:spcBef>
-                <a:spcPts val="0"/>
-              </a:spcBef>
-              <a:buClr>
-                <a:schemeClr val="dk1"/>
-              </a:buClr>
-              <a:buSzPct val="100000"/>
-              <a:buNone/>
-              <a:defRPr sz="2800">
-                <a:solidFill>
-                  <a:schemeClr val="dk1"/>
-                </a:solidFill>
-              </a:defRPr>
-            </a:lvl7pPr>
-            <a:lvl8pPr lvl="7">
-              <a:spcBef>
-                <a:spcPts val="0"/>
-              </a:spcBef>
-              <a:buClr>
-                <a:schemeClr val="dk1"/>
-              </a:buClr>
-              <a:buSzPct val="100000"/>
-              <a:buNone/>
-              <a:defRPr sz="2800">
-                <a:solidFill>
-                  <a:schemeClr val="dk1"/>
-                </a:solidFill>
-              </a:defRPr>
-            </a:lvl8pPr>
-            <a:lvl9pPr lvl="8">
-              <a:spcBef>
-                <a:spcPts val="0"/>
-              </a:spcBef>
-              <a:buClr>
-                <a:schemeClr val="dk1"/>
-              </a:buClr>
-              <a:buSzPct val="100000"/>
-              <a:buNone/>
-              <a:defRPr sz="2800">
-                <a:solidFill>
-                  <a:schemeClr val="dk1"/>
-                </a:solidFill>
-              </a:defRPr>
-            </a:lvl9pPr>
-          </a:lstStyle>
+          <a:bodyPr vert="horz" wrap="square" lIns="91425" tIns="91425" rIns="91425" bIns="91425" numCol="1" anchor="t" anchorCtr="0" compatLnSpc="1">
+            <a:prstTxWarp prst="textNoShape">
+              <a:avLst/>
+            </a:prstTxWarp>
+          </a:bodyPr>
+          <a:lstStyle/>
           <a:p>
-            <a:endParaRPr/>
+            <a:pPr lvl="0"/>
+            <a:endParaRPr lang="en-US" altLang="en-US">
+              <a:sym typeface="Arial" charset="0"/>
+            </a:endParaRPr>
           </a:p>
         </p:txBody>
       </p:sp>
       <p:sp>
         <p:nvSpPr>
-          <p:cNvPr id="7" name="Shape 7"/>
+          <p:cNvPr id="1027" name="Shape 7"/>
           <p:cNvSpPr txBox="1">
             <a:spLocks noGrp="1"/>
           </p:cNvSpPr>
@@ -3038,10 +3313,10 @@
             <p:ph type="body" idx="1"/>
           </p:nvPr>
         </p:nvSpPr>
-        <p:spPr>
+        <p:spPr bwMode="auto">
           <a:xfrm>
-            <a:off x="311700" y="1152475"/>
-            <a:ext cx="8520600" cy="3416400"/>
+            <a:off x="311150" y="1536700"/>
+            <a:ext cx="8521700" cy="4555067"/>
           </a:xfrm>
           <a:prstGeom prst="rect">
             <a:avLst/>
@@ -3050,191 +3325,47 @@
           <a:ln>
             <a:noFill/>
           </a:ln>
+          <a:extLst>
+            <a:ext uri="{909E8E84-426E-40DD-AFC4-6F175D3DCCD1}">
+              <a14:hiddenFill xmlns:a14="http://schemas.microsoft.com/office/drawing/2010/main">
+                <a:solidFill>
+                  <a:srgbClr val="FFFFFF"/>
+                </a:solidFill>
+              </a14:hiddenFill>
+            </a:ext>
+            <a:ext uri="{91240B29-F687-4F45-9708-019B960494DF}">
+              <a14:hiddenLine xmlns:a14="http://schemas.microsoft.com/office/drawing/2010/main" w="9525">
+                <a:solidFill>
+                  <a:srgbClr val="000000"/>
+                </a:solidFill>
+                <a:miter lim="800000"/>
+                <a:headEnd/>
+                <a:tailEnd/>
+              </a14:hiddenLine>
+            </a:ext>
+            <a:ext uri="{FAA26D3D-D897-4be2-8F04-BA451C77F1D7}">
+              <ma14:placeholderFlag xmlns:ma14="http://schemas.microsoft.com/office/mac/drawingml/2011/main" val="1"/>
+            </a:ext>
+          </a:extLst>
         </p:spPr>
         <p:txBody>
-          <a:bodyPr lIns="91425" tIns="91425" rIns="91425" bIns="91425" anchor="t" anchorCtr="0"/>
-          <a:lstStyle>
-            <a:lvl1pPr lvl="0">
-              <a:lnSpc>
-                <a:spcPct val="115000"/>
-              </a:lnSpc>
-              <a:spcBef>
-                <a:spcPts val="0"/>
-              </a:spcBef>
-              <a:spcAft>
-                <a:spcPts val="1600"/>
-              </a:spcAft>
-              <a:buClr>
-                <a:schemeClr val="dk2"/>
-              </a:buClr>
-              <a:buSzPct val="100000"/>
-              <a:defRPr sz="1800">
-                <a:solidFill>
-                  <a:schemeClr val="dk2"/>
-                </a:solidFill>
-              </a:defRPr>
-            </a:lvl1pPr>
-            <a:lvl2pPr lvl="1">
-              <a:lnSpc>
-                <a:spcPct val="115000"/>
-              </a:lnSpc>
-              <a:spcBef>
-                <a:spcPts val="0"/>
-              </a:spcBef>
-              <a:spcAft>
-                <a:spcPts val="1600"/>
-              </a:spcAft>
-              <a:buClr>
-                <a:schemeClr val="dk2"/>
-              </a:buClr>
-              <a:defRPr>
-                <a:solidFill>
-                  <a:schemeClr val="dk2"/>
-                </a:solidFill>
-              </a:defRPr>
-            </a:lvl2pPr>
-            <a:lvl3pPr lvl="2">
-              <a:lnSpc>
-                <a:spcPct val="115000"/>
-              </a:lnSpc>
-              <a:spcBef>
-                <a:spcPts val="0"/>
-              </a:spcBef>
-              <a:spcAft>
-                <a:spcPts val="1600"/>
-              </a:spcAft>
-              <a:buClr>
-                <a:schemeClr val="dk2"/>
-              </a:buClr>
-              <a:defRPr>
-                <a:solidFill>
-                  <a:schemeClr val="dk2"/>
-                </a:solidFill>
-              </a:defRPr>
-            </a:lvl3pPr>
-            <a:lvl4pPr lvl="3">
-              <a:lnSpc>
-                <a:spcPct val="115000"/>
-              </a:lnSpc>
-              <a:spcBef>
-                <a:spcPts val="0"/>
-              </a:spcBef>
-              <a:spcAft>
-                <a:spcPts val="1600"/>
-              </a:spcAft>
-              <a:buClr>
-                <a:schemeClr val="dk2"/>
-              </a:buClr>
-              <a:defRPr>
-                <a:solidFill>
-                  <a:schemeClr val="dk2"/>
-                </a:solidFill>
-              </a:defRPr>
-            </a:lvl4pPr>
-            <a:lvl5pPr lvl="4">
-              <a:lnSpc>
-                <a:spcPct val="115000"/>
-              </a:lnSpc>
-              <a:spcBef>
-                <a:spcPts val="0"/>
-              </a:spcBef>
-              <a:spcAft>
-                <a:spcPts val="1600"/>
-              </a:spcAft>
-              <a:buClr>
-                <a:schemeClr val="dk2"/>
-              </a:buClr>
-              <a:defRPr>
-                <a:solidFill>
-                  <a:schemeClr val="dk2"/>
-                </a:solidFill>
-              </a:defRPr>
-            </a:lvl5pPr>
-            <a:lvl6pPr lvl="5">
-              <a:lnSpc>
-                <a:spcPct val="115000"/>
-              </a:lnSpc>
-              <a:spcBef>
-                <a:spcPts val="0"/>
-              </a:spcBef>
-              <a:spcAft>
-                <a:spcPts val="1600"/>
-              </a:spcAft>
-              <a:buClr>
-                <a:schemeClr val="dk2"/>
-              </a:buClr>
-              <a:defRPr>
-                <a:solidFill>
-                  <a:schemeClr val="dk2"/>
-                </a:solidFill>
-              </a:defRPr>
-            </a:lvl6pPr>
-            <a:lvl7pPr lvl="6">
-              <a:lnSpc>
-                <a:spcPct val="115000"/>
-              </a:lnSpc>
-              <a:spcBef>
-                <a:spcPts val="0"/>
-              </a:spcBef>
-              <a:spcAft>
-                <a:spcPts val="1600"/>
-              </a:spcAft>
-              <a:buClr>
-                <a:schemeClr val="dk2"/>
-              </a:buClr>
-              <a:defRPr>
-                <a:solidFill>
-                  <a:schemeClr val="dk2"/>
-                </a:solidFill>
-              </a:defRPr>
-            </a:lvl7pPr>
-            <a:lvl8pPr lvl="7">
-              <a:lnSpc>
-                <a:spcPct val="115000"/>
-              </a:lnSpc>
-              <a:spcBef>
-                <a:spcPts val="0"/>
-              </a:spcBef>
-              <a:spcAft>
-                <a:spcPts val="1600"/>
-              </a:spcAft>
-              <a:buClr>
-                <a:schemeClr val="dk2"/>
-              </a:buClr>
-              <a:defRPr>
-                <a:solidFill>
-                  <a:schemeClr val="dk2"/>
-                </a:solidFill>
-              </a:defRPr>
-            </a:lvl8pPr>
-            <a:lvl9pPr lvl="8">
-              <a:lnSpc>
-                <a:spcPct val="115000"/>
-              </a:lnSpc>
-              <a:spcBef>
-                <a:spcPts val="0"/>
-              </a:spcBef>
-              <a:spcAft>
-                <a:spcPts val="1600"/>
-              </a:spcAft>
-              <a:buClr>
-                <a:schemeClr val="dk2"/>
-              </a:buClr>
-              <a:defRPr>
-                <a:solidFill>
-                  <a:schemeClr val="dk2"/>
-                </a:solidFill>
-              </a:defRPr>
-            </a:lvl9pPr>
-          </a:lstStyle>
+          <a:bodyPr vert="horz" wrap="square" lIns="91425" tIns="91425" rIns="91425" bIns="91425" numCol="1" anchor="t" anchorCtr="0" compatLnSpc="1">
+            <a:prstTxWarp prst="textNoShape">
+              <a:avLst/>
+            </a:prstTxWarp>
+          </a:bodyPr>
+          <a:lstStyle/>
           <a:p>
-            <a:endParaRPr/>
+            <a:pPr lvl="0"/>
+            <a:endParaRPr lang="en-US" altLang="en-US">
+              <a:sym typeface="Arial" charset="0"/>
+            </a:endParaRPr>
           </a:p>
         </p:txBody>
       </p:sp>
       <p:sp>
         <p:nvSpPr>
-          <p:cNvPr id="8" name="Shape 8"/>
+          <p:cNvPr id="1028" name="Shape 8"/>
           <p:cNvSpPr txBox="1">
             <a:spLocks noGrp="1"/>
           </p:cNvSpPr>
@@ -3242,10 +3373,10 @@
             <p:ph type="sldNum" idx="12"/>
           </p:nvPr>
         </p:nvSpPr>
-        <p:spPr>
+        <p:spPr bwMode="auto">
           <a:xfrm>
-            <a:off x="8472457" y="4663216"/>
-            <a:ext cx="548700" cy="393600"/>
+            <a:off x="8472489" y="6216651"/>
+            <a:ext cx="549275" cy="524933"/>
           </a:xfrm>
           <a:prstGeom prst="rect">
             <a:avLst/>
@@ -3254,32 +3385,51 @@
           <a:ln>
             <a:noFill/>
           </a:ln>
+          <a:extLst>
+            <a:ext uri="{909E8E84-426E-40DD-AFC4-6F175D3DCCD1}">
+              <a14:hiddenFill xmlns:a14="http://schemas.microsoft.com/office/drawing/2010/main">
+                <a:solidFill>
+                  <a:srgbClr val="FFFFFF"/>
+                </a:solidFill>
+              </a14:hiddenFill>
+            </a:ext>
+            <a:ext uri="{91240B29-F687-4F45-9708-019B960494DF}">
+              <a14:hiddenLine xmlns:a14="http://schemas.microsoft.com/office/drawing/2010/main" w="9525">
+                <a:solidFill>
+                  <a:srgbClr val="000000"/>
+                </a:solidFill>
+                <a:miter lim="800000"/>
+                <a:headEnd/>
+                <a:tailEnd/>
+              </a14:hiddenLine>
+            </a:ext>
+            <a:ext uri="{FAA26D3D-D897-4be2-8F04-BA451C77F1D7}">
+              <ma14:placeholderFlag xmlns:ma14="http://schemas.microsoft.com/office/mac/drawingml/2011/main" val="1"/>
+            </a:ext>
+          </a:extLst>
         </p:spPr>
         <p:txBody>
-          <a:bodyPr lIns="91425" tIns="91425" rIns="91425" bIns="91425" anchor="ctr" anchorCtr="0">
-            <a:noAutofit/>
+          <a:bodyPr vert="horz" wrap="square" lIns="91425" tIns="91425" rIns="91425" bIns="91425" numCol="1" anchor="ctr" anchorCtr="0" compatLnSpc="1">
+            <a:prstTxWarp prst="textNoShape">
+              <a:avLst/>
+            </a:prstTxWarp>
           </a:bodyPr>
-          <a:lstStyle/>
+          <a:lstStyle>
+            <a:lvl1pPr algn="r" eaLnBrk="1" hangingPunct="1">
+              <a:defRPr sz="1000">
+                <a:solidFill>
+                  <a:srgbClr val="595959"/>
+                </a:solidFill>
+              </a:defRPr>
+            </a:lvl1pPr>
+          </a:lstStyle>
           <a:p>
-            <a:pPr lvl="0" algn="r">
-              <a:spcBef>
-                <a:spcPts val="0"/>
-              </a:spcBef>
-              <a:buNone/>
-            </a:pPr>
-            <a:fld id="{00000000-1234-1234-1234-123412341234}" type="slidenum">
-              <a:rPr lang="en" sz="1000">
-                <a:solidFill>
-                  <a:schemeClr val="dk2"/>
-                </a:solidFill>
-              </a:rPr>
+            <a:fld id="{CF5956BC-E808-0F4F-B59D-C4D711B5148A}" type="slidenum">
+              <a:rPr lang="en-US" altLang="en-US"/>
+              <a:pPr/>
               <a:t>‹#›</a:t>
             </a:fld>
-            <a:endParaRPr lang="en" sz="1000">
-              <a:solidFill>
-                <a:schemeClr val="dk2"/>
-              </a:solidFill>
-            </a:endParaRPr>
+            <a:endParaRPr lang="en-US" altLang="en-US"/>
           </a:p>
         </p:txBody>
       </p:sp>
@@ -3287,16 +3437,16 @@
   </p:cSld>
   <p:clrMap bg1="lt1" tx1="dk1" bg2="dk2" tx2="lt2" accent1="accent1" accent2="accent2" accent3="accent3" accent4="accent4" accent5="accent5" accent6="accent6" hlink="hlink" folHlink="folHlink"/>
   <p:sldLayoutIdLst>
-    <p:sldLayoutId id="2147483648" r:id="rId1"/>
-    <p:sldLayoutId id="2147483650" r:id="rId2"/>
-    <p:sldLayoutId id="2147483651" r:id="rId3"/>
-    <p:sldLayoutId id="2147483652" r:id="rId4"/>
-    <p:sldLayoutId id="2147483653" r:id="rId5"/>
-    <p:sldLayoutId id="2147483654" r:id="rId6"/>
-    <p:sldLayoutId id="2147483655" r:id="rId7"/>
-    <p:sldLayoutId id="2147483656" r:id="rId8"/>
-    <p:sldLayoutId id="2147483657" r:id="rId9"/>
-    <p:sldLayoutId id="2147483658" r:id="rId10"/>
+    <p:sldLayoutId id="2147483670" r:id="rId1"/>
+    <p:sldLayoutId id="2147483671" r:id="rId2"/>
+    <p:sldLayoutId id="2147483672" r:id="rId3"/>
+    <p:sldLayoutId id="2147483673" r:id="rId4"/>
+    <p:sldLayoutId id="2147483674" r:id="rId5"/>
+    <p:sldLayoutId id="2147483675" r:id="rId6"/>
+    <p:sldLayoutId id="2147483676" r:id="rId7"/>
+    <p:sldLayoutId id="2147483677" r:id="rId8"/>
+    <p:sldLayoutId id="2147483678" r:id="rId9"/>
+    <p:sldLayoutId id="2147483679" r:id="rId10"/>
   </p:sldLayoutIdLst>
   <p:hf sldNum="0" hdr="0" ftr="0" dt="0"/>
   <p:txStyles>
@@ -3312,27 +3462,159 @@
           <a:spcPts val="0"/>
         </a:spcAft>
       </a:defPPr>
-      <a:lvl1pPr marR="0" lvl="0" algn="l" rtl="0">
-        <a:lnSpc>
-          <a:spcPct val="100000"/>
-        </a:lnSpc>
+      <a:lvl1pPr algn="l" rtl="0" eaLnBrk="0" fontAlgn="base" hangingPunct="0">
         <a:spcBef>
-          <a:spcPts val="0"/>
+          <a:spcPct val="0"/>
         </a:spcBef>
         <a:spcAft>
-          <a:spcPts val="0"/>
+          <a:spcPct val="0"/>
         </a:spcAft>
-        <a:buNone/>
-        <a:defRPr sz="1400" b="0" i="0" u="none" strike="noStrike" cap="none">
+        <a:defRPr sz="1400">
           <a:solidFill>
             <a:srgbClr val="000000"/>
           </a:solidFill>
           <a:latin typeface="Arial"/>
           <a:ea typeface="Arial"/>
           <a:cs typeface="Arial"/>
-          <a:sym typeface="Arial"/>
+          <a:sym typeface="Arial" charset="0"/>
         </a:defRPr>
       </a:lvl1pPr>
+      <a:lvl2pPr algn="l" rtl="0" eaLnBrk="0" fontAlgn="base" hangingPunct="0">
+        <a:spcBef>
+          <a:spcPct val="0"/>
+        </a:spcBef>
+        <a:spcAft>
+          <a:spcPct val="0"/>
+        </a:spcAft>
+        <a:defRPr sz="1400">
+          <a:solidFill>
+            <a:srgbClr val="000000"/>
+          </a:solidFill>
+          <a:latin typeface="Arial" charset="0"/>
+          <a:ea typeface="Arial" charset="0"/>
+          <a:cs typeface="Arial" charset="0"/>
+          <a:sym typeface="Arial" charset="0"/>
+        </a:defRPr>
+      </a:lvl2pPr>
+      <a:lvl3pPr algn="l" rtl="0" eaLnBrk="0" fontAlgn="base" hangingPunct="0">
+        <a:spcBef>
+          <a:spcPct val="0"/>
+        </a:spcBef>
+        <a:spcAft>
+          <a:spcPct val="0"/>
+        </a:spcAft>
+        <a:defRPr sz="1400">
+          <a:solidFill>
+            <a:srgbClr val="000000"/>
+          </a:solidFill>
+          <a:latin typeface="Arial" charset="0"/>
+          <a:ea typeface="Arial" charset="0"/>
+          <a:cs typeface="Arial" charset="0"/>
+          <a:sym typeface="Arial" charset="0"/>
+        </a:defRPr>
+      </a:lvl3pPr>
+      <a:lvl4pPr algn="l" rtl="0" eaLnBrk="0" fontAlgn="base" hangingPunct="0">
+        <a:spcBef>
+          <a:spcPct val="0"/>
+        </a:spcBef>
+        <a:spcAft>
+          <a:spcPct val="0"/>
+        </a:spcAft>
+        <a:defRPr sz="1400">
+          <a:solidFill>
+            <a:srgbClr val="000000"/>
+          </a:solidFill>
+          <a:latin typeface="Arial" charset="0"/>
+          <a:ea typeface="Arial" charset="0"/>
+          <a:cs typeface="Arial" charset="0"/>
+          <a:sym typeface="Arial" charset="0"/>
+        </a:defRPr>
+      </a:lvl4pPr>
+      <a:lvl5pPr algn="l" rtl="0" eaLnBrk="0" fontAlgn="base" hangingPunct="0">
+        <a:spcBef>
+          <a:spcPct val="0"/>
+        </a:spcBef>
+        <a:spcAft>
+          <a:spcPct val="0"/>
+        </a:spcAft>
+        <a:defRPr sz="1400">
+          <a:solidFill>
+            <a:srgbClr val="000000"/>
+          </a:solidFill>
+          <a:latin typeface="Arial" charset="0"/>
+          <a:ea typeface="Arial" charset="0"/>
+          <a:cs typeface="Arial" charset="0"/>
+          <a:sym typeface="Arial" charset="0"/>
+        </a:defRPr>
+      </a:lvl5pPr>
+      <a:lvl6pPr marL="457200" algn="l" rtl="0" eaLnBrk="0" fontAlgn="base" hangingPunct="0">
+        <a:spcBef>
+          <a:spcPct val="0"/>
+        </a:spcBef>
+        <a:spcAft>
+          <a:spcPct val="0"/>
+        </a:spcAft>
+        <a:defRPr sz="1400">
+          <a:solidFill>
+            <a:srgbClr val="000000"/>
+          </a:solidFill>
+          <a:latin typeface="Arial" charset="0"/>
+          <a:ea typeface="Arial" charset="0"/>
+          <a:cs typeface="Arial" charset="0"/>
+          <a:sym typeface="Arial" charset="0"/>
+        </a:defRPr>
+      </a:lvl6pPr>
+      <a:lvl7pPr marL="914400" algn="l" rtl="0" eaLnBrk="0" fontAlgn="base" hangingPunct="0">
+        <a:spcBef>
+          <a:spcPct val="0"/>
+        </a:spcBef>
+        <a:spcAft>
+          <a:spcPct val="0"/>
+        </a:spcAft>
+        <a:defRPr sz="1400">
+          <a:solidFill>
+            <a:srgbClr val="000000"/>
+          </a:solidFill>
+          <a:latin typeface="Arial" charset="0"/>
+          <a:ea typeface="Arial" charset="0"/>
+          <a:cs typeface="Arial" charset="0"/>
+          <a:sym typeface="Arial" charset="0"/>
+        </a:defRPr>
+      </a:lvl7pPr>
+      <a:lvl8pPr marL="1371600" algn="l" rtl="0" eaLnBrk="0" fontAlgn="base" hangingPunct="0">
+        <a:spcBef>
+          <a:spcPct val="0"/>
+        </a:spcBef>
+        <a:spcAft>
+          <a:spcPct val="0"/>
+        </a:spcAft>
+        <a:defRPr sz="1400">
+          <a:solidFill>
+            <a:srgbClr val="000000"/>
+          </a:solidFill>
+          <a:latin typeface="Arial" charset="0"/>
+          <a:ea typeface="Arial" charset="0"/>
+          <a:cs typeface="Arial" charset="0"/>
+          <a:sym typeface="Arial" charset="0"/>
+        </a:defRPr>
+      </a:lvl8pPr>
+      <a:lvl9pPr marL="1828800" algn="l" rtl="0" eaLnBrk="0" fontAlgn="base" hangingPunct="0">
+        <a:spcBef>
+          <a:spcPct val="0"/>
+        </a:spcBef>
+        <a:spcAft>
+          <a:spcPct val="0"/>
+        </a:spcAft>
+        <a:defRPr sz="1400">
+          <a:solidFill>
+            <a:srgbClr val="000000"/>
+          </a:solidFill>
+          <a:latin typeface="Arial" charset="0"/>
+          <a:ea typeface="Arial" charset="0"/>
+          <a:cs typeface="Arial" charset="0"/>
+          <a:sym typeface="Arial" charset="0"/>
+        </a:defRPr>
+      </a:lvl9pPr>
     </p:titleStyle>
     <p:bodyStyle>
       <a:defPPr marR="0" lvl="0" algn="l" rtl="0">
@@ -3346,109 +3628,89 @@
           <a:spcPts val="0"/>
         </a:spcAft>
       </a:defPPr>
-      <a:lvl1pPr marR="0" lvl="0" algn="l" rtl="0">
-        <a:lnSpc>
-          <a:spcPct val="100000"/>
-        </a:lnSpc>
+      <a:lvl1pPr algn="l" rtl="0" eaLnBrk="0" fontAlgn="base" hangingPunct="0">
         <a:spcBef>
-          <a:spcPts val="0"/>
+          <a:spcPct val="0"/>
         </a:spcBef>
         <a:spcAft>
-          <a:spcPts val="0"/>
+          <a:spcPct val="0"/>
         </a:spcAft>
-        <a:buNone/>
-        <a:defRPr sz="1400" b="0" i="0" u="none" strike="noStrike" cap="none">
+        <a:defRPr sz="1400">
           <a:solidFill>
             <a:srgbClr val="000000"/>
           </a:solidFill>
           <a:latin typeface="Arial"/>
           <a:ea typeface="Arial"/>
           <a:cs typeface="Arial"/>
-          <a:sym typeface="Arial"/>
+          <a:sym typeface="Arial" charset="0"/>
         </a:defRPr>
       </a:lvl1pPr>
-      <a:lvl2pPr marR="0" lvl="1" algn="l" rtl="0">
-        <a:lnSpc>
-          <a:spcPct val="100000"/>
-        </a:lnSpc>
+      <a:lvl2pPr lvl="1" algn="l" rtl="0" eaLnBrk="0" fontAlgn="base" hangingPunct="0">
         <a:spcBef>
-          <a:spcPts val="0"/>
+          <a:spcPct val="0"/>
         </a:spcBef>
         <a:spcAft>
-          <a:spcPts val="0"/>
+          <a:spcPct val="0"/>
         </a:spcAft>
-        <a:buNone/>
-        <a:defRPr sz="1400" b="0" i="0" u="none" strike="noStrike" cap="none">
+        <a:defRPr sz="1400">
           <a:solidFill>
             <a:srgbClr val="000000"/>
           </a:solidFill>
           <a:latin typeface="Arial"/>
           <a:ea typeface="Arial"/>
           <a:cs typeface="Arial"/>
-          <a:sym typeface="Arial"/>
+          <a:sym typeface="Arial" charset="0"/>
         </a:defRPr>
       </a:lvl2pPr>
-      <a:lvl3pPr marR="0" lvl="2" algn="l" rtl="0">
-        <a:lnSpc>
-          <a:spcPct val="100000"/>
-        </a:lnSpc>
+      <a:lvl3pPr lvl="2" algn="l" rtl="0" eaLnBrk="0" fontAlgn="base" hangingPunct="0">
         <a:spcBef>
-          <a:spcPts val="0"/>
+          <a:spcPct val="0"/>
         </a:spcBef>
         <a:spcAft>
-          <a:spcPts val="0"/>
+          <a:spcPct val="0"/>
         </a:spcAft>
-        <a:buNone/>
-        <a:defRPr sz="1400" b="0" i="0" u="none" strike="noStrike" cap="none">
+        <a:defRPr sz="1400">
           <a:solidFill>
             <a:srgbClr val="000000"/>
           </a:solidFill>
           <a:latin typeface="Arial"/>
           <a:ea typeface="Arial"/>
           <a:cs typeface="Arial"/>
-          <a:sym typeface="Arial"/>
+          <a:sym typeface="Arial" charset="0"/>
         </a:defRPr>
       </a:lvl3pPr>
-      <a:lvl4pPr marR="0" lvl="3" algn="l" rtl="0">
-        <a:lnSpc>
-          <a:spcPct val="100000"/>
-        </a:lnSpc>
+      <a:lvl4pPr lvl="3" algn="l" rtl="0" eaLnBrk="0" fontAlgn="base" hangingPunct="0">
         <a:spcBef>
-          <a:spcPts val="0"/>
+          <a:spcPct val="0"/>
         </a:spcBef>
         <a:spcAft>
-          <a:spcPts val="0"/>
+          <a:spcPct val="0"/>
         </a:spcAft>
-        <a:buNone/>
-        <a:defRPr sz="1400" b="0" i="0" u="none" strike="noStrike" cap="none">
+        <a:defRPr sz="1400">
           <a:solidFill>
             <a:srgbClr val="000000"/>
           </a:solidFill>
           <a:latin typeface="Arial"/>
           <a:ea typeface="Arial"/>
           <a:cs typeface="Arial"/>
-          <a:sym typeface="Arial"/>
+          <a:sym typeface="Arial" charset="0"/>
         </a:defRPr>
       </a:lvl4pPr>
-      <a:lvl5pPr marR="0" lvl="4" algn="l" rtl="0">
-        <a:lnSpc>
-          <a:spcPct val="100000"/>
-        </a:lnSpc>
+      <a:lvl5pPr lvl="4" algn="l" rtl="0" eaLnBrk="0" fontAlgn="base" hangingPunct="0">
         <a:spcBef>
-          <a:spcPts val="0"/>
+          <a:spcPct val="0"/>
         </a:spcBef>
         <a:spcAft>
-          <a:spcPts val="0"/>
+          <a:spcPct val="0"/>
         </a:spcAft>
-        <a:buNone/>
-        <a:defRPr sz="1400" b="0" i="0" u="none" strike="noStrike" cap="none">
+        <a:defRPr sz="1400">
           <a:solidFill>
             <a:srgbClr val="000000"/>
           </a:solidFill>
           <a:latin typeface="Arial"/>
           <a:ea typeface="Arial"/>
           <a:cs typeface="Arial"/>
-          <a:sym typeface="Arial"/>
+          <a:sym typeface="Arial" charset="0"/>
         </a:defRPr>
       </a:lvl5pPr>
       <a:lvl6pPr marR="0" lvl="5" algn="l" rtl="0">
@@ -3755,7 +4017,7 @@
     </p:bg>
     <p:spTree>
       <p:nvGrpSpPr>
-        <p:cNvPr id="1" name="Shape 76"/>
+        <p:cNvPr id="1" name=""/>
         <p:cNvGrpSpPr/>
         <p:nvPr/>
       </p:nvGrpSpPr>
@@ -3769,7 +4031,7 @@
       </p:grpSpPr>
       <p:sp>
         <p:nvSpPr>
-          <p:cNvPr id="77" name="Shape 77"/>
+          <p:cNvPr id="14338" name="Shape 77"/>
           <p:cNvSpPr txBox="1">
             <a:spLocks noGrp="1"/>
           </p:cNvSpPr>
@@ -3779,91 +4041,77 @@
         </p:nvSpPr>
         <p:spPr>
           <a:xfrm>
-            <a:off x="-25" y="0"/>
-            <a:ext cx="9144000" cy="469500"/>
+            <a:off x="0" y="857250"/>
+            <a:ext cx="9144000" cy="469900"/>
           </a:xfrm>
-          <a:prstGeom prst="rect">
-            <a:avLst/>
-          </a:prstGeom>
           <a:solidFill>
             <a:srgbClr val="FFFFFF"/>
           </a:solidFill>
-          <a:ln w="19050" cap="flat" cmpd="sng">
+          <a:ln w="19050" cap="flat">
             <a:solidFill>
               <a:srgbClr val="FFFFFF"/>
             </a:solidFill>
-            <a:prstDash val="solid"/>
             <a:round/>
             <a:headEnd type="none" w="med" len="med"/>
             <a:tailEnd type="none" w="med" len="med"/>
           </a:ln>
         </p:spPr>
         <p:txBody>
-          <a:bodyPr lIns="91425" tIns="91425" rIns="91425" bIns="91425" anchor="ctr" anchorCtr="0">
-            <a:noAutofit/>
-          </a:bodyPr>
+          <a:bodyPr anchor="ctr"/>
           <a:lstStyle/>
           <a:p>
-            <a:pPr lvl="0" rtl="0">
-              <a:spcBef>
-                <a:spcPts val="0"/>
-              </a:spcBef>
-              <a:buNone/>
+            <a:pPr eaLnBrk="1" hangingPunct="1">
+              <a:spcBef>
+                <a:spcPct val="0"/>
+              </a:spcBef>
+              <a:spcAft>
+                <a:spcPct val="0"/>
+              </a:spcAft>
+              <a:buClr>
+                <a:srgbClr val="595959"/>
+              </a:buClr>
+              <a:buSzTx/>
             </a:pPr>
             <a:r>
-              <a:rPr lang="en" sz="1800" b="1" dirty="0">
+              <a:rPr lang="en-US" altLang="en-US" sz="1800" b="1">
                 <a:solidFill>
                   <a:srgbClr val="003399"/>
                 </a:solidFill>
-                <a:latin typeface="Corsiva"/>
-                <a:ea typeface="Corsiva"/>
-                <a:cs typeface="Corsiva"/>
-                <a:sym typeface="Corsiva"/>
+                <a:latin typeface="Corsiva" charset="-79"/>
+                <a:ea typeface="Corsiva" charset="-79"/>
+                <a:cs typeface="Corsiva" charset="-79"/>
+                <a:sym typeface="Corsiva" charset="-79"/>
               </a:rPr>
-              <a:t>LIVING HIS </a:t>
+              <a:t>LIVING HIS MESSAGE - Prayers for Global Peace</a:t>
             </a:r>
-            <a:r>
-              <a:rPr lang="en" sz="1800" b="1" dirty="0" smtClean="0">
-                <a:solidFill>
-                  <a:srgbClr val="003399"/>
-                </a:solidFill>
-                <a:latin typeface="Corsiva"/>
-                <a:ea typeface="Corsiva"/>
-                <a:cs typeface="Corsiva"/>
-                <a:sym typeface="Corsiva"/>
-              </a:rPr>
-              <a:t>MESSAGE - Prayers for Global Peace</a:t>
-            </a:r>
-            <a:endParaRPr lang="en" sz="1800" b="1" dirty="0">
-              <a:solidFill>
-                <a:srgbClr val="003399"/>
-              </a:solidFill>
-              <a:latin typeface="Corsiva"/>
-              <a:ea typeface="Corsiva"/>
-              <a:cs typeface="Corsiva"/>
-              <a:sym typeface="Corsiva"/>
-            </a:endParaRPr>
           </a:p>
         </p:txBody>
       </p:sp>
       <p:pic>
         <p:nvPicPr>
-          <p:cNvPr id="79" name="Shape 79" descr="imageedit_6_2984767030.gif"/>
-          <p:cNvPicPr preferRelativeResize="0"/>
+          <p:cNvPr id="14339" name="Shape 79" descr="imageedit_6_2984767030.gif"/>
+          <p:cNvPicPr preferRelativeResize="0">
+            <a:picLocks noChangeAspect="1" noChangeArrowheads="1"/>
+          </p:cNvPicPr>
           <p:nvPr/>
         </p:nvPicPr>
         <p:blipFill>
           <a:blip r:embed="rId3">
-            <a:alphaModFix/>
+            <a:extLst>
+              <a:ext uri="{28A0092B-C50C-407E-A947-70E740481C1C}">
+                <a14:useLocalDpi xmlns:a14="http://schemas.microsoft.com/office/drawing/2010/main" val="0"/>
+              </a:ext>
+            </a:extLst>
           </a:blip>
+          <a:srcRect/>
           <a:stretch>
             <a:fillRect/>
           </a:stretch>
         </p:blipFill>
-        <p:spPr>
+        <p:spPr bwMode="auto">
           <a:xfrm>
-            <a:off x="8064275" y="0"/>
-            <a:ext cx="1079700" cy="1079700"/>
+            <a:off x="8064500" y="857250"/>
+            <a:ext cx="1079500" cy="1079500"/>
           </a:xfrm>
           <a:prstGeom prst="rect">
             <a:avLst/>
@@ -3872,18 +4120,39 @@
           <a:ln>
             <a:noFill/>
           </a:ln>
+          <a:extLst>
+            <a:ext uri="{909E8E84-426E-40DD-AFC4-6F175D3DCCD1}">
+              <a14:hiddenFill xmlns:a14="http://schemas.microsoft.com/office/drawing/2010/main">
+                <a:solidFill>
+                  <a:srgbClr val="FFFFFF"/>
+                </a:solidFill>
+              </a14:hiddenFill>
+            </a:ext>
+            <a:ext uri="{91240B29-F687-4F45-9708-019B960494DF}">
+              <a14:hiddenLine xmlns:a14="http://schemas.microsoft.com/office/drawing/2010/main" w="9525">
+                <a:solidFill>
+                  <a:srgbClr val="000000"/>
+                </a:solidFill>
+                <a:miter lim="800000"/>
+                <a:headEnd/>
+                <a:tailEnd/>
+              </a14:hiddenLine>
+            </a:ext>
+          </a:extLst>
         </p:spPr>
       </p:pic>
       <p:sp>
         <p:nvSpPr>
-          <p:cNvPr id="80" name="Shape 80"/>
-          <p:cNvSpPr txBox="1"/>
+          <p:cNvPr id="14340" name="Shape 80"/>
+          <p:cNvSpPr txBox="1">
+            <a:spLocks noChangeArrowheads="1"/>
+          </p:cNvSpPr>
           <p:nvPr/>
         </p:nvSpPr>
-        <p:spPr>
+        <p:spPr bwMode="auto">
           <a:xfrm>
-            <a:off x="133475" y="1231500"/>
-            <a:ext cx="8901000" cy="1974000"/>
+            <a:off x="133351" y="2089151"/>
+            <a:ext cx="8901113" cy="1973263"/>
           </a:xfrm>
           <a:prstGeom prst="rect">
             <a:avLst/>
@@ -3892,66 +4161,195 @@
           <a:ln>
             <a:noFill/>
           </a:ln>
+          <a:extLst>
+            <a:ext uri="{909E8E84-426E-40DD-AFC4-6F175D3DCCD1}">
+              <a14:hiddenFill xmlns:a14="http://schemas.microsoft.com/office/drawing/2010/main">
+                <a:solidFill>
+                  <a:srgbClr val="FFFFFF"/>
+                </a:solidFill>
+              </a14:hiddenFill>
+            </a:ext>
+            <a:ext uri="{91240B29-F687-4F45-9708-019B960494DF}">
+              <a14:hiddenLine xmlns:a14="http://schemas.microsoft.com/office/drawing/2010/main" w="9525">
+                <a:solidFill>
+                  <a:srgbClr val="000000"/>
+                </a:solidFill>
+                <a:miter lim="800000"/>
+                <a:headEnd/>
+                <a:tailEnd/>
+              </a14:hiddenLine>
+            </a:ext>
+          </a:extLst>
         </p:spPr>
         <p:txBody>
-          <a:bodyPr lIns="91425" tIns="91425" rIns="91425" bIns="91425" anchor="t" anchorCtr="0">
-            <a:noAutofit/>
-          </a:bodyPr>
-          <a:lstStyle/>
+          <a:bodyPr lIns="91425" tIns="91425" rIns="91425" bIns="91425"/>
+          <a:lstStyle>
+            <a:lvl1pPr>
+              <a:defRPr sz="1400">
+                <a:solidFill>
+                  <a:srgbClr val="000000"/>
+                </a:solidFill>
+                <a:latin typeface="Arial" charset="0"/>
+                <a:ea typeface="Arial" charset="0"/>
+                <a:cs typeface="Arial" charset="0"/>
+                <a:sym typeface="Arial" charset="0"/>
+              </a:defRPr>
+            </a:lvl1pPr>
+            <a:lvl2pPr marL="742950" indent="-285750">
+              <a:defRPr sz="1400">
+                <a:solidFill>
+                  <a:srgbClr val="000000"/>
+                </a:solidFill>
+                <a:latin typeface="Arial" charset="0"/>
+                <a:ea typeface="Arial" charset="0"/>
+                <a:cs typeface="Arial" charset="0"/>
+                <a:sym typeface="Arial" charset="0"/>
+              </a:defRPr>
+            </a:lvl2pPr>
+            <a:lvl3pPr marL="1143000" indent="-228600">
+              <a:defRPr sz="1400">
+                <a:solidFill>
+                  <a:srgbClr val="000000"/>
+                </a:solidFill>
+                <a:latin typeface="Arial" charset="0"/>
+                <a:ea typeface="Arial" charset="0"/>
+                <a:cs typeface="Arial" charset="0"/>
+                <a:sym typeface="Arial" charset="0"/>
+              </a:defRPr>
+            </a:lvl3pPr>
+            <a:lvl4pPr marL="1600200" indent="-228600">
+              <a:defRPr sz="1400">
+                <a:solidFill>
+                  <a:srgbClr val="000000"/>
+                </a:solidFill>
+                <a:latin typeface="Arial" charset="0"/>
+                <a:ea typeface="Arial" charset="0"/>
+                <a:cs typeface="Arial" charset="0"/>
+                <a:sym typeface="Arial" charset="0"/>
+              </a:defRPr>
+            </a:lvl4pPr>
+            <a:lvl5pPr marL="2057400" indent="-228600">
+              <a:defRPr sz="1400">
+                <a:solidFill>
+                  <a:srgbClr val="000000"/>
+                </a:solidFill>
+                <a:latin typeface="Arial" charset="0"/>
+                <a:ea typeface="Arial" charset="0"/>
+                <a:cs typeface="Arial" charset="0"/>
+                <a:sym typeface="Arial" charset="0"/>
+              </a:defRPr>
+            </a:lvl5pPr>
+            <a:lvl6pPr marL="2514600" indent="-228600" eaLnBrk="0" fontAlgn="base" hangingPunct="0">
+              <a:spcBef>
+                <a:spcPct val="0"/>
+              </a:spcBef>
+              <a:spcAft>
+                <a:spcPct val="0"/>
+              </a:spcAft>
+              <a:defRPr sz="1400">
+                <a:solidFill>
+                  <a:srgbClr val="000000"/>
+                </a:solidFill>
+                <a:latin typeface="Arial" charset="0"/>
+                <a:ea typeface="Arial" charset="0"/>
+                <a:cs typeface="Arial" charset="0"/>
+                <a:sym typeface="Arial" charset="0"/>
+              </a:defRPr>
+            </a:lvl6pPr>
+            <a:lvl7pPr marL="2971800" indent="-228600" eaLnBrk="0" fontAlgn="base" hangingPunct="0">
+              <a:spcBef>
+                <a:spcPct val="0"/>
+              </a:spcBef>
+              <a:spcAft>
+                <a:spcPct val="0"/>
+              </a:spcAft>
+              <a:defRPr sz="1400">
+                <a:solidFill>
+                  <a:srgbClr val="000000"/>
+                </a:solidFill>
+                <a:latin typeface="Arial" charset="0"/>
+                <a:ea typeface="Arial" charset="0"/>
+                <a:cs typeface="Arial" charset="0"/>
+                <a:sym typeface="Arial" charset="0"/>
+              </a:defRPr>
+            </a:lvl7pPr>
+            <a:lvl8pPr marL="3429000" indent="-228600" eaLnBrk="0" fontAlgn="base" hangingPunct="0">
+              <a:spcBef>
+                <a:spcPct val="0"/>
+              </a:spcBef>
+              <a:spcAft>
+                <a:spcPct val="0"/>
+              </a:spcAft>
+              <a:defRPr sz="1400">
+                <a:solidFill>
+                  <a:srgbClr val="000000"/>
+                </a:solidFill>
+                <a:latin typeface="Arial" charset="0"/>
+                <a:ea typeface="Arial" charset="0"/>
+                <a:cs typeface="Arial" charset="0"/>
+                <a:sym typeface="Arial" charset="0"/>
+              </a:defRPr>
+            </a:lvl8pPr>
+            <a:lvl9pPr marL="3886200" indent="-228600" eaLnBrk="0" fontAlgn="base" hangingPunct="0">
+              <a:spcBef>
+                <a:spcPct val="0"/>
+              </a:spcBef>
+              <a:spcAft>
+                <a:spcPct val="0"/>
+              </a:spcAft>
+              <a:defRPr sz="1400">
+                <a:solidFill>
+                  <a:srgbClr val="000000"/>
+                </a:solidFill>
+                <a:latin typeface="Arial" charset="0"/>
+                <a:ea typeface="Arial" charset="0"/>
+                <a:cs typeface="Arial" charset="0"/>
+                <a:sym typeface="Arial" charset="0"/>
+              </a:defRPr>
+            </a:lvl9pPr>
+          </a:lstStyle>
           <a:p>
-            <a:pPr lvl="0" algn="ctr" rtl="0">
+            <a:pPr algn="ctr" eaLnBrk="1" hangingPunct="1">
               <a:lnSpc>
                 <a:spcPct val="115000"/>
               </a:lnSpc>
-              <a:spcBef>
-                <a:spcPts val="0"/>
-              </a:spcBef>
               <a:buClr>
-                <a:schemeClr val="dk1"/>
+                <a:srgbClr val="000000"/>
               </a:buClr>
-              <a:buSzPct val="45833"/>
-              <a:buFont typeface="Arial"/>
+              <a:buSzPct val="46000"/>
+              <a:buFont typeface="Arial" charset="0"/>
               <a:buNone/>
             </a:pPr>
             <a:r>
-              <a:rPr lang="en-US" sz="2800" dirty="0" err="1" smtClean="0">
+              <a:rPr lang="en-US" altLang="en-US" sz="2800">
                 <a:solidFill>
                   <a:srgbClr val="FFFFFF"/>
                 </a:solidFill>
-                <a:latin typeface="Calibri" panose="020F0502020204030204" pitchFamily="34" charset="0"/>
+                <a:latin typeface="Calibri" charset="0"/>
               </a:rPr>
               <a:t>Bhajan</a:t>
             </a:r>
-            <a:endParaRPr lang="en" sz="2800" dirty="0">
-              <a:solidFill>
-                <a:srgbClr val="FFFFFF"/>
-              </a:solidFill>
-              <a:latin typeface="Calibri" panose="020F0502020204030204" pitchFamily="34" charset="0"/>
-            </a:endParaRPr>
           </a:p>
           <a:p>
-            <a:pPr lvl="0" rtl="0">
-              <a:spcBef>
-                <a:spcPts val="0"/>
-              </a:spcBef>
-              <a:buNone/>
-            </a:pPr>
-            <a:endParaRPr sz="1600" dirty="0">
-              <a:latin typeface="Calibri" panose="020F0502020204030204" pitchFamily="34" charset="0"/>
+            <a:pPr eaLnBrk="1" hangingPunct="1"/>
+            <a:endParaRPr lang="en-US" altLang="en-US" sz="1600">
+              <a:latin typeface="Calibri" charset="0"/>
             </a:endParaRPr>
           </a:p>
         </p:txBody>
       </p:sp>
       <p:sp>
         <p:nvSpPr>
-          <p:cNvPr id="81" name="Shape 81"/>
-          <p:cNvSpPr txBox="1"/>
+          <p:cNvPr id="14341" name="Shape 81"/>
+          <p:cNvSpPr txBox="1">
+            <a:spLocks noChangeArrowheads="1"/>
+          </p:cNvSpPr>
           <p:nvPr/>
         </p:nvSpPr>
-        <p:spPr>
+        <p:spPr bwMode="auto">
           <a:xfrm>
-            <a:off x="482525" y="3746100"/>
-            <a:ext cx="8285100" cy="704400"/>
+            <a:off x="482601" y="4603751"/>
+            <a:ext cx="8285163" cy="703263"/>
           </a:xfrm>
           <a:prstGeom prst="rect">
             <a:avLst/>
@@ -3960,63 +4358,188 @@
           <a:ln>
             <a:noFill/>
           </a:ln>
+          <a:extLst>
+            <a:ext uri="{909E8E84-426E-40DD-AFC4-6F175D3DCCD1}">
+              <a14:hiddenFill xmlns:a14="http://schemas.microsoft.com/office/drawing/2010/main">
+                <a:solidFill>
+                  <a:srgbClr val="FFFFFF"/>
+                </a:solidFill>
+              </a14:hiddenFill>
+            </a:ext>
+            <a:ext uri="{91240B29-F687-4F45-9708-019B960494DF}">
+              <a14:hiddenLine xmlns:a14="http://schemas.microsoft.com/office/drawing/2010/main" w="9525">
+                <a:solidFill>
+                  <a:srgbClr val="000000"/>
+                </a:solidFill>
+                <a:miter lim="800000"/>
+                <a:headEnd/>
+                <a:tailEnd/>
+              </a14:hiddenLine>
+            </a:ext>
+          </a:extLst>
         </p:spPr>
         <p:txBody>
-          <a:bodyPr lIns="91425" tIns="91425" rIns="91425" bIns="91425" anchor="t" anchorCtr="0">
-            <a:noAutofit/>
-          </a:bodyPr>
-          <a:lstStyle/>
+          <a:bodyPr lIns="91425" tIns="91425" rIns="91425" bIns="91425"/>
+          <a:lstStyle>
+            <a:lvl1pPr>
+              <a:defRPr sz="1400">
+                <a:solidFill>
+                  <a:srgbClr val="000000"/>
+                </a:solidFill>
+                <a:latin typeface="Arial" charset="0"/>
+                <a:ea typeface="Arial" charset="0"/>
+                <a:cs typeface="Arial" charset="0"/>
+                <a:sym typeface="Arial" charset="0"/>
+              </a:defRPr>
+            </a:lvl1pPr>
+            <a:lvl2pPr marL="742950" indent="-285750">
+              <a:defRPr sz="1400">
+                <a:solidFill>
+                  <a:srgbClr val="000000"/>
+                </a:solidFill>
+                <a:latin typeface="Arial" charset="0"/>
+                <a:ea typeface="Arial" charset="0"/>
+                <a:cs typeface="Arial" charset="0"/>
+                <a:sym typeface="Arial" charset="0"/>
+              </a:defRPr>
+            </a:lvl2pPr>
+            <a:lvl3pPr marL="1143000" indent="-228600">
+              <a:defRPr sz="1400">
+                <a:solidFill>
+                  <a:srgbClr val="000000"/>
+                </a:solidFill>
+                <a:latin typeface="Arial" charset="0"/>
+                <a:ea typeface="Arial" charset="0"/>
+                <a:cs typeface="Arial" charset="0"/>
+                <a:sym typeface="Arial" charset="0"/>
+              </a:defRPr>
+            </a:lvl3pPr>
+            <a:lvl4pPr marL="1600200" indent="-228600">
+              <a:defRPr sz="1400">
+                <a:solidFill>
+                  <a:srgbClr val="000000"/>
+                </a:solidFill>
+                <a:latin typeface="Arial" charset="0"/>
+                <a:ea typeface="Arial" charset="0"/>
+                <a:cs typeface="Arial" charset="0"/>
+                <a:sym typeface="Arial" charset="0"/>
+              </a:defRPr>
+            </a:lvl4pPr>
+            <a:lvl5pPr marL="2057400" indent="-228600">
+              <a:defRPr sz="1400">
+                <a:solidFill>
+                  <a:srgbClr val="000000"/>
+                </a:solidFill>
+                <a:latin typeface="Arial" charset="0"/>
+                <a:ea typeface="Arial" charset="0"/>
+                <a:cs typeface="Arial" charset="0"/>
+                <a:sym typeface="Arial" charset="0"/>
+              </a:defRPr>
+            </a:lvl5pPr>
+            <a:lvl6pPr marL="2514600" indent="-228600" eaLnBrk="0" fontAlgn="base" hangingPunct="0">
+              <a:spcBef>
+                <a:spcPct val="0"/>
+              </a:spcBef>
+              <a:spcAft>
+                <a:spcPct val="0"/>
+              </a:spcAft>
+              <a:defRPr sz="1400">
+                <a:solidFill>
+                  <a:srgbClr val="000000"/>
+                </a:solidFill>
+                <a:latin typeface="Arial" charset="0"/>
+                <a:ea typeface="Arial" charset="0"/>
+                <a:cs typeface="Arial" charset="0"/>
+                <a:sym typeface="Arial" charset="0"/>
+              </a:defRPr>
+            </a:lvl6pPr>
+            <a:lvl7pPr marL="2971800" indent="-228600" eaLnBrk="0" fontAlgn="base" hangingPunct="0">
+              <a:spcBef>
+                <a:spcPct val="0"/>
+              </a:spcBef>
+              <a:spcAft>
+                <a:spcPct val="0"/>
+              </a:spcAft>
+              <a:defRPr sz="1400">
+                <a:solidFill>
+                  <a:srgbClr val="000000"/>
+                </a:solidFill>
+                <a:latin typeface="Arial" charset="0"/>
+                <a:ea typeface="Arial" charset="0"/>
+                <a:cs typeface="Arial" charset="0"/>
+                <a:sym typeface="Arial" charset="0"/>
+              </a:defRPr>
+            </a:lvl7pPr>
+            <a:lvl8pPr marL="3429000" indent="-228600" eaLnBrk="0" fontAlgn="base" hangingPunct="0">
+              <a:spcBef>
+                <a:spcPct val="0"/>
+              </a:spcBef>
+              <a:spcAft>
+                <a:spcPct val="0"/>
+              </a:spcAft>
+              <a:defRPr sz="1400">
+                <a:solidFill>
+                  <a:srgbClr val="000000"/>
+                </a:solidFill>
+                <a:latin typeface="Arial" charset="0"/>
+                <a:ea typeface="Arial" charset="0"/>
+                <a:cs typeface="Arial" charset="0"/>
+                <a:sym typeface="Arial" charset="0"/>
+              </a:defRPr>
+            </a:lvl8pPr>
+            <a:lvl9pPr marL="3886200" indent="-228600" eaLnBrk="0" fontAlgn="base" hangingPunct="0">
+              <a:spcBef>
+                <a:spcPct val="0"/>
+              </a:spcBef>
+              <a:spcAft>
+                <a:spcPct val="0"/>
+              </a:spcAft>
+              <a:defRPr sz="1400">
+                <a:solidFill>
+                  <a:srgbClr val="000000"/>
+                </a:solidFill>
+                <a:latin typeface="Arial" charset="0"/>
+                <a:ea typeface="Arial" charset="0"/>
+                <a:cs typeface="Arial" charset="0"/>
+                <a:sym typeface="Arial" charset="0"/>
+              </a:defRPr>
+            </a:lvl9pPr>
+          </a:lstStyle>
           <a:p>
-            <a:pPr lvl="0" algn="ctr" rtl="0">
+            <a:pPr algn="ctr" eaLnBrk="1" hangingPunct="1">
               <a:lnSpc>
                 <a:spcPct val="115000"/>
               </a:lnSpc>
-              <a:spcBef>
-                <a:spcPts val="0"/>
-              </a:spcBef>
               <a:buClr>
-                <a:schemeClr val="dk1"/>
+                <a:srgbClr val="000000"/>
               </a:buClr>
-              <a:buFont typeface="Arial"/>
+              <a:buFont typeface="Arial" charset="0"/>
               <a:buNone/>
             </a:pPr>
             <a:r>
-              <a:rPr lang="en-US" i="1" dirty="0">
+              <a:rPr lang="en-US" altLang="en-US" i="1">
                 <a:solidFill>
                   <a:srgbClr val="FFFF00"/>
                 </a:solidFill>
-                <a:latin typeface="Calibri" panose="020F0502020204030204" pitchFamily="34" charset="0"/>
+                <a:latin typeface="Calibri" charset="0"/>
               </a:rPr>
-              <a:t>M</a:t>
+              <a:t>Meaning</a:t>
             </a:r>
-            <a:r>
-              <a:rPr lang="en-US" i="1" dirty="0" smtClean="0">
-                <a:solidFill>
-                  <a:srgbClr val="FFFF00"/>
-                </a:solidFill>
-                <a:latin typeface="Calibri" panose="020F0502020204030204" pitchFamily="34" charset="0"/>
-              </a:rPr>
-              <a:t>eaning</a:t>
-            </a:r>
-            <a:endParaRPr lang="en" i="1" dirty="0">
-              <a:solidFill>
-                <a:srgbClr val="FFFF00"/>
-              </a:solidFill>
-              <a:latin typeface="Calibri" panose="020F0502020204030204" pitchFamily="34" charset="0"/>
-            </a:endParaRPr>
           </a:p>
         </p:txBody>
       </p:sp>
       <p:sp>
         <p:nvSpPr>
-          <p:cNvPr id="82" name="Shape 82"/>
-          <p:cNvSpPr txBox="1"/>
+          <p:cNvPr id="14342" name="Shape 82"/>
+          <p:cNvSpPr txBox="1">
+            <a:spLocks noChangeArrowheads="1"/>
+          </p:cNvSpPr>
           <p:nvPr/>
         </p:nvSpPr>
-        <p:spPr>
+        <p:spPr bwMode="auto">
           <a:xfrm>
-            <a:off x="3771900" y="4804700"/>
-            <a:ext cx="1591200" cy="339000"/>
+            <a:off x="3771901" y="5662614"/>
+            <a:ext cx="1590675" cy="338137"/>
           </a:xfrm>
           <a:prstGeom prst="rect">
             <a:avLst/>
@@ -4025,33 +4548,171 @@
           <a:ln>
             <a:noFill/>
           </a:ln>
+          <a:extLst>
+            <a:ext uri="{909E8E84-426E-40DD-AFC4-6F175D3DCCD1}">
+              <a14:hiddenFill xmlns:a14="http://schemas.microsoft.com/office/drawing/2010/main">
+                <a:solidFill>
+                  <a:srgbClr val="FFFFFF"/>
+                </a:solidFill>
+              </a14:hiddenFill>
+            </a:ext>
+            <a:ext uri="{91240B29-F687-4F45-9708-019B960494DF}">
+              <a14:hiddenLine xmlns:a14="http://schemas.microsoft.com/office/drawing/2010/main" w="9525">
+                <a:solidFill>
+                  <a:srgbClr val="000000"/>
+                </a:solidFill>
+                <a:miter lim="800000"/>
+                <a:headEnd/>
+                <a:tailEnd/>
+              </a14:hiddenLine>
+            </a:ext>
+          </a:extLst>
         </p:spPr>
         <p:txBody>
-          <a:bodyPr lIns="91425" tIns="91425" rIns="91425" bIns="91425" anchor="ctr" anchorCtr="0">
-            <a:noAutofit/>
-          </a:bodyPr>
-          <a:lstStyle/>
+          <a:bodyPr lIns="91425" tIns="91425" rIns="91425" bIns="91425" anchor="ctr"/>
+          <a:lstStyle>
+            <a:lvl1pPr>
+              <a:defRPr sz="1400">
+                <a:solidFill>
+                  <a:srgbClr val="000000"/>
+                </a:solidFill>
+                <a:latin typeface="Arial" charset="0"/>
+                <a:ea typeface="Arial" charset="0"/>
+                <a:cs typeface="Arial" charset="0"/>
+                <a:sym typeface="Arial" charset="0"/>
+              </a:defRPr>
+            </a:lvl1pPr>
+            <a:lvl2pPr marL="742950" indent="-285750">
+              <a:defRPr sz="1400">
+                <a:solidFill>
+                  <a:srgbClr val="000000"/>
+                </a:solidFill>
+                <a:latin typeface="Arial" charset="0"/>
+                <a:ea typeface="Arial" charset="0"/>
+                <a:cs typeface="Arial" charset="0"/>
+                <a:sym typeface="Arial" charset="0"/>
+              </a:defRPr>
+            </a:lvl2pPr>
+            <a:lvl3pPr marL="1143000" indent="-228600">
+              <a:defRPr sz="1400">
+                <a:solidFill>
+                  <a:srgbClr val="000000"/>
+                </a:solidFill>
+                <a:latin typeface="Arial" charset="0"/>
+                <a:ea typeface="Arial" charset="0"/>
+                <a:cs typeface="Arial" charset="0"/>
+                <a:sym typeface="Arial" charset="0"/>
+              </a:defRPr>
+            </a:lvl3pPr>
+            <a:lvl4pPr marL="1600200" indent="-228600">
+              <a:defRPr sz="1400">
+                <a:solidFill>
+                  <a:srgbClr val="000000"/>
+                </a:solidFill>
+                <a:latin typeface="Arial" charset="0"/>
+                <a:ea typeface="Arial" charset="0"/>
+                <a:cs typeface="Arial" charset="0"/>
+                <a:sym typeface="Arial" charset="0"/>
+              </a:defRPr>
+            </a:lvl4pPr>
+            <a:lvl5pPr marL="2057400" indent="-228600">
+              <a:defRPr sz="1400">
+                <a:solidFill>
+                  <a:srgbClr val="000000"/>
+                </a:solidFill>
+                <a:latin typeface="Arial" charset="0"/>
+                <a:ea typeface="Arial" charset="0"/>
+                <a:cs typeface="Arial" charset="0"/>
+                <a:sym typeface="Arial" charset="0"/>
+              </a:defRPr>
+            </a:lvl5pPr>
+            <a:lvl6pPr marL="2514600" indent="-228600" eaLnBrk="0" fontAlgn="base" hangingPunct="0">
+              <a:spcBef>
+                <a:spcPct val="0"/>
+              </a:spcBef>
+              <a:spcAft>
+                <a:spcPct val="0"/>
+              </a:spcAft>
+              <a:defRPr sz="1400">
+                <a:solidFill>
+                  <a:srgbClr val="000000"/>
+                </a:solidFill>
+                <a:latin typeface="Arial" charset="0"/>
+                <a:ea typeface="Arial" charset="0"/>
+                <a:cs typeface="Arial" charset="0"/>
+                <a:sym typeface="Arial" charset="0"/>
+              </a:defRPr>
+            </a:lvl6pPr>
+            <a:lvl7pPr marL="2971800" indent="-228600" eaLnBrk="0" fontAlgn="base" hangingPunct="0">
+              <a:spcBef>
+                <a:spcPct val="0"/>
+              </a:spcBef>
+              <a:spcAft>
+                <a:spcPct val="0"/>
+              </a:spcAft>
+              <a:defRPr sz="1400">
+                <a:solidFill>
+                  <a:srgbClr val="000000"/>
+                </a:solidFill>
+                <a:latin typeface="Arial" charset="0"/>
+                <a:ea typeface="Arial" charset="0"/>
+                <a:cs typeface="Arial" charset="0"/>
+                <a:sym typeface="Arial" charset="0"/>
+              </a:defRPr>
+            </a:lvl7pPr>
+            <a:lvl8pPr marL="3429000" indent="-228600" eaLnBrk="0" fontAlgn="base" hangingPunct="0">
+              <a:spcBef>
+                <a:spcPct val="0"/>
+              </a:spcBef>
+              <a:spcAft>
+                <a:spcPct val="0"/>
+              </a:spcAft>
+              <a:defRPr sz="1400">
+                <a:solidFill>
+                  <a:srgbClr val="000000"/>
+                </a:solidFill>
+                <a:latin typeface="Arial" charset="0"/>
+                <a:ea typeface="Arial" charset="0"/>
+                <a:cs typeface="Arial" charset="0"/>
+                <a:sym typeface="Arial" charset="0"/>
+              </a:defRPr>
+            </a:lvl8pPr>
+            <a:lvl9pPr marL="3886200" indent="-228600" eaLnBrk="0" fontAlgn="base" hangingPunct="0">
+              <a:spcBef>
+                <a:spcPct val="0"/>
+              </a:spcBef>
+              <a:spcAft>
+                <a:spcPct val="0"/>
+              </a:spcAft>
+              <a:defRPr sz="1400">
+                <a:solidFill>
+                  <a:srgbClr val="000000"/>
+                </a:solidFill>
+                <a:latin typeface="Arial" charset="0"/>
+                <a:ea typeface="Arial" charset="0"/>
+                <a:cs typeface="Arial" charset="0"/>
+                <a:sym typeface="Arial" charset="0"/>
+              </a:defRPr>
+            </a:lvl9pPr>
+          </a:lstStyle>
           <a:p>
-            <a:pPr lvl="0" rtl="0">
-              <a:spcBef>
-                <a:spcPts val="0"/>
-              </a:spcBef>
-              <a:buNone/>
-            </a:pPr>
-            <a:endParaRPr/>
+            <a:pPr eaLnBrk="1" hangingPunct="1"/>
+            <a:endParaRPr lang="en-US" altLang="en-US"/>
           </a:p>
         </p:txBody>
       </p:sp>
       <p:sp>
         <p:nvSpPr>
-          <p:cNvPr id="83" name="Shape 83"/>
-          <p:cNvSpPr txBox="1"/>
+          <p:cNvPr id="14343" name="Shape 83"/>
+          <p:cNvSpPr txBox="1">
+            <a:spLocks noChangeArrowheads="1"/>
+          </p:cNvSpPr>
           <p:nvPr/>
         </p:nvSpPr>
-        <p:spPr>
+        <p:spPr bwMode="auto">
           <a:xfrm>
-            <a:off x="-8875" y="4845775"/>
-            <a:ext cx="9144000" cy="297600"/>
+            <a:off x="-9525" y="5702300"/>
+            <a:ext cx="9144000" cy="298450"/>
           </a:xfrm>
           <a:prstGeom prst="rect">
             <a:avLst/>
@@ -4062,33 +4723,164 @@
           <a:ln>
             <a:noFill/>
           </a:ln>
+          <a:extLst>
+            <a:ext uri="{91240B29-F687-4F45-9708-019B960494DF}">
+              <a14:hiddenLine xmlns:a14="http://schemas.microsoft.com/office/drawing/2010/main" w="9525">
+                <a:solidFill>
+                  <a:srgbClr val="000000"/>
+                </a:solidFill>
+                <a:miter lim="800000"/>
+                <a:headEnd/>
+                <a:tailEnd/>
+              </a14:hiddenLine>
+            </a:ext>
+          </a:extLst>
         </p:spPr>
         <p:txBody>
-          <a:bodyPr lIns="91425" tIns="91425" rIns="91425" bIns="91425" anchor="t" anchorCtr="0">
-            <a:noAutofit/>
-          </a:bodyPr>
-          <a:lstStyle/>
+          <a:bodyPr lIns="91425" tIns="91425" rIns="91425" bIns="91425"/>
+          <a:lstStyle>
+            <a:lvl1pPr>
+              <a:defRPr sz="1400">
+                <a:solidFill>
+                  <a:srgbClr val="000000"/>
+                </a:solidFill>
+                <a:latin typeface="Arial" charset="0"/>
+                <a:ea typeface="Arial" charset="0"/>
+                <a:cs typeface="Arial" charset="0"/>
+                <a:sym typeface="Arial" charset="0"/>
+              </a:defRPr>
+            </a:lvl1pPr>
+            <a:lvl2pPr marL="742950" indent="-285750">
+              <a:defRPr sz="1400">
+                <a:solidFill>
+                  <a:srgbClr val="000000"/>
+                </a:solidFill>
+                <a:latin typeface="Arial" charset="0"/>
+                <a:ea typeface="Arial" charset="0"/>
+                <a:cs typeface="Arial" charset="0"/>
+                <a:sym typeface="Arial" charset="0"/>
+              </a:defRPr>
+            </a:lvl2pPr>
+            <a:lvl3pPr marL="1143000" indent="-228600">
+              <a:defRPr sz="1400">
+                <a:solidFill>
+                  <a:srgbClr val="000000"/>
+                </a:solidFill>
+                <a:latin typeface="Arial" charset="0"/>
+                <a:ea typeface="Arial" charset="0"/>
+                <a:cs typeface="Arial" charset="0"/>
+                <a:sym typeface="Arial" charset="0"/>
+              </a:defRPr>
+            </a:lvl3pPr>
+            <a:lvl4pPr marL="1600200" indent="-228600">
+              <a:defRPr sz="1400">
+                <a:solidFill>
+                  <a:srgbClr val="000000"/>
+                </a:solidFill>
+                <a:latin typeface="Arial" charset="0"/>
+                <a:ea typeface="Arial" charset="0"/>
+                <a:cs typeface="Arial" charset="0"/>
+                <a:sym typeface="Arial" charset="0"/>
+              </a:defRPr>
+            </a:lvl4pPr>
+            <a:lvl5pPr marL="2057400" indent="-228600">
+              <a:defRPr sz="1400">
+                <a:solidFill>
+                  <a:srgbClr val="000000"/>
+                </a:solidFill>
+                <a:latin typeface="Arial" charset="0"/>
+                <a:ea typeface="Arial" charset="0"/>
+                <a:cs typeface="Arial" charset="0"/>
+                <a:sym typeface="Arial" charset="0"/>
+              </a:defRPr>
+            </a:lvl5pPr>
+            <a:lvl6pPr marL="2514600" indent="-228600" eaLnBrk="0" fontAlgn="base" hangingPunct="0">
+              <a:spcBef>
+                <a:spcPct val="0"/>
+              </a:spcBef>
+              <a:spcAft>
+                <a:spcPct val="0"/>
+              </a:spcAft>
+              <a:defRPr sz="1400">
+                <a:solidFill>
+                  <a:srgbClr val="000000"/>
+                </a:solidFill>
+                <a:latin typeface="Arial" charset="0"/>
+                <a:ea typeface="Arial" charset="0"/>
+                <a:cs typeface="Arial" charset="0"/>
+                <a:sym typeface="Arial" charset="0"/>
+              </a:defRPr>
+            </a:lvl6pPr>
+            <a:lvl7pPr marL="2971800" indent="-228600" eaLnBrk="0" fontAlgn="base" hangingPunct="0">
+              <a:spcBef>
+                <a:spcPct val="0"/>
+              </a:spcBef>
+              <a:spcAft>
+                <a:spcPct val="0"/>
+              </a:spcAft>
+              <a:defRPr sz="1400">
+                <a:solidFill>
+                  <a:srgbClr val="000000"/>
+                </a:solidFill>
+                <a:latin typeface="Arial" charset="0"/>
+                <a:ea typeface="Arial" charset="0"/>
+                <a:cs typeface="Arial" charset="0"/>
+                <a:sym typeface="Arial" charset="0"/>
+              </a:defRPr>
+            </a:lvl7pPr>
+            <a:lvl8pPr marL="3429000" indent="-228600" eaLnBrk="0" fontAlgn="base" hangingPunct="0">
+              <a:spcBef>
+                <a:spcPct val="0"/>
+              </a:spcBef>
+              <a:spcAft>
+                <a:spcPct val="0"/>
+              </a:spcAft>
+              <a:defRPr sz="1400">
+                <a:solidFill>
+                  <a:srgbClr val="000000"/>
+                </a:solidFill>
+                <a:latin typeface="Arial" charset="0"/>
+                <a:ea typeface="Arial" charset="0"/>
+                <a:cs typeface="Arial" charset="0"/>
+                <a:sym typeface="Arial" charset="0"/>
+              </a:defRPr>
+            </a:lvl8pPr>
+            <a:lvl9pPr marL="3886200" indent="-228600" eaLnBrk="0" fontAlgn="base" hangingPunct="0">
+              <a:spcBef>
+                <a:spcPct val="0"/>
+              </a:spcBef>
+              <a:spcAft>
+                <a:spcPct val="0"/>
+              </a:spcAft>
+              <a:defRPr sz="1400">
+                <a:solidFill>
+                  <a:srgbClr val="000000"/>
+                </a:solidFill>
+                <a:latin typeface="Arial" charset="0"/>
+                <a:ea typeface="Arial" charset="0"/>
+                <a:cs typeface="Arial" charset="0"/>
+                <a:sym typeface="Arial" charset="0"/>
+              </a:defRPr>
+            </a:lvl9pPr>
+          </a:lstStyle>
           <a:p>
-            <a:pPr lvl="0">
-              <a:spcBef>
-                <a:spcPts val="0"/>
-              </a:spcBef>
-              <a:buNone/>
-            </a:pPr>
-            <a:endParaRPr/>
+            <a:pPr eaLnBrk="1" hangingPunct="1"/>
+            <a:endParaRPr lang="en-US" altLang="en-US"/>
           </a:p>
         </p:txBody>
       </p:sp>
       <p:sp>
         <p:nvSpPr>
-          <p:cNvPr id="84" name="Shape 84"/>
-          <p:cNvSpPr txBox="1"/>
+          <p:cNvPr id="14344" name="Shape 84"/>
+          <p:cNvSpPr txBox="1">
+            <a:spLocks noChangeArrowheads="1"/>
+          </p:cNvSpPr>
           <p:nvPr/>
         </p:nvSpPr>
-        <p:spPr>
+        <p:spPr bwMode="auto">
           <a:xfrm>
-            <a:off x="0" y="4804700"/>
-            <a:ext cx="1591200" cy="339000"/>
+            <a:off x="1" y="5662614"/>
+            <a:ext cx="1590675" cy="338137"/>
           </a:xfrm>
           <a:prstGeom prst="rect">
             <a:avLst/>
@@ -4097,45 +4889,178 @@
           <a:ln>
             <a:noFill/>
           </a:ln>
+          <a:extLst>
+            <a:ext uri="{909E8E84-426E-40DD-AFC4-6F175D3DCCD1}">
+              <a14:hiddenFill xmlns:a14="http://schemas.microsoft.com/office/drawing/2010/main">
+                <a:solidFill>
+                  <a:srgbClr val="FFFFFF"/>
+                </a:solidFill>
+              </a14:hiddenFill>
+            </a:ext>
+            <a:ext uri="{91240B29-F687-4F45-9708-019B960494DF}">
+              <a14:hiddenLine xmlns:a14="http://schemas.microsoft.com/office/drawing/2010/main" w="9525">
+                <a:solidFill>
+                  <a:srgbClr val="000000"/>
+                </a:solidFill>
+                <a:miter lim="800000"/>
+                <a:headEnd/>
+                <a:tailEnd/>
+              </a14:hiddenLine>
+            </a:ext>
+          </a:extLst>
         </p:spPr>
         <p:txBody>
-          <a:bodyPr lIns="91425" tIns="91425" rIns="91425" bIns="91425" anchor="ctr" anchorCtr="0">
-            <a:noAutofit/>
-          </a:bodyPr>
-          <a:lstStyle/>
+          <a:bodyPr lIns="91425" tIns="91425" rIns="91425" bIns="91425" anchor="ctr"/>
+          <a:lstStyle>
+            <a:lvl1pPr>
+              <a:defRPr sz="1400">
+                <a:solidFill>
+                  <a:srgbClr val="000000"/>
+                </a:solidFill>
+                <a:latin typeface="Arial" charset="0"/>
+                <a:ea typeface="Arial" charset="0"/>
+                <a:cs typeface="Arial" charset="0"/>
+                <a:sym typeface="Arial" charset="0"/>
+              </a:defRPr>
+            </a:lvl1pPr>
+            <a:lvl2pPr marL="742950" indent="-285750">
+              <a:defRPr sz="1400">
+                <a:solidFill>
+                  <a:srgbClr val="000000"/>
+                </a:solidFill>
+                <a:latin typeface="Arial" charset="0"/>
+                <a:ea typeface="Arial" charset="0"/>
+                <a:cs typeface="Arial" charset="0"/>
+                <a:sym typeface="Arial" charset="0"/>
+              </a:defRPr>
+            </a:lvl2pPr>
+            <a:lvl3pPr marL="1143000" indent="-228600">
+              <a:defRPr sz="1400">
+                <a:solidFill>
+                  <a:srgbClr val="000000"/>
+                </a:solidFill>
+                <a:latin typeface="Arial" charset="0"/>
+                <a:ea typeface="Arial" charset="0"/>
+                <a:cs typeface="Arial" charset="0"/>
+                <a:sym typeface="Arial" charset="0"/>
+              </a:defRPr>
+            </a:lvl3pPr>
+            <a:lvl4pPr marL="1600200" indent="-228600">
+              <a:defRPr sz="1400">
+                <a:solidFill>
+                  <a:srgbClr val="000000"/>
+                </a:solidFill>
+                <a:latin typeface="Arial" charset="0"/>
+                <a:ea typeface="Arial" charset="0"/>
+                <a:cs typeface="Arial" charset="0"/>
+                <a:sym typeface="Arial" charset="0"/>
+              </a:defRPr>
+            </a:lvl4pPr>
+            <a:lvl5pPr marL="2057400" indent="-228600">
+              <a:defRPr sz="1400">
+                <a:solidFill>
+                  <a:srgbClr val="000000"/>
+                </a:solidFill>
+                <a:latin typeface="Arial" charset="0"/>
+                <a:ea typeface="Arial" charset="0"/>
+                <a:cs typeface="Arial" charset="0"/>
+                <a:sym typeface="Arial" charset="0"/>
+              </a:defRPr>
+            </a:lvl5pPr>
+            <a:lvl6pPr marL="2514600" indent="-228600" eaLnBrk="0" fontAlgn="base" hangingPunct="0">
+              <a:spcBef>
+                <a:spcPct val="0"/>
+              </a:spcBef>
+              <a:spcAft>
+                <a:spcPct val="0"/>
+              </a:spcAft>
+              <a:defRPr sz="1400">
+                <a:solidFill>
+                  <a:srgbClr val="000000"/>
+                </a:solidFill>
+                <a:latin typeface="Arial" charset="0"/>
+                <a:ea typeface="Arial" charset="0"/>
+                <a:cs typeface="Arial" charset="0"/>
+                <a:sym typeface="Arial" charset="0"/>
+              </a:defRPr>
+            </a:lvl6pPr>
+            <a:lvl7pPr marL="2971800" indent="-228600" eaLnBrk="0" fontAlgn="base" hangingPunct="0">
+              <a:spcBef>
+                <a:spcPct val="0"/>
+              </a:spcBef>
+              <a:spcAft>
+                <a:spcPct val="0"/>
+              </a:spcAft>
+              <a:defRPr sz="1400">
+                <a:solidFill>
+                  <a:srgbClr val="000000"/>
+                </a:solidFill>
+                <a:latin typeface="Arial" charset="0"/>
+                <a:ea typeface="Arial" charset="0"/>
+                <a:cs typeface="Arial" charset="0"/>
+                <a:sym typeface="Arial" charset="0"/>
+              </a:defRPr>
+            </a:lvl7pPr>
+            <a:lvl8pPr marL="3429000" indent="-228600" eaLnBrk="0" fontAlgn="base" hangingPunct="0">
+              <a:spcBef>
+                <a:spcPct val="0"/>
+              </a:spcBef>
+              <a:spcAft>
+                <a:spcPct val="0"/>
+              </a:spcAft>
+              <a:defRPr sz="1400">
+                <a:solidFill>
+                  <a:srgbClr val="000000"/>
+                </a:solidFill>
+                <a:latin typeface="Arial" charset="0"/>
+                <a:ea typeface="Arial" charset="0"/>
+                <a:cs typeface="Arial" charset="0"/>
+                <a:sym typeface="Arial" charset="0"/>
+              </a:defRPr>
+            </a:lvl8pPr>
+            <a:lvl9pPr marL="3886200" indent="-228600" eaLnBrk="0" fontAlgn="base" hangingPunct="0">
+              <a:spcBef>
+                <a:spcPct val="0"/>
+              </a:spcBef>
+              <a:spcAft>
+                <a:spcPct val="0"/>
+              </a:spcAft>
+              <a:defRPr sz="1400">
+                <a:solidFill>
+                  <a:srgbClr val="000000"/>
+                </a:solidFill>
+                <a:latin typeface="Arial" charset="0"/>
+                <a:ea typeface="Arial" charset="0"/>
+                <a:cs typeface="Arial" charset="0"/>
+                <a:sym typeface="Arial" charset="0"/>
+              </a:defRPr>
+            </a:lvl9pPr>
+          </a:lstStyle>
           <a:p>
-            <a:pPr lvl="0" rtl="0">
-              <a:spcBef>
-                <a:spcPts val="0"/>
-              </a:spcBef>
-              <a:buNone/>
-            </a:pPr>
+            <a:pPr eaLnBrk="1" hangingPunct="1"/>
             <a:r>
-              <a:rPr lang="en-US" dirty="0" smtClean="0">
+              <a:rPr lang="en-US" altLang="en-US">
                 <a:solidFill>
                   <a:srgbClr val="003399"/>
                 </a:solidFill>
               </a:rPr>
               <a:t>Scale</a:t>
             </a:r>
-            <a:endParaRPr lang="en" dirty="0">
-              <a:solidFill>
-                <a:srgbClr val="003399"/>
-              </a:solidFill>
-            </a:endParaRPr>
           </a:p>
         </p:txBody>
       </p:sp>
       <p:sp>
         <p:nvSpPr>
-          <p:cNvPr id="85" name="Shape 85"/>
-          <p:cNvSpPr txBox="1"/>
+          <p:cNvPr id="14345" name="Shape 85"/>
+          <p:cNvSpPr txBox="1">
+            <a:spLocks noChangeArrowheads="1"/>
+          </p:cNvSpPr>
           <p:nvPr/>
         </p:nvSpPr>
-        <p:spPr>
+        <p:spPr bwMode="auto">
           <a:xfrm>
-            <a:off x="7543800" y="4804700"/>
-            <a:ext cx="1591200" cy="339000"/>
+            <a:off x="7543801" y="5662614"/>
+            <a:ext cx="1590675" cy="338137"/>
           </a:xfrm>
           <a:prstGeom prst="rect">
             <a:avLst/>
@@ -4144,45 +5069,178 @@
           <a:ln>
             <a:noFill/>
           </a:ln>
+          <a:extLst>
+            <a:ext uri="{909E8E84-426E-40DD-AFC4-6F175D3DCCD1}">
+              <a14:hiddenFill xmlns:a14="http://schemas.microsoft.com/office/drawing/2010/main">
+                <a:solidFill>
+                  <a:srgbClr val="FFFFFF"/>
+                </a:solidFill>
+              </a14:hiddenFill>
+            </a:ext>
+            <a:ext uri="{91240B29-F687-4F45-9708-019B960494DF}">
+              <a14:hiddenLine xmlns:a14="http://schemas.microsoft.com/office/drawing/2010/main" w="9525">
+                <a:solidFill>
+                  <a:srgbClr val="000000"/>
+                </a:solidFill>
+                <a:miter lim="800000"/>
+                <a:headEnd/>
+                <a:tailEnd/>
+              </a14:hiddenLine>
+            </a:ext>
+          </a:extLst>
         </p:spPr>
         <p:txBody>
-          <a:bodyPr lIns="91425" tIns="91425" rIns="91425" bIns="91425" anchor="ctr" anchorCtr="0">
-            <a:noAutofit/>
-          </a:bodyPr>
-          <a:lstStyle/>
+          <a:bodyPr lIns="91425" tIns="91425" rIns="91425" bIns="91425" anchor="ctr"/>
+          <a:lstStyle>
+            <a:lvl1pPr>
+              <a:defRPr sz="1400">
+                <a:solidFill>
+                  <a:srgbClr val="000000"/>
+                </a:solidFill>
+                <a:latin typeface="Arial" charset="0"/>
+                <a:ea typeface="Arial" charset="0"/>
+                <a:cs typeface="Arial" charset="0"/>
+                <a:sym typeface="Arial" charset="0"/>
+              </a:defRPr>
+            </a:lvl1pPr>
+            <a:lvl2pPr marL="742950" indent="-285750">
+              <a:defRPr sz="1400">
+                <a:solidFill>
+                  <a:srgbClr val="000000"/>
+                </a:solidFill>
+                <a:latin typeface="Arial" charset="0"/>
+                <a:ea typeface="Arial" charset="0"/>
+                <a:cs typeface="Arial" charset="0"/>
+                <a:sym typeface="Arial" charset="0"/>
+              </a:defRPr>
+            </a:lvl2pPr>
+            <a:lvl3pPr marL="1143000" indent="-228600">
+              <a:defRPr sz="1400">
+                <a:solidFill>
+                  <a:srgbClr val="000000"/>
+                </a:solidFill>
+                <a:latin typeface="Arial" charset="0"/>
+                <a:ea typeface="Arial" charset="0"/>
+                <a:cs typeface="Arial" charset="0"/>
+                <a:sym typeface="Arial" charset="0"/>
+              </a:defRPr>
+            </a:lvl3pPr>
+            <a:lvl4pPr marL="1600200" indent="-228600">
+              <a:defRPr sz="1400">
+                <a:solidFill>
+                  <a:srgbClr val="000000"/>
+                </a:solidFill>
+                <a:latin typeface="Arial" charset="0"/>
+                <a:ea typeface="Arial" charset="0"/>
+                <a:cs typeface="Arial" charset="0"/>
+                <a:sym typeface="Arial" charset="0"/>
+              </a:defRPr>
+            </a:lvl4pPr>
+            <a:lvl5pPr marL="2057400" indent="-228600">
+              <a:defRPr sz="1400">
+                <a:solidFill>
+                  <a:srgbClr val="000000"/>
+                </a:solidFill>
+                <a:latin typeface="Arial" charset="0"/>
+                <a:ea typeface="Arial" charset="0"/>
+                <a:cs typeface="Arial" charset="0"/>
+                <a:sym typeface="Arial" charset="0"/>
+              </a:defRPr>
+            </a:lvl5pPr>
+            <a:lvl6pPr marL="2514600" indent="-228600" eaLnBrk="0" fontAlgn="base" hangingPunct="0">
+              <a:spcBef>
+                <a:spcPct val="0"/>
+              </a:spcBef>
+              <a:spcAft>
+                <a:spcPct val="0"/>
+              </a:spcAft>
+              <a:defRPr sz="1400">
+                <a:solidFill>
+                  <a:srgbClr val="000000"/>
+                </a:solidFill>
+                <a:latin typeface="Arial" charset="0"/>
+                <a:ea typeface="Arial" charset="0"/>
+                <a:cs typeface="Arial" charset="0"/>
+                <a:sym typeface="Arial" charset="0"/>
+              </a:defRPr>
+            </a:lvl6pPr>
+            <a:lvl7pPr marL="2971800" indent="-228600" eaLnBrk="0" fontAlgn="base" hangingPunct="0">
+              <a:spcBef>
+                <a:spcPct val="0"/>
+              </a:spcBef>
+              <a:spcAft>
+                <a:spcPct val="0"/>
+              </a:spcAft>
+              <a:defRPr sz="1400">
+                <a:solidFill>
+                  <a:srgbClr val="000000"/>
+                </a:solidFill>
+                <a:latin typeface="Arial" charset="0"/>
+                <a:ea typeface="Arial" charset="0"/>
+                <a:cs typeface="Arial" charset="0"/>
+                <a:sym typeface="Arial" charset="0"/>
+              </a:defRPr>
+            </a:lvl7pPr>
+            <a:lvl8pPr marL="3429000" indent="-228600" eaLnBrk="0" fontAlgn="base" hangingPunct="0">
+              <a:spcBef>
+                <a:spcPct val="0"/>
+              </a:spcBef>
+              <a:spcAft>
+                <a:spcPct val="0"/>
+              </a:spcAft>
+              <a:defRPr sz="1400">
+                <a:solidFill>
+                  <a:srgbClr val="000000"/>
+                </a:solidFill>
+                <a:latin typeface="Arial" charset="0"/>
+                <a:ea typeface="Arial" charset="0"/>
+                <a:cs typeface="Arial" charset="0"/>
+                <a:sym typeface="Arial" charset="0"/>
+              </a:defRPr>
+            </a:lvl8pPr>
+            <a:lvl9pPr marL="3886200" indent="-228600" eaLnBrk="0" fontAlgn="base" hangingPunct="0">
+              <a:spcBef>
+                <a:spcPct val="0"/>
+              </a:spcBef>
+              <a:spcAft>
+                <a:spcPct val="0"/>
+              </a:spcAft>
+              <a:defRPr sz="1400">
+                <a:solidFill>
+                  <a:srgbClr val="000000"/>
+                </a:solidFill>
+                <a:latin typeface="Arial" charset="0"/>
+                <a:ea typeface="Arial" charset="0"/>
+                <a:cs typeface="Arial" charset="0"/>
+                <a:sym typeface="Arial" charset="0"/>
+              </a:defRPr>
+            </a:lvl9pPr>
+          </a:lstStyle>
           <a:p>
-            <a:pPr lvl="0" algn="r" rtl="0">
-              <a:spcBef>
-                <a:spcPts val="0"/>
-              </a:spcBef>
-              <a:buNone/>
-            </a:pPr>
+            <a:pPr algn="r" eaLnBrk="1" hangingPunct="1"/>
             <a:r>
-              <a:rPr lang="en-US" smtClean="0">
+              <a:rPr lang="en-US" altLang="en-US">
                 <a:solidFill>
                   <a:srgbClr val="003399"/>
                 </a:solidFill>
               </a:rPr>
               <a:t>NextScale</a:t>
             </a:r>
-            <a:endParaRPr lang="en">
-              <a:solidFill>
-                <a:srgbClr val="003399"/>
-              </a:solidFill>
-            </a:endParaRPr>
           </a:p>
         </p:txBody>
       </p:sp>
       <p:sp>
         <p:nvSpPr>
-          <p:cNvPr id="86" name="Shape 86"/>
-          <p:cNvSpPr txBox="1"/>
+          <p:cNvPr id="14346" name="Shape 86"/>
+          <p:cNvSpPr txBox="1">
+            <a:spLocks noChangeArrowheads="1"/>
+          </p:cNvSpPr>
           <p:nvPr/>
         </p:nvSpPr>
-        <p:spPr>
+        <p:spPr bwMode="auto">
           <a:xfrm>
-            <a:off x="1780900" y="4804700"/>
-            <a:ext cx="5826000" cy="339000"/>
+            <a:off x="1781176" y="5662614"/>
+            <a:ext cx="5826125" cy="338137"/>
           </a:xfrm>
           <a:prstGeom prst="rect">
             <a:avLst/>
@@ -4191,32 +5249,163 @@
           <a:ln>
             <a:noFill/>
           </a:ln>
+          <a:extLst>
+            <a:ext uri="{909E8E84-426E-40DD-AFC4-6F175D3DCCD1}">
+              <a14:hiddenFill xmlns:a14="http://schemas.microsoft.com/office/drawing/2010/main">
+                <a:solidFill>
+                  <a:srgbClr val="FFFFFF"/>
+                </a:solidFill>
+              </a14:hiddenFill>
+            </a:ext>
+            <a:ext uri="{91240B29-F687-4F45-9708-019B960494DF}">
+              <a14:hiddenLine xmlns:a14="http://schemas.microsoft.com/office/drawing/2010/main" w="9525">
+                <a:solidFill>
+                  <a:srgbClr val="000000"/>
+                </a:solidFill>
+                <a:miter lim="800000"/>
+                <a:headEnd/>
+                <a:tailEnd/>
+              </a14:hiddenLine>
+            </a:ext>
+          </a:extLst>
         </p:spPr>
         <p:txBody>
-          <a:bodyPr lIns="91425" tIns="91425" rIns="91425" bIns="91425" anchor="ctr" anchorCtr="0">
-            <a:noAutofit/>
-          </a:bodyPr>
-          <a:lstStyle/>
+          <a:bodyPr lIns="91425" tIns="91425" rIns="91425" bIns="91425" anchor="ctr"/>
+          <a:lstStyle>
+            <a:lvl1pPr>
+              <a:defRPr sz="1400">
+                <a:solidFill>
+                  <a:srgbClr val="000000"/>
+                </a:solidFill>
+                <a:latin typeface="Arial" charset="0"/>
+                <a:ea typeface="Arial" charset="0"/>
+                <a:cs typeface="Arial" charset="0"/>
+                <a:sym typeface="Arial" charset="0"/>
+              </a:defRPr>
+            </a:lvl1pPr>
+            <a:lvl2pPr marL="742950" indent="-285750">
+              <a:defRPr sz="1400">
+                <a:solidFill>
+                  <a:srgbClr val="000000"/>
+                </a:solidFill>
+                <a:latin typeface="Arial" charset="0"/>
+                <a:ea typeface="Arial" charset="0"/>
+                <a:cs typeface="Arial" charset="0"/>
+                <a:sym typeface="Arial" charset="0"/>
+              </a:defRPr>
+            </a:lvl2pPr>
+            <a:lvl3pPr marL="1143000" indent="-228600">
+              <a:defRPr sz="1400">
+                <a:solidFill>
+                  <a:srgbClr val="000000"/>
+                </a:solidFill>
+                <a:latin typeface="Arial" charset="0"/>
+                <a:ea typeface="Arial" charset="0"/>
+                <a:cs typeface="Arial" charset="0"/>
+                <a:sym typeface="Arial" charset="0"/>
+              </a:defRPr>
+            </a:lvl3pPr>
+            <a:lvl4pPr marL="1600200" indent="-228600">
+              <a:defRPr sz="1400">
+                <a:solidFill>
+                  <a:srgbClr val="000000"/>
+                </a:solidFill>
+                <a:latin typeface="Arial" charset="0"/>
+                <a:ea typeface="Arial" charset="0"/>
+                <a:cs typeface="Arial" charset="0"/>
+                <a:sym typeface="Arial" charset="0"/>
+              </a:defRPr>
+            </a:lvl4pPr>
+            <a:lvl5pPr marL="2057400" indent="-228600">
+              <a:defRPr sz="1400">
+                <a:solidFill>
+                  <a:srgbClr val="000000"/>
+                </a:solidFill>
+                <a:latin typeface="Arial" charset="0"/>
+                <a:ea typeface="Arial" charset="0"/>
+                <a:cs typeface="Arial" charset="0"/>
+                <a:sym typeface="Arial" charset="0"/>
+              </a:defRPr>
+            </a:lvl5pPr>
+            <a:lvl6pPr marL="2514600" indent="-228600" eaLnBrk="0" fontAlgn="base" hangingPunct="0">
+              <a:spcBef>
+                <a:spcPct val="0"/>
+              </a:spcBef>
+              <a:spcAft>
+                <a:spcPct val="0"/>
+              </a:spcAft>
+              <a:defRPr sz="1400">
+                <a:solidFill>
+                  <a:srgbClr val="000000"/>
+                </a:solidFill>
+                <a:latin typeface="Arial" charset="0"/>
+                <a:ea typeface="Arial" charset="0"/>
+                <a:cs typeface="Arial" charset="0"/>
+                <a:sym typeface="Arial" charset="0"/>
+              </a:defRPr>
+            </a:lvl6pPr>
+            <a:lvl7pPr marL="2971800" indent="-228600" eaLnBrk="0" fontAlgn="base" hangingPunct="0">
+              <a:spcBef>
+                <a:spcPct val="0"/>
+              </a:spcBef>
+              <a:spcAft>
+                <a:spcPct val="0"/>
+              </a:spcAft>
+              <a:defRPr sz="1400">
+                <a:solidFill>
+                  <a:srgbClr val="000000"/>
+                </a:solidFill>
+                <a:latin typeface="Arial" charset="0"/>
+                <a:ea typeface="Arial" charset="0"/>
+                <a:cs typeface="Arial" charset="0"/>
+                <a:sym typeface="Arial" charset="0"/>
+              </a:defRPr>
+            </a:lvl7pPr>
+            <a:lvl8pPr marL="3429000" indent="-228600" eaLnBrk="0" fontAlgn="base" hangingPunct="0">
+              <a:spcBef>
+                <a:spcPct val="0"/>
+              </a:spcBef>
+              <a:spcAft>
+                <a:spcPct val="0"/>
+              </a:spcAft>
+              <a:defRPr sz="1400">
+                <a:solidFill>
+                  <a:srgbClr val="000000"/>
+                </a:solidFill>
+                <a:latin typeface="Arial" charset="0"/>
+                <a:ea typeface="Arial" charset="0"/>
+                <a:cs typeface="Arial" charset="0"/>
+                <a:sym typeface="Arial" charset="0"/>
+              </a:defRPr>
+            </a:lvl8pPr>
+            <a:lvl9pPr marL="3886200" indent="-228600" eaLnBrk="0" fontAlgn="base" hangingPunct="0">
+              <a:spcBef>
+                <a:spcPct val="0"/>
+              </a:spcBef>
+              <a:spcAft>
+                <a:spcPct val="0"/>
+              </a:spcAft>
+              <a:defRPr sz="1400">
+                <a:solidFill>
+                  <a:srgbClr val="000000"/>
+                </a:solidFill>
+                <a:latin typeface="Arial" charset="0"/>
+                <a:ea typeface="Arial" charset="0"/>
+                <a:cs typeface="Arial" charset="0"/>
+                <a:sym typeface="Arial" charset="0"/>
+              </a:defRPr>
+            </a:lvl9pPr>
+          </a:lstStyle>
           <a:p>
-            <a:pPr lvl="0" algn="ctr" rtl="0">
-              <a:spcBef>
-                <a:spcPts val="0"/>
-              </a:spcBef>
-              <a:buNone/>
-            </a:pPr>
+            <a:pPr algn="ctr" eaLnBrk="1" hangingPunct="1"/>
             <a:r>
-              <a:rPr lang="en-US" dirty="0" err="1" smtClean="0">
+              <a:rPr lang="en-US" altLang="en-US">
                 <a:solidFill>
                   <a:srgbClr val="003399"/>
                 </a:solidFill>
               </a:rPr>
               <a:t>NextBhajan</a:t>
             </a:r>
-            <a:endParaRPr lang="en" dirty="0">
-              <a:solidFill>
-                <a:srgbClr val="003399"/>
-              </a:solidFill>
-            </a:endParaRPr>
           </a:p>
         </p:txBody>
       </p:sp>
@@ -4236,7 +5425,7 @@
         </p:blipFill>
         <p:spPr>
           <a:xfrm>
-            <a:off x="-8875" y="0"/>
+            <a:off x="-8875" y="857250"/>
             <a:ext cx="1294211" cy="1278118"/>
           </a:xfrm>
           <a:prstGeom prst="ellipse">
@@ -4823,4 +6012,265 @@
   <a:objectDefaults/>
   <a:extraClrSchemeLst/>
 </a:theme>
+</file>
+
+<file path=ppt/theme/theme3.xml><?xml version="1.0" encoding="utf-8"?>
+<a:theme xmlns:a="http://schemas.openxmlformats.org/drawingml/2006/main" name="Office Theme">
+  <a:themeElements>
+    <a:clrScheme name="Office">
+      <a:dk1>
+        <a:sysClr val="windowText" lastClr="000000"/>
+      </a:dk1>
+      <a:lt1>
+        <a:sysClr val="window" lastClr="FFFFFF"/>
+      </a:lt1>
+      <a:dk2>
+        <a:srgbClr val="44546A"/>
+      </a:dk2>
+      <a:lt2>
+        <a:srgbClr val="E7E6E6"/>
+      </a:lt2>
+      <a:accent1>
+        <a:srgbClr val="5B9BD5"/>
+      </a:accent1>
+      <a:accent2>
+        <a:srgbClr val="ED7D31"/>
+      </a:accent2>
+      <a:accent3>
+        <a:srgbClr val="A5A5A5"/>
+      </a:accent3>
+      <a:accent4>
+        <a:srgbClr val="FFC000"/>
+      </a:accent4>
+      <a:accent5>
+        <a:srgbClr val="4472C4"/>
+      </a:accent5>
+      <a:accent6>
+        <a:srgbClr val="70AD47"/>
+      </a:accent6>
+      <a:hlink>
+        <a:srgbClr val="0563C1"/>
+      </a:hlink>
+      <a:folHlink>
+        <a:srgbClr val="954F72"/>
+      </a:folHlink>
+    </a:clrScheme>
+    <a:fontScheme name="Office">
+      <a:majorFont>
+        <a:latin typeface="Calibri Light" panose="020F0302020204030204"/>
+        <a:ea typeface=""/>
+        <a:cs typeface=""/>
+        <a:font script="Jpan" typeface="Yu Gothic Light"/>
+        <a:font script="Hang" typeface="맑은 고딕"/>
+        <a:font script="Hans" typeface="DengXian Light"/>
+        <a:font script="Hant" typeface="新細明體"/>
+        <a:font script="Arab" typeface="Times New Roman"/>
+        <a:font script="Hebr" typeface="Times New Roman"/>
+        <a:font script="Thai" typeface="Angsana New"/>
+        <a:font script="Ethi" typeface="Nyala"/>
+        <a:font script="Beng" typeface="Vrinda"/>
+        <a:font script="Gujr" typeface="Shruti"/>
+        <a:font script="Khmr" typeface="MoolBoran"/>
+        <a:font script="Knda" typeface="Tunga"/>
+        <a:font script="Guru" typeface="Raavi"/>
+        <a:font script="Cans" typeface="Euphemia"/>
+        <a:font script="Cher" typeface="Plantagenet Cherokee"/>
+        <a:font script="Yiii" typeface="Microsoft Yi Baiti"/>
+        <a:font script="Tibt" typeface="Microsoft Himalaya"/>
+        <a:font script="Thaa" typeface="MV Boli"/>
+        <a:font script="Deva" typeface="Mangal"/>
+        <a:font script="Telu" typeface="Gautami"/>
+        <a:font script="Taml" typeface="Latha"/>
+        <a:font script="Syrc" typeface="Estrangelo Edessa"/>
+        <a:font script="Orya" typeface="Kalinga"/>
+        <a:font script="Mlym" typeface="Kartika"/>
+        <a:font script="Laoo" typeface="DokChampa"/>
+        <a:font script="Sinh" typeface="Iskoola Pota"/>
+        <a:font script="Mong" typeface="Mongolian Baiti"/>
+        <a:font script="Viet" typeface="Times New Roman"/>
+        <a:font script="Uigh" typeface="Microsoft Uighur"/>
+        <a:font script="Geor" typeface="Sylfaen"/>
+      </a:majorFont>
+      <a:minorFont>
+        <a:latin typeface="Calibri" panose="020F0502020204030204"/>
+        <a:ea typeface=""/>
+        <a:cs typeface=""/>
+        <a:font script="Jpan" typeface="Yu Gothic"/>
+        <a:font script="Hang" typeface="맑은 고딕"/>
+        <a:font script="Hans" typeface="DengXian"/>
+        <a:font script="Hant" typeface="新細明體"/>
+        <a:font script="Arab" typeface="Arial"/>
+        <a:font script="Hebr" typeface="Arial"/>
+        <a:font script="Thai" typeface="Cordia New"/>
+        <a:font script="Ethi" typeface="Nyala"/>
+        <a:font script="Beng" typeface="Vrinda"/>
+        <a:font script="Gujr" typeface="Shruti"/>
+        <a:font script="Khmr" typeface="DaunPenh"/>
+        <a:font script="Knda" typeface="Tunga"/>
+        <a:font script="Guru" typeface="Raavi"/>
+        <a:font script="Cans" typeface="Euphemia"/>
+        <a:font script="Cher" typeface="Plantagenet Cherokee"/>
+        <a:font script="Yiii" typeface="Microsoft Yi Baiti"/>
+        <a:font script="Tibt" typeface="Microsoft Himalaya"/>
+        <a:font script="Thaa" typeface="MV Boli"/>
+        <a:font script="Deva" typeface="Mangal"/>
+        <a:font script="Telu" typeface="Gautami"/>
+        <a:font script="Taml" typeface="Latha"/>
+        <a:font script="Syrc" typeface="Estrangelo Edessa"/>
+        <a:font script="Orya" typeface="Kalinga"/>
+        <a:font script="Mlym" typeface="Kartika"/>
+        <a:font script="Laoo" typeface="DokChampa"/>
+        <a:font script="Sinh" typeface="Iskoola Pota"/>
+        <a:font script="Mong" typeface="Mongolian Baiti"/>
+        <a:font script="Viet" typeface="Arial"/>
+        <a:font script="Uigh" typeface="Microsoft Uighur"/>
+        <a:font script="Geor" typeface="Sylfaen"/>
+      </a:minorFont>
+    </a:fontScheme>
+    <a:fmtScheme name="Office">
+      <a:fillStyleLst>
+        <a:solidFill>
+          <a:schemeClr val="phClr"/>
+        </a:solidFill>
+        <a:gradFill rotWithShape="1">
+          <a:gsLst>
+            <a:gs pos="0">
+              <a:schemeClr val="phClr">
+                <a:lumMod val="110000"/>
+                <a:satMod val="105000"/>
+                <a:tint val="67000"/>
+              </a:schemeClr>
+            </a:gs>
+            <a:gs pos="50000">
+              <a:schemeClr val="phClr">
+                <a:lumMod val="105000"/>
+                <a:satMod val="103000"/>
+                <a:tint val="73000"/>
+              </a:schemeClr>
+            </a:gs>
+            <a:gs pos="100000">
+              <a:schemeClr val="phClr">
+                <a:lumMod val="105000"/>
+                <a:satMod val="109000"/>
+                <a:tint val="81000"/>
+              </a:schemeClr>
+            </a:gs>
+          </a:gsLst>
+          <a:lin ang="5400000" scaled="0"/>
+        </a:gradFill>
+        <a:gradFill rotWithShape="1">
+          <a:gsLst>
+            <a:gs pos="0">
+              <a:schemeClr val="phClr">
+                <a:satMod val="103000"/>
+                <a:lumMod val="102000"/>
+                <a:tint val="94000"/>
+              </a:schemeClr>
+            </a:gs>
+            <a:gs pos="50000">
+              <a:schemeClr val="phClr">
+                <a:satMod val="110000"/>
+                <a:lumMod val="100000"/>
+                <a:shade val="100000"/>
+              </a:schemeClr>
+            </a:gs>
+            <a:gs pos="100000">
+              <a:schemeClr val="phClr">
+                <a:lumMod val="99000"/>
+                <a:satMod val="120000"/>
+                <a:shade val="78000"/>
+              </a:schemeClr>
+            </a:gs>
+          </a:gsLst>
+          <a:lin ang="5400000" scaled="0"/>
+        </a:gradFill>
+      </a:fillStyleLst>
+      <a:lnStyleLst>
+        <a:ln w="6350" cap="flat" cmpd="sng" algn="ctr">
+          <a:solidFill>
+            <a:schemeClr val="phClr"/>
+          </a:solidFill>
+          <a:prstDash val="solid"/>
+          <a:miter lim="800000"/>
+        </a:ln>
+        <a:ln w="12700" cap="flat" cmpd="sng" algn="ctr">
+          <a:solidFill>
+            <a:schemeClr val="phClr"/>
+          </a:solidFill>
+          <a:prstDash val="solid"/>
+          <a:miter lim="800000"/>
+        </a:ln>
+        <a:ln w="19050" cap="flat" cmpd="sng" algn="ctr">
+          <a:solidFill>
+            <a:schemeClr val="phClr"/>
+          </a:solidFill>
+          <a:prstDash val="solid"/>
+          <a:miter lim="800000"/>
+        </a:ln>
+      </a:lnStyleLst>
+      <a:effectStyleLst>
+        <a:effectStyle>
+          <a:effectLst/>
+        </a:effectStyle>
+        <a:effectStyle>
+          <a:effectLst/>
+        </a:effectStyle>
+        <a:effectStyle>
+          <a:effectLst>
+            <a:outerShdw blurRad="57150" dist="19050" dir="5400000" algn="ctr" rotWithShape="0">
+              <a:srgbClr val="000000">
+                <a:alpha val="63000"/>
+              </a:srgbClr>
+            </a:outerShdw>
+          </a:effectLst>
+        </a:effectStyle>
+      </a:effectStyleLst>
+      <a:bgFillStyleLst>
+        <a:solidFill>
+          <a:schemeClr val="phClr"/>
+        </a:solidFill>
+        <a:solidFill>
+          <a:schemeClr val="phClr">
+            <a:tint val="95000"/>
+            <a:satMod val="170000"/>
+          </a:schemeClr>
+        </a:solidFill>
+        <a:gradFill rotWithShape="1">
+          <a:gsLst>
+            <a:gs pos="0">
+              <a:schemeClr val="phClr">
+                <a:tint val="93000"/>
+                <a:satMod val="150000"/>
+                <a:shade val="98000"/>
+                <a:lumMod val="102000"/>
+              </a:schemeClr>
+            </a:gs>
+            <a:gs pos="50000">
+              <a:schemeClr val="phClr">
+                <a:tint val="98000"/>
+                <a:satMod val="130000"/>
+                <a:shade val="90000"/>
+                <a:lumMod val="103000"/>
+              </a:schemeClr>
+            </a:gs>
+            <a:gs pos="100000">
+              <a:schemeClr val="phClr">
+                <a:shade val="63000"/>
+                <a:satMod val="120000"/>
+              </a:schemeClr>
+            </a:gs>
+          </a:gsLst>
+          <a:lin ang="5400000" scaled="0"/>
+        </a:gradFill>
+      </a:bgFillStyleLst>
+    </a:fmtScheme>
+  </a:themeElements>
+  <a:objectDefaults/>
+  <a:extraClrSchemeLst/>
+  <a:extLst>
+    <a:ext uri="{05A4C25C-085E-4340-85A3-A5531E510DB2}">
+      <thm15:themeFamily xmlns:thm15="http://schemas.microsoft.com/office/thememl/2012/main" name="Office Theme" id="{62F939B6-93AF-4DB8-9C6B-D6C7DFDC589F}" vid="{4A3C46E8-61CC-4603-A589-7422A47A8E4A}"/>
+    </a:ext>
+  </a:extLst>
+</a:theme>
 </file>
</xml_diff>

<commit_message>
Fixing GAB Template to not need background slide
</commit_message>
<xml_diff>
--- a/WebContent/WEB-INF/templates/GAB2016/master.pptx
+++ b/WebContent/WEB-INF/templates/GAB2016/master.pptx
@@ -149,6 +149,11 @@
       </a:defRPr>
     </a:lvl9pPr>
   </p:defaultTextStyle>
+  <p:extLst>
+    <p:ext uri="{EFAFB233-063F-42B5-8137-9DF3F51BA10A}">
+      <p15:sldGuideLst xmlns:p15="http://schemas.microsoft.com/office/powerpoint/2012/main"/>
+    </p:ext>
+  </p:extLst>
 </p:presentation>
 </file>
 
@@ -4031,6 +4036,52 @@
       </p:grpSpPr>
       <p:sp>
         <p:nvSpPr>
+          <p:cNvPr id="2" name="Rectangle 1"/>
+          <p:cNvSpPr/>
+          <p:nvPr/>
+        </p:nvSpPr>
+        <p:spPr>
+          <a:xfrm>
+            <a:off x="0" y="857250"/>
+            <a:ext cx="9144000" cy="5143500"/>
+          </a:xfrm>
+          <a:prstGeom prst="rect">
+            <a:avLst/>
+          </a:prstGeom>
+          <a:solidFill>
+            <a:srgbClr val="0064A2"/>
+          </a:solidFill>
+          <a:ln>
+            <a:noFill/>
+          </a:ln>
+        </p:spPr>
+        <p:style>
+          <a:lnRef idx="2">
+            <a:schemeClr val="accent1">
+              <a:shade val="50000"/>
+            </a:schemeClr>
+          </a:lnRef>
+          <a:fillRef idx="1">
+            <a:schemeClr val="accent1"/>
+          </a:fillRef>
+          <a:effectRef idx="0">
+            <a:schemeClr val="accent1"/>
+          </a:effectRef>
+          <a:fontRef idx="minor">
+            <a:schemeClr val="lt1"/>
+          </a:fontRef>
+        </p:style>
+        <p:txBody>
+          <a:bodyPr rtlCol="0" anchor="ctr"/>
+          <a:lstStyle/>
+          <a:p>
+            <a:pPr algn="ctr"/>
+            <a:endParaRPr lang="en-US"/>
+          </a:p>
+        </p:txBody>
+      </p:sp>
+      <p:sp>
+        <p:nvSpPr>
           <p:cNvPr id="14338" name="Shape 77"/>
           <p:cNvSpPr txBox="1">
             <a:spLocks noGrp="1"/>
@@ -4073,7 +4124,7 @@
               <a:buSzTx/>
             </a:pPr>
             <a:r>
-              <a:rPr lang="en-US" altLang="en-US" sz="1800" b="1">
+              <a:rPr lang="en-US" altLang="en-US" sz="1800" b="1" dirty="0">
                 <a:solidFill>
                   <a:srgbClr val="003399"/>
                 </a:solidFill>

</xml_diff>